<commit_message>
Slide update and pipeline sample
</commit_message>
<xml_diff>
--- a/Resources/RxTalk2025.pptx
+++ b/Resources/RxTalk2025.pptx
@@ -9,12 +9,11 @@
     <p:sldId id="259" r:id="rId3"/>
     <p:sldId id="260" r:id="rId4"/>
     <p:sldId id="261" r:id="rId5"/>
-    <p:sldId id="267" r:id="rId6"/>
+    <p:sldId id="263" r:id="rId6"/>
     <p:sldId id="265" r:id="rId7"/>
-    <p:sldId id="263" r:id="rId8"/>
-    <p:sldId id="266" r:id="rId9"/>
-    <p:sldId id="262" r:id="rId10"/>
-    <p:sldId id="264" r:id="rId11"/>
+    <p:sldId id="266" r:id="rId8"/>
+    <p:sldId id="262" r:id="rId9"/>
+    <p:sldId id="264" r:id="rId10"/>
   </p:sldIdLst>
   <p:sldSz cx="12192000" cy="6858000"/>
   <p:notesSz cx="6858000" cy="9144000"/>
@@ -278,7 +277,7 @@
           <a:p>
             <a:fld id="{EFF44229-A086-4726-81AF-0BB09E11BB98}" type="datetimeFigureOut">
               <a:rPr lang="en-GB" smtClean="0"/>
-              <a:t>11/04/2025</a:t>
+              <a:t>14/04/2025</a:t>
             </a:fld>
             <a:endParaRPr lang="en-GB"/>
           </a:p>
@@ -478,7 +477,7 @@
           <a:p>
             <a:fld id="{EFF44229-A086-4726-81AF-0BB09E11BB98}" type="datetimeFigureOut">
               <a:rPr lang="en-GB" smtClean="0"/>
-              <a:t>11/04/2025</a:t>
+              <a:t>14/04/2025</a:t>
             </a:fld>
             <a:endParaRPr lang="en-GB"/>
           </a:p>
@@ -688,7 +687,7 @@
           <a:p>
             <a:fld id="{EFF44229-A086-4726-81AF-0BB09E11BB98}" type="datetimeFigureOut">
               <a:rPr lang="en-GB" smtClean="0"/>
-              <a:t>11/04/2025</a:t>
+              <a:t>14/04/2025</a:t>
             </a:fld>
             <a:endParaRPr lang="en-GB"/>
           </a:p>
@@ -888,7 +887,7 @@
           <a:p>
             <a:fld id="{EFF44229-A086-4726-81AF-0BB09E11BB98}" type="datetimeFigureOut">
               <a:rPr lang="en-GB" smtClean="0"/>
-              <a:t>11/04/2025</a:t>
+              <a:t>14/04/2025</a:t>
             </a:fld>
             <a:endParaRPr lang="en-GB"/>
           </a:p>
@@ -1164,7 +1163,7 @@
           <a:p>
             <a:fld id="{EFF44229-A086-4726-81AF-0BB09E11BB98}" type="datetimeFigureOut">
               <a:rPr lang="en-GB" smtClean="0"/>
-              <a:t>11/04/2025</a:t>
+              <a:t>14/04/2025</a:t>
             </a:fld>
             <a:endParaRPr lang="en-GB"/>
           </a:p>
@@ -1432,7 +1431,7 @@
           <a:p>
             <a:fld id="{EFF44229-A086-4726-81AF-0BB09E11BB98}" type="datetimeFigureOut">
               <a:rPr lang="en-GB" smtClean="0"/>
-              <a:t>11/04/2025</a:t>
+              <a:t>14/04/2025</a:t>
             </a:fld>
             <a:endParaRPr lang="en-GB"/>
           </a:p>
@@ -1847,7 +1846,7 @@
           <a:p>
             <a:fld id="{EFF44229-A086-4726-81AF-0BB09E11BB98}" type="datetimeFigureOut">
               <a:rPr lang="en-GB" smtClean="0"/>
-              <a:t>11/04/2025</a:t>
+              <a:t>14/04/2025</a:t>
             </a:fld>
             <a:endParaRPr lang="en-GB"/>
           </a:p>
@@ -1989,7 +1988,7 @@
           <a:p>
             <a:fld id="{EFF44229-A086-4726-81AF-0BB09E11BB98}" type="datetimeFigureOut">
               <a:rPr lang="en-GB" smtClean="0"/>
-              <a:t>11/04/2025</a:t>
+              <a:t>14/04/2025</a:t>
             </a:fld>
             <a:endParaRPr lang="en-GB"/>
           </a:p>
@@ -2102,7 +2101,7 @@
           <a:p>
             <a:fld id="{EFF44229-A086-4726-81AF-0BB09E11BB98}" type="datetimeFigureOut">
               <a:rPr lang="en-GB" smtClean="0"/>
-              <a:t>11/04/2025</a:t>
+              <a:t>14/04/2025</a:t>
             </a:fld>
             <a:endParaRPr lang="en-GB"/>
           </a:p>
@@ -2415,7 +2414,7 @@
           <a:p>
             <a:fld id="{EFF44229-A086-4726-81AF-0BB09E11BB98}" type="datetimeFigureOut">
               <a:rPr lang="en-GB" smtClean="0"/>
-              <a:t>11/04/2025</a:t>
+              <a:t>14/04/2025</a:t>
             </a:fld>
             <a:endParaRPr lang="en-GB"/>
           </a:p>
@@ -2704,7 +2703,7 @@
           <a:p>
             <a:fld id="{EFF44229-A086-4726-81AF-0BB09E11BB98}" type="datetimeFigureOut">
               <a:rPr lang="en-GB" smtClean="0"/>
-              <a:t>11/04/2025</a:t>
+              <a:t>14/04/2025</a:t>
             </a:fld>
             <a:endParaRPr lang="en-GB"/>
           </a:p>
@@ -2947,7 +2946,7 @@
           <a:p>
             <a:fld id="{EFF44229-A086-4726-81AF-0BB09E11BB98}" type="datetimeFigureOut">
               <a:rPr lang="en-GB" smtClean="0"/>
-              <a:t>11/04/2025</a:t>
+              <a:t>14/04/2025</a:t>
             </a:fld>
             <a:endParaRPr lang="en-GB"/>
           </a:p>
@@ -3500,293 +3499,6 @@
   <p:clrMapOvr>
     <a:masterClrMapping/>
   </p:clrMapOvr>
-</p:sld>
-</file>
-
-<file path=ppt/slides/slide10.xml><?xml version="1.0" encoding="utf-8"?>
-<p:sld xmlns:a="http://schemas.openxmlformats.org/drawingml/2006/main" xmlns:r="http://schemas.openxmlformats.org/officeDocument/2006/relationships" xmlns:p="http://schemas.openxmlformats.org/presentationml/2006/main">
-  <p:cSld>
-    <p:bg>
-      <p:bgPr>
-        <a:solidFill>
-          <a:schemeClr val="accent1">
-            <a:lumMod val="75000"/>
-          </a:schemeClr>
-        </a:solidFill>
-        <a:effectLst/>
-      </p:bgPr>
-    </p:bg>
-    <p:spTree>
-      <p:nvGrpSpPr>
-        <p:cNvPr id="1" name="">
-          <a:extLst>
-            <a:ext uri="{FF2B5EF4-FFF2-40B4-BE49-F238E27FC236}">
-              <a16:creationId xmlns:a16="http://schemas.microsoft.com/office/drawing/2014/main" id="{4B5FAEAB-6D7A-94CB-661D-B72FA66469B8}"/>
-            </a:ext>
-          </a:extLst>
-        </p:cNvPr>
-        <p:cNvGrpSpPr/>
-        <p:nvPr/>
-      </p:nvGrpSpPr>
-      <p:grpSpPr>
-        <a:xfrm>
-          <a:off x="0" y="0"/>
-          <a:ext cx="0" cy="0"/>
-          <a:chOff x="0" y="0"/>
-          <a:chExt cx="0" cy="0"/>
-        </a:xfrm>
-      </p:grpSpPr>
-      <p:sp>
-        <p:nvSpPr>
-          <p:cNvPr id="6" name="TextBox 5">
-            <a:extLst>
-              <a:ext uri="{FF2B5EF4-FFF2-40B4-BE49-F238E27FC236}">
-                <a16:creationId xmlns:a16="http://schemas.microsoft.com/office/drawing/2014/main" id="{7216CDF6-4A52-A8AB-30E9-0EBF0A8A7251}"/>
-              </a:ext>
-            </a:extLst>
-          </p:cNvPr>
-          <p:cNvSpPr txBox="1"/>
-          <p:nvPr/>
-        </p:nvSpPr>
-        <p:spPr>
-          <a:xfrm>
-            <a:off x="688259" y="637010"/>
-            <a:ext cx="4178710" cy="584775"/>
-          </a:xfrm>
-          <a:prstGeom prst="rect">
-            <a:avLst/>
-          </a:prstGeom>
-          <a:noFill/>
-        </p:spPr>
-        <p:txBody>
-          <a:bodyPr wrap="square" rtlCol="0">
-            <a:spAutoFit/>
-          </a:bodyPr>
-          <a:lstStyle>
-            <a:defPPr>
-              <a:defRPr lang="en-US"/>
-            </a:defPPr>
-            <a:lvl1pPr>
-              <a:defRPr sz="3200">
-                <a:solidFill>
-                  <a:schemeClr val="accent6">
-                    <a:lumMod val="60000"/>
-                    <a:lumOff val="40000"/>
-                  </a:schemeClr>
-                </a:solidFill>
-                <a:latin typeface="Aptos ExtraBold" panose="020F0502020204030204" pitchFamily="34" charset="0"/>
-              </a:defRPr>
-            </a:lvl1pPr>
-          </a:lstStyle>
-          <a:p>
-            <a:r>
-              <a:rPr lang="en-US" dirty="0"/>
-              <a:t>Resources</a:t>
-            </a:r>
-            <a:endParaRPr lang="en-GB" dirty="0"/>
-          </a:p>
-        </p:txBody>
-      </p:sp>
-      <p:sp>
-        <p:nvSpPr>
-          <p:cNvPr id="9" name="TextBox 8">
-            <a:extLst>
-              <a:ext uri="{FF2B5EF4-FFF2-40B4-BE49-F238E27FC236}">
-                <a16:creationId xmlns:a16="http://schemas.microsoft.com/office/drawing/2014/main" id="{1C55003B-7BC8-4072-0C21-2A71E3D40044}"/>
-              </a:ext>
-            </a:extLst>
-          </p:cNvPr>
-          <p:cNvSpPr txBox="1"/>
-          <p:nvPr/>
-        </p:nvSpPr>
-        <p:spPr>
-          <a:xfrm>
-            <a:off x="875071" y="1678797"/>
-            <a:ext cx="3628044" cy="369332"/>
-          </a:xfrm>
-          <a:prstGeom prst="rect">
-            <a:avLst/>
-          </a:prstGeom>
-          <a:noFill/>
-        </p:spPr>
-        <p:txBody>
-          <a:bodyPr wrap="none" rtlCol="0">
-            <a:spAutoFit/>
-          </a:bodyPr>
-          <a:lstStyle>
-            <a:defPPr>
-              <a:defRPr lang="en-US"/>
-            </a:defPPr>
-            <a:lvl1pPr>
-              <a:defRPr>
-                <a:solidFill>
-                  <a:schemeClr val="accent4">
-                    <a:lumMod val="20000"/>
-                    <a:lumOff val="80000"/>
-                  </a:schemeClr>
-                </a:solidFill>
-              </a:defRPr>
-            </a:lvl1pPr>
-          </a:lstStyle>
-          <a:p>
-            <a:r>
-              <a:rPr lang="en-US" dirty="0"/>
-              <a:t>https://github.com/dotnet/reactive</a:t>
-            </a:r>
-            <a:endParaRPr lang="en-GB" dirty="0"/>
-          </a:p>
-        </p:txBody>
-      </p:sp>
-    </p:spTree>
-    <p:extLst>
-      <p:ext uri="{BB962C8B-B14F-4D97-AF65-F5344CB8AC3E}">
-        <p14:creationId xmlns:p14="http://schemas.microsoft.com/office/powerpoint/2010/main" val="1573345551"/>
-      </p:ext>
-    </p:extLst>
-  </p:cSld>
-  <p:clrMapOvr>
-    <a:overrideClrMapping bg1="lt1" tx1="dk1" bg2="lt2" tx2="dk2" accent1="accent1" accent2="accent2" accent3="accent3" accent4="accent4" accent5="accent5" accent6="accent6" hlink="hlink" folHlink="folHlink"/>
-  </p:clrMapOvr>
-  <p:timing>
-    <p:tnLst>
-      <p:par>
-        <p:cTn id="1" dur="indefinite" restart="never" nodeType="tmRoot">
-          <p:childTnLst>
-            <p:seq concurrent="1" nextAc="seek">
-              <p:cTn id="2" dur="indefinite" nodeType="mainSeq">
-                <p:childTnLst>
-                  <p:par>
-                    <p:cTn id="3" fill="hold">
-                      <p:stCondLst>
-                        <p:cond delay="indefinite"/>
-                      </p:stCondLst>
-                      <p:childTnLst>
-                        <p:par>
-                          <p:cTn id="4" fill="hold">
-                            <p:stCondLst>
-                              <p:cond delay="0"/>
-                            </p:stCondLst>
-                            <p:childTnLst>
-                              <p:par>
-                                <p:cTn id="5" presetID="22" presetClass="entr" presetSubtype="4" fill="hold" grpId="0" nodeType="clickEffect">
-                                  <p:stCondLst>
-                                    <p:cond delay="0"/>
-                                  </p:stCondLst>
-                                  <p:childTnLst>
-                                    <p:set>
-                                      <p:cBhvr>
-                                        <p:cTn id="6" dur="1" fill="hold">
-                                          <p:stCondLst>
-                                            <p:cond delay="0"/>
-                                          </p:stCondLst>
-                                        </p:cTn>
-                                        <p:tgtEl>
-                                          <p:spTgt spid="6"/>
-                                        </p:tgtEl>
-                                        <p:attrNameLst>
-                                          <p:attrName>style.visibility</p:attrName>
-                                        </p:attrNameLst>
-                                      </p:cBhvr>
-                                      <p:to>
-                                        <p:strVal val="visible"/>
-                                      </p:to>
-                                    </p:set>
-                                    <p:animEffect transition="in" filter="wipe(down)">
-                                      <p:cBhvr>
-                                        <p:cTn id="7" dur="500"/>
-                                        <p:tgtEl>
-                                          <p:spTgt spid="6"/>
-                                        </p:tgtEl>
-                                      </p:cBhvr>
-                                    </p:animEffect>
-                                  </p:childTnLst>
-                                </p:cTn>
-                              </p:par>
-                            </p:childTnLst>
-                          </p:cTn>
-                        </p:par>
-                      </p:childTnLst>
-                    </p:cTn>
-                  </p:par>
-                  <p:par>
-                    <p:cTn id="8" fill="hold">
-                      <p:stCondLst>
-                        <p:cond delay="indefinite"/>
-                      </p:stCondLst>
-                      <p:childTnLst>
-                        <p:par>
-                          <p:cTn id="9" fill="hold">
-                            <p:stCondLst>
-                              <p:cond delay="0"/>
-                            </p:stCondLst>
-                            <p:childTnLst>
-                              <p:par>
-                                <p:cTn id="10" presetID="22" presetClass="entr" presetSubtype="4" fill="hold" grpId="0" nodeType="clickEffect">
-                                  <p:stCondLst>
-                                    <p:cond delay="0"/>
-                                  </p:stCondLst>
-                                  <p:childTnLst>
-                                    <p:set>
-                                      <p:cBhvr>
-                                        <p:cTn id="11" dur="1" fill="hold">
-                                          <p:stCondLst>
-                                            <p:cond delay="0"/>
-                                          </p:stCondLst>
-                                        </p:cTn>
-                                        <p:tgtEl>
-                                          <p:spTgt spid="9"/>
-                                        </p:tgtEl>
-                                        <p:attrNameLst>
-                                          <p:attrName>style.visibility</p:attrName>
-                                        </p:attrNameLst>
-                                      </p:cBhvr>
-                                      <p:to>
-                                        <p:strVal val="visible"/>
-                                      </p:to>
-                                    </p:set>
-                                    <p:animEffect transition="in" filter="wipe(down)">
-                                      <p:cBhvr>
-                                        <p:cTn id="12" dur="500"/>
-                                        <p:tgtEl>
-                                          <p:spTgt spid="9"/>
-                                        </p:tgtEl>
-                                      </p:cBhvr>
-                                    </p:animEffect>
-                                  </p:childTnLst>
-                                </p:cTn>
-                              </p:par>
-                            </p:childTnLst>
-                          </p:cTn>
-                        </p:par>
-                      </p:childTnLst>
-                    </p:cTn>
-                  </p:par>
-                </p:childTnLst>
-              </p:cTn>
-              <p:prevCondLst>
-                <p:cond evt="onPrev" delay="0">
-                  <p:tgtEl>
-                    <p:sldTgt/>
-                  </p:tgtEl>
-                </p:cond>
-              </p:prevCondLst>
-              <p:nextCondLst>
-                <p:cond evt="onNext" delay="0">
-                  <p:tgtEl>
-                    <p:sldTgt/>
-                  </p:tgtEl>
-                </p:cond>
-              </p:nextCondLst>
-            </p:seq>
-          </p:childTnLst>
-        </p:cTn>
-      </p:par>
-    </p:tnLst>
-    <p:bldLst>
-      <p:bldP spid="6" grpId="0"/>
-      <p:bldP spid="9" grpId="0"/>
-    </p:bldLst>
-  </p:timing>
 </p:sld>
 </file>
 
@@ -6120,723 +5832,6 @@
         <p:cNvPr id="1" name="">
           <a:extLst>
             <a:ext uri="{FF2B5EF4-FFF2-40B4-BE49-F238E27FC236}">
-              <a16:creationId xmlns:a16="http://schemas.microsoft.com/office/drawing/2014/main" id="{7F1017B3-C134-D460-4D27-26941C481471}"/>
-            </a:ext>
-          </a:extLst>
-        </p:cNvPr>
-        <p:cNvGrpSpPr/>
-        <p:nvPr/>
-      </p:nvGrpSpPr>
-      <p:grpSpPr>
-        <a:xfrm>
-          <a:off x="0" y="0"/>
-          <a:ext cx="0" cy="0"/>
-          <a:chOff x="0" y="0"/>
-          <a:chExt cx="0" cy="0"/>
-        </a:xfrm>
-      </p:grpSpPr>
-      <p:pic>
-        <p:nvPicPr>
-          <p:cNvPr id="5" name="Picture 4">
-            <a:extLst>
-              <a:ext uri="{FF2B5EF4-FFF2-40B4-BE49-F238E27FC236}">
-                <a16:creationId xmlns:a16="http://schemas.microsoft.com/office/drawing/2014/main" id="{E0FEDF66-F598-E78D-EB29-2F48424D7CD8}"/>
-              </a:ext>
-            </a:extLst>
-          </p:cNvPr>
-          <p:cNvPicPr>
-            <a:picLocks noChangeAspect="1"/>
-          </p:cNvPicPr>
-          <p:nvPr/>
-        </p:nvPicPr>
-        <p:blipFill>
-          <a:blip r:embed="rId3"/>
-          <a:stretch>
-            <a:fillRect/>
-          </a:stretch>
-        </p:blipFill>
-        <p:spPr>
-          <a:xfrm>
-            <a:off x="2299757" y="919721"/>
-            <a:ext cx="7592485" cy="1752845"/>
-          </a:xfrm>
-          <a:prstGeom prst="rect">
-            <a:avLst/>
-          </a:prstGeom>
-        </p:spPr>
-      </p:pic>
-    </p:spTree>
-    <p:extLst>
-      <p:ext uri="{BB962C8B-B14F-4D97-AF65-F5344CB8AC3E}">
-        <p14:creationId xmlns:p14="http://schemas.microsoft.com/office/powerpoint/2010/main" val="4199025495"/>
-      </p:ext>
-    </p:extLst>
-  </p:cSld>
-  <p:clrMapOvr>
-    <a:overrideClrMapping bg1="lt1" tx1="dk1" bg2="lt2" tx2="dk2" accent1="accent1" accent2="accent2" accent3="accent3" accent4="accent4" accent5="accent5" accent6="accent6" hlink="hlink" folHlink="folHlink"/>
-  </p:clrMapOvr>
-</p:sld>
-</file>
-
-<file path=ppt/slides/slide6.xml><?xml version="1.0" encoding="utf-8"?>
-<p:sld xmlns:a="http://schemas.openxmlformats.org/drawingml/2006/main" xmlns:r="http://schemas.openxmlformats.org/officeDocument/2006/relationships" xmlns:p="http://schemas.openxmlformats.org/presentationml/2006/main">
-  <p:cSld>
-    <p:bg>
-      <p:bgPr>
-        <a:solidFill>
-          <a:schemeClr val="accent1">
-            <a:lumMod val="75000"/>
-          </a:schemeClr>
-        </a:solidFill>
-        <a:effectLst/>
-      </p:bgPr>
-    </p:bg>
-    <p:spTree>
-      <p:nvGrpSpPr>
-        <p:cNvPr id="1" name="">
-          <a:extLst>
-            <a:ext uri="{FF2B5EF4-FFF2-40B4-BE49-F238E27FC236}">
-              <a16:creationId xmlns:a16="http://schemas.microsoft.com/office/drawing/2014/main" id="{E2160DB5-C3E0-4D1A-D632-50D463514973}"/>
-            </a:ext>
-          </a:extLst>
-        </p:cNvPr>
-        <p:cNvGrpSpPr/>
-        <p:nvPr/>
-      </p:nvGrpSpPr>
-      <p:grpSpPr>
-        <a:xfrm>
-          <a:off x="0" y="0"/>
-          <a:ext cx="0" cy="0"/>
-          <a:chOff x="0" y="0"/>
-          <a:chExt cx="0" cy="0"/>
-        </a:xfrm>
-      </p:grpSpPr>
-      <p:sp>
-        <p:nvSpPr>
-          <p:cNvPr id="3" name="TextBox 2">
-            <a:extLst>
-              <a:ext uri="{FF2B5EF4-FFF2-40B4-BE49-F238E27FC236}">
-                <a16:creationId xmlns:a16="http://schemas.microsoft.com/office/drawing/2014/main" id="{1C26C62D-7736-8E32-2FB7-75176005F503}"/>
-              </a:ext>
-            </a:extLst>
-          </p:cNvPr>
-          <p:cNvSpPr txBox="1"/>
-          <p:nvPr/>
-        </p:nvSpPr>
-        <p:spPr>
-          <a:xfrm>
-            <a:off x="693349" y="555523"/>
-            <a:ext cx="5963264" cy="584775"/>
-          </a:xfrm>
-          <a:prstGeom prst="rect">
-            <a:avLst/>
-          </a:prstGeom>
-          <a:noFill/>
-        </p:spPr>
-        <p:txBody>
-          <a:bodyPr wrap="square" rtlCol="0">
-            <a:spAutoFit/>
-          </a:bodyPr>
-          <a:lstStyle/>
-          <a:p>
-            <a:r>
-              <a:rPr lang="en-US" sz="3200" dirty="0">
-                <a:solidFill>
-                  <a:schemeClr val="accent6">
-                    <a:lumMod val="60000"/>
-                    <a:lumOff val="40000"/>
-                  </a:schemeClr>
-                </a:solidFill>
-                <a:latin typeface="Aptos ExtraBold" panose="020F0502020204030204" pitchFamily="34" charset="0"/>
-              </a:rPr>
-              <a:t>Advantageous…</a:t>
-            </a:r>
-            <a:endParaRPr lang="en-GB" sz="3200" dirty="0">
-              <a:solidFill>
-                <a:schemeClr val="accent6">
-                  <a:lumMod val="60000"/>
-                  <a:lumOff val="40000"/>
-                </a:schemeClr>
-              </a:solidFill>
-              <a:latin typeface="Aptos ExtraBold" panose="020F0502020204030204" pitchFamily="34" charset="0"/>
-            </a:endParaRPr>
-          </a:p>
-        </p:txBody>
-      </p:sp>
-      <p:sp>
-        <p:nvSpPr>
-          <p:cNvPr id="4" name="TextBox 3">
-            <a:extLst>
-              <a:ext uri="{FF2B5EF4-FFF2-40B4-BE49-F238E27FC236}">
-                <a16:creationId xmlns:a16="http://schemas.microsoft.com/office/drawing/2014/main" id="{8B37A620-9896-E562-9CE5-16EABC3B4A7C}"/>
-              </a:ext>
-            </a:extLst>
-          </p:cNvPr>
-          <p:cNvSpPr txBox="1"/>
-          <p:nvPr/>
-        </p:nvSpPr>
-        <p:spPr>
-          <a:xfrm>
-            <a:off x="958645" y="1612490"/>
-            <a:ext cx="8465779" cy="2308324"/>
-          </a:xfrm>
-          <a:prstGeom prst="rect">
-            <a:avLst/>
-          </a:prstGeom>
-          <a:noFill/>
-        </p:spPr>
-        <p:txBody>
-          <a:bodyPr wrap="none" rtlCol="0">
-            <a:spAutoFit/>
-          </a:bodyPr>
-          <a:lstStyle/>
-          <a:p>
-            <a:pPr marL="285750" indent="-285750">
-              <a:buFont typeface="Arial" panose="020B0604020202020204" pitchFamily="34" charset="0"/>
-              <a:buChar char="•"/>
-            </a:pPr>
-            <a:r>
-              <a:rPr lang="en-US" dirty="0">
-                <a:solidFill>
-                  <a:schemeClr val="accent4">
-                    <a:lumMod val="20000"/>
-                    <a:lumOff val="80000"/>
-                  </a:schemeClr>
-                </a:solidFill>
-              </a:rPr>
-              <a:t>Streams can be used as first class citizens in your application code</a:t>
-            </a:r>
-          </a:p>
-          <a:p>
-            <a:pPr marL="285750" indent="-285750">
-              <a:buFont typeface="Arial" panose="020B0604020202020204" pitchFamily="34" charset="0"/>
-              <a:buChar char="•"/>
-            </a:pPr>
-            <a:endParaRPr lang="en-GB" dirty="0">
-              <a:solidFill>
-                <a:schemeClr val="accent4">
-                  <a:lumMod val="20000"/>
-                  <a:lumOff val="80000"/>
-                </a:schemeClr>
-              </a:solidFill>
-            </a:endParaRPr>
-          </a:p>
-          <a:p>
-            <a:pPr marL="285750" indent="-285750">
-              <a:buFont typeface="Arial" panose="020B0604020202020204" pitchFamily="34" charset="0"/>
-              <a:buChar char="•"/>
-            </a:pPr>
-            <a:r>
-              <a:rPr lang="en-GB" dirty="0">
-                <a:solidFill>
-                  <a:schemeClr val="accent4">
-                    <a:lumMod val="20000"/>
-                    <a:lumOff val="80000"/>
-                  </a:schemeClr>
-                </a:solidFill>
-              </a:rPr>
-              <a:t>Streams of data can be aggregated and filtered with </a:t>
-            </a:r>
-            <a:r>
-              <a:rPr lang="en-GB" dirty="0" err="1">
-                <a:solidFill>
-                  <a:schemeClr val="accent4">
-                    <a:lumMod val="20000"/>
-                    <a:lumOff val="80000"/>
-                  </a:schemeClr>
-                </a:solidFill>
-              </a:rPr>
-              <a:t>Linq</a:t>
-            </a:r>
-            <a:endParaRPr lang="en-GB" dirty="0">
-              <a:solidFill>
-                <a:schemeClr val="accent4">
-                  <a:lumMod val="20000"/>
-                  <a:lumOff val="80000"/>
-                </a:schemeClr>
-              </a:solidFill>
-            </a:endParaRPr>
-          </a:p>
-          <a:p>
-            <a:pPr marL="285750" indent="-285750">
-              <a:buFont typeface="Arial" panose="020B0604020202020204" pitchFamily="34" charset="0"/>
-              <a:buChar char="•"/>
-            </a:pPr>
-            <a:endParaRPr lang="en-GB" dirty="0">
-              <a:solidFill>
-                <a:schemeClr val="accent4">
-                  <a:lumMod val="20000"/>
-                  <a:lumOff val="80000"/>
-                </a:schemeClr>
-              </a:solidFill>
-            </a:endParaRPr>
-          </a:p>
-          <a:p>
-            <a:pPr marL="285750" indent="-285750">
-              <a:buFont typeface="Arial" panose="020B0604020202020204" pitchFamily="34" charset="0"/>
-              <a:buChar char="•"/>
-            </a:pPr>
-            <a:r>
-              <a:rPr lang="en-US" dirty="0">
-                <a:solidFill>
-                  <a:schemeClr val="accent4">
-                    <a:lumMod val="20000"/>
-                    <a:lumOff val="80000"/>
-                  </a:schemeClr>
-                </a:solidFill>
-              </a:rPr>
-              <a:t>Unsubscribing from a stream using </a:t>
-            </a:r>
-            <a:r>
-              <a:rPr lang="en-US" dirty="0" err="1">
-                <a:solidFill>
-                  <a:schemeClr val="accent4">
-                    <a:lumMod val="20000"/>
-                    <a:lumOff val="80000"/>
-                  </a:schemeClr>
-                </a:solidFill>
-              </a:rPr>
-              <a:t>IDisposable</a:t>
-            </a:r>
-            <a:r>
-              <a:rPr lang="en-US" dirty="0">
-                <a:solidFill>
-                  <a:schemeClr val="accent4">
-                    <a:lumMod val="20000"/>
-                    <a:lumOff val="80000"/>
-                  </a:schemeClr>
-                </a:solidFill>
-              </a:rPr>
-              <a:t> is “cleaner” than -= </a:t>
-            </a:r>
-            <a:r>
-              <a:rPr lang="en-US" dirty="0" err="1">
-                <a:solidFill>
-                  <a:schemeClr val="accent4">
-                    <a:lumMod val="20000"/>
-                    <a:lumOff val="80000"/>
-                  </a:schemeClr>
-                </a:solidFill>
-              </a:rPr>
-              <a:t>eventhandler</a:t>
-            </a:r>
-            <a:endParaRPr lang="en-US" dirty="0">
-              <a:solidFill>
-                <a:schemeClr val="accent4">
-                  <a:lumMod val="20000"/>
-                  <a:lumOff val="80000"/>
-                </a:schemeClr>
-              </a:solidFill>
-            </a:endParaRPr>
-          </a:p>
-          <a:p>
-            <a:pPr marL="285750" indent="-285750">
-              <a:buFont typeface="Arial" panose="020B0604020202020204" pitchFamily="34" charset="0"/>
-              <a:buChar char="•"/>
-            </a:pPr>
-            <a:endParaRPr lang="en-US" dirty="0">
-              <a:solidFill>
-                <a:schemeClr val="accent4">
-                  <a:lumMod val="20000"/>
-                  <a:lumOff val="80000"/>
-                </a:schemeClr>
-              </a:solidFill>
-            </a:endParaRPr>
-          </a:p>
-          <a:p>
-            <a:pPr marL="285750" indent="-285750">
-              <a:buFont typeface="Arial" panose="020B0604020202020204" pitchFamily="34" charset="0"/>
-              <a:buChar char="•"/>
-            </a:pPr>
-            <a:r>
-              <a:rPr lang="en-GB" dirty="0">
-                <a:solidFill>
-                  <a:schemeClr val="accent1">
-                    <a:lumMod val="20000"/>
-                    <a:lumOff val="80000"/>
-                  </a:schemeClr>
-                </a:solidFill>
-              </a:rPr>
-              <a:t>Bridging into Async/Await world is seamless</a:t>
-            </a:r>
-          </a:p>
-          <a:p>
-            <a:pPr marL="285750" indent="-285750">
-              <a:buFont typeface="Arial" panose="020B0604020202020204" pitchFamily="34" charset="0"/>
-              <a:buChar char="•"/>
-            </a:pPr>
-            <a:endParaRPr lang="en-US" dirty="0">
-              <a:solidFill>
-                <a:schemeClr val="accent4">
-                  <a:lumMod val="20000"/>
-                  <a:lumOff val="80000"/>
-                </a:schemeClr>
-              </a:solidFill>
-            </a:endParaRPr>
-          </a:p>
-        </p:txBody>
-      </p:sp>
-    </p:spTree>
-    <p:extLst>
-      <p:ext uri="{BB962C8B-B14F-4D97-AF65-F5344CB8AC3E}">
-        <p14:creationId xmlns:p14="http://schemas.microsoft.com/office/powerpoint/2010/main" val="1211216982"/>
-      </p:ext>
-    </p:extLst>
-  </p:cSld>
-  <p:clrMapOvr>
-    <a:overrideClrMapping bg1="lt1" tx1="dk1" bg2="lt2" tx2="dk2" accent1="accent1" accent2="accent2" accent3="accent3" accent4="accent4" accent5="accent5" accent6="accent6" hlink="hlink" folHlink="folHlink"/>
-  </p:clrMapOvr>
-  <p:timing>
-    <p:tnLst>
-      <p:par>
-        <p:cTn id="1" dur="indefinite" restart="never" nodeType="tmRoot">
-          <p:childTnLst>
-            <p:seq concurrent="1" nextAc="seek">
-              <p:cTn id="2" dur="indefinite" nodeType="mainSeq">
-                <p:childTnLst>
-                  <p:par>
-                    <p:cTn id="3" fill="hold">
-                      <p:stCondLst>
-                        <p:cond delay="indefinite"/>
-                      </p:stCondLst>
-                      <p:childTnLst>
-                        <p:par>
-                          <p:cTn id="4" fill="hold">
-                            <p:stCondLst>
-                              <p:cond delay="0"/>
-                            </p:stCondLst>
-                            <p:childTnLst>
-                              <p:par>
-                                <p:cTn id="5" presetID="22" presetClass="entr" presetSubtype="4" fill="hold" grpId="0" nodeType="clickEffect">
-                                  <p:stCondLst>
-                                    <p:cond delay="0"/>
-                                  </p:stCondLst>
-                                  <p:childTnLst>
-                                    <p:set>
-                                      <p:cBhvr>
-                                        <p:cTn id="6" dur="1" fill="hold">
-                                          <p:stCondLst>
-                                            <p:cond delay="0"/>
-                                          </p:stCondLst>
-                                        </p:cTn>
-                                        <p:tgtEl>
-                                          <p:spTgt spid="3"/>
-                                        </p:tgtEl>
-                                        <p:attrNameLst>
-                                          <p:attrName>style.visibility</p:attrName>
-                                        </p:attrNameLst>
-                                      </p:cBhvr>
-                                      <p:to>
-                                        <p:strVal val="visible"/>
-                                      </p:to>
-                                    </p:set>
-                                    <p:animEffect transition="in" filter="wipe(down)">
-                                      <p:cBhvr>
-                                        <p:cTn id="7" dur="500"/>
-                                        <p:tgtEl>
-                                          <p:spTgt spid="3"/>
-                                        </p:tgtEl>
-                                      </p:cBhvr>
-                                    </p:animEffect>
-                                  </p:childTnLst>
-                                </p:cTn>
-                              </p:par>
-                            </p:childTnLst>
-                          </p:cTn>
-                        </p:par>
-                      </p:childTnLst>
-                    </p:cTn>
-                  </p:par>
-                  <p:par>
-                    <p:cTn id="8" fill="hold">
-                      <p:stCondLst>
-                        <p:cond delay="indefinite"/>
-                      </p:stCondLst>
-                      <p:childTnLst>
-                        <p:par>
-                          <p:cTn id="9" fill="hold">
-                            <p:stCondLst>
-                              <p:cond delay="0"/>
-                            </p:stCondLst>
-                            <p:childTnLst>
-                              <p:par>
-                                <p:cTn id="10" presetID="22" presetClass="entr" presetSubtype="4" fill="hold" nodeType="clickEffect">
-                                  <p:stCondLst>
-                                    <p:cond delay="0"/>
-                                  </p:stCondLst>
-                                  <p:childTnLst>
-                                    <p:set>
-                                      <p:cBhvr>
-                                        <p:cTn id="11" dur="1" fill="hold">
-                                          <p:stCondLst>
-                                            <p:cond delay="0"/>
-                                          </p:stCondLst>
-                                        </p:cTn>
-                                        <p:tgtEl>
-                                          <p:spTgt spid="4">
-                                            <p:txEl>
-                                              <p:pRg st="0" end="0"/>
-                                            </p:txEl>
-                                          </p:spTgt>
-                                        </p:tgtEl>
-                                        <p:attrNameLst>
-                                          <p:attrName>style.visibility</p:attrName>
-                                        </p:attrNameLst>
-                                      </p:cBhvr>
-                                      <p:to>
-                                        <p:strVal val="visible"/>
-                                      </p:to>
-                                    </p:set>
-                                    <p:animEffect transition="in" filter="wipe(down)">
-                                      <p:cBhvr>
-                                        <p:cTn id="12" dur="500"/>
-                                        <p:tgtEl>
-                                          <p:spTgt spid="4">
-                                            <p:txEl>
-                                              <p:pRg st="0" end="0"/>
-                                            </p:txEl>
-                                          </p:spTgt>
-                                        </p:tgtEl>
-                                      </p:cBhvr>
-                                    </p:animEffect>
-                                  </p:childTnLst>
-                                </p:cTn>
-                              </p:par>
-                            </p:childTnLst>
-                          </p:cTn>
-                        </p:par>
-                      </p:childTnLst>
-                    </p:cTn>
-                  </p:par>
-                  <p:par>
-                    <p:cTn id="13" fill="hold">
-                      <p:stCondLst>
-                        <p:cond delay="indefinite"/>
-                      </p:stCondLst>
-                      <p:childTnLst>
-                        <p:par>
-                          <p:cTn id="14" fill="hold">
-                            <p:stCondLst>
-                              <p:cond delay="0"/>
-                            </p:stCondLst>
-                            <p:childTnLst>
-                              <p:par>
-                                <p:cTn id="15" presetID="22" presetClass="entr" presetSubtype="4" fill="hold" nodeType="clickEffect">
-                                  <p:stCondLst>
-                                    <p:cond delay="0"/>
-                                  </p:stCondLst>
-                                  <p:childTnLst>
-                                    <p:set>
-                                      <p:cBhvr>
-                                        <p:cTn id="16" dur="1" fill="hold">
-                                          <p:stCondLst>
-                                            <p:cond delay="0"/>
-                                          </p:stCondLst>
-                                        </p:cTn>
-                                        <p:tgtEl>
-                                          <p:spTgt spid="4">
-                                            <p:txEl>
-                                              <p:pRg st="2" end="2"/>
-                                            </p:txEl>
-                                          </p:spTgt>
-                                        </p:tgtEl>
-                                        <p:attrNameLst>
-                                          <p:attrName>style.visibility</p:attrName>
-                                        </p:attrNameLst>
-                                      </p:cBhvr>
-                                      <p:to>
-                                        <p:strVal val="visible"/>
-                                      </p:to>
-                                    </p:set>
-                                    <p:animEffect transition="in" filter="wipe(down)">
-                                      <p:cBhvr>
-                                        <p:cTn id="17" dur="500"/>
-                                        <p:tgtEl>
-                                          <p:spTgt spid="4">
-                                            <p:txEl>
-                                              <p:pRg st="2" end="2"/>
-                                            </p:txEl>
-                                          </p:spTgt>
-                                        </p:tgtEl>
-                                      </p:cBhvr>
-                                    </p:animEffect>
-                                  </p:childTnLst>
-                                </p:cTn>
-                              </p:par>
-                            </p:childTnLst>
-                          </p:cTn>
-                        </p:par>
-                      </p:childTnLst>
-                    </p:cTn>
-                  </p:par>
-                  <p:par>
-                    <p:cTn id="18" fill="hold">
-                      <p:stCondLst>
-                        <p:cond delay="indefinite"/>
-                      </p:stCondLst>
-                      <p:childTnLst>
-                        <p:par>
-                          <p:cTn id="19" fill="hold">
-                            <p:stCondLst>
-                              <p:cond delay="0"/>
-                            </p:stCondLst>
-                            <p:childTnLst>
-                              <p:par>
-                                <p:cTn id="20" presetID="22" presetClass="entr" presetSubtype="4" fill="hold" nodeType="clickEffect">
-                                  <p:stCondLst>
-                                    <p:cond delay="0"/>
-                                  </p:stCondLst>
-                                  <p:childTnLst>
-                                    <p:set>
-                                      <p:cBhvr>
-                                        <p:cTn id="21" dur="1" fill="hold">
-                                          <p:stCondLst>
-                                            <p:cond delay="0"/>
-                                          </p:stCondLst>
-                                        </p:cTn>
-                                        <p:tgtEl>
-                                          <p:spTgt spid="4">
-                                            <p:txEl>
-                                              <p:pRg st="4" end="4"/>
-                                            </p:txEl>
-                                          </p:spTgt>
-                                        </p:tgtEl>
-                                        <p:attrNameLst>
-                                          <p:attrName>style.visibility</p:attrName>
-                                        </p:attrNameLst>
-                                      </p:cBhvr>
-                                      <p:to>
-                                        <p:strVal val="visible"/>
-                                      </p:to>
-                                    </p:set>
-                                    <p:animEffect transition="in" filter="wipe(down)">
-                                      <p:cBhvr>
-                                        <p:cTn id="22" dur="500"/>
-                                        <p:tgtEl>
-                                          <p:spTgt spid="4">
-                                            <p:txEl>
-                                              <p:pRg st="4" end="4"/>
-                                            </p:txEl>
-                                          </p:spTgt>
-                                        </p:tgtEl>
-                                      </p:cBhvr>
-                                    </p:animEffect>
-                                  </p:childTnLst>
-                                </p:cTn>
-                              </p:par>
-                            </p:childTnLst>
-                          </p:cTn>
-                        </p:par>
-                      </p:childTnLst>
-                    </p:cTn>
-                  </p:par>
-                  <p:par>
-                    <p:cTn id="23" fill="hold">
-                      <p:stCondLst>
-                        <p:cond delay="indefinite"/>
-                      </p:stCondLst>
-                      <p:childTnLst>
-                        <p:par>
-                          <p:cTn id="24" fill="hold">
-                            <p:stCondLst>
-                              <p:cond delay="0"/>
-                            </p:stCondLst>
-                            <p:childTnLst>
-                              <p:par>
-                                <p:cTn id="25" presetID="22" presetClass="entr" presetSubtype="4" fill="hold" nodeType="clickEffect">
-                                  <p:stCondLst>
-                                    <p:cond delay="0"/>
-                                  </p:stCondLst>
-                                  <p:childTnLst>
-                                    <p:set>
-                                      <p:cBhvr>
-                                        <p:cTn id="26" dur="1" fill="hold">
-                                          <p:stCondLst>
-                                            <p:cond delay="0"/>
-                                          </p:stCondLst>
-                                        </p:cTn>
-                                        <p:tgtEl>
-                                          <p:spTgt spid="4">
-                                            <p:txEl>
-                                              <p:pRg st="6" end="6"/>
-                                            </p:txEl>
-                                          </p:spTgt>
-                                        </p:tgtEl>
-                                        <p:attrNameLst>
-                                          <p:attrName>style.visibility</p:attrName>
-                                        </p:attrNameLst>
-                                      </p:cBhvr>
-                                      <p:to>
-                                        <p:strVal val="visible"/>
-                                      </p:to>
-                                    </p:set>
-                                    <p:animEffect transition="in" filter="wipe(down)">
-                                      <p:cBhvr>
-                                        <p:cTn id="27" dur="500"/>
-                                        <p:tgtEl>
-                                          <p:spTgt spid="4">
-                                            <p:txEl>
-                                              <p:pRg st="6" end="6"/>
-                                            </p:txEl>
-                                          </p:spTgt>
-                                        </p:tgtEl>
-                                      </p:cBhvr>
-                                    </p:animEffect>
-                                  </p:childTnLst>
-                                </p:cTn>
-                              </p:par>
-                            </p:childTnLst>
-                          </p:cTn>
-                        </p:par>
-                      </p:childTnLst>
-                    </p:cTn>
-                  </p:par>
-                </p:childTnLst>
-              </p:cTn>
-              <p:prevCondLst>
-                <p:cond evt="onPrev" delay="0">
-                  <p:tgtEl>
-                    <p:sldTgt/>
-                  </p:tgtEl>
-                </p:cond>
-              </p:prevCondLst>
-              <p:nextCondLst>
-                <p:cond evt="onNext" delay="0">
-                  <p:tgtEl>
-                    <p:sldTgt/>
-                  </p:tgtEl>
-                </p:cond>
-              </p:nextCondLst>
-            </p:seq>
-          </p:childTnLst>
-        </p:cTn>
-      </p:par>
-    </p:tnLst>
-    <p:bldLst>
-      <p:bldP spid="3" grpId="0"/>
-    </p:bldLst>
-  </p:timing>
-</p:sld>
-</file>
-
-<file path=ppt/slides/slide7.xml><?xml version="1.0" encoding="utf-8"?>
-<p:sld xmlns:a="http://schemas.openxmlformats.org/drawingml/2006/main" xmlns:r="http://schemas.openxmlformats.org/officeDocument/2006/relationships" xmlns:p="http://schemas.openxmlformats.org/presentationml/2006/main">
-  <p:cSld>
-    <p:bg>
-      <p:bgPr>
-        <a:solidFill>
-          <a:schemeClr val="accent1">
-            <a:lumMod val="75000"/>
-          </a:schemeClr>
-        </a:solidFill>
-        <a:effectLst/>
-      </p:bgPr>
-    </p:bg>
-    <p:spTree>
-      <p:nvGrpSpPr>
-        <p:cNvPr id="1" name="">
-          <a:extLst>
-            <a:ext uri="{FF2B5EF4-FFF2-40B4-BE49-F238E27FC236}">
               <a16:creationId xmlns:a16="http://schemas.microsoft.com/office/drawing/2014/main" id="{712726F6-FFB9-72C8-95CE-DCF9FFE26147}"/>
             </a:ext>
           </a:extLst>
@@ -7348,7 +6343,648 @@
 </p:sld>
 </file>
 
-<file path=ppt/slides/slide8.xml><?xml version="1.0" encoding="utf-8"?>
+<file path=ppt/slides/slide6.xml><?xml version="1.0" encoding="utf-8"?>
+<p:sld xmlns:a="http://schemas.openxmlformats.org/drawingml/2006/main" xmlns:r="http://schemas.openxmlformats.org/officeDocument/2006/relationships" xmlns:p="http://schemas.openxmlformats.org/presentationml/2006/main">
+  <p:cSld>
+    <p:bg>
+      <p:bgPr>
+        <a:solidFill>
+          <a:schemeClr val="accent1">
+            <a:lumMod val="75000"/>
+          </a:schemeClr>
+        </a:solidFill>
+        <a:effectLst/>
+      </p:bgPr>
+    </p:bg>
+    <p:spTree>
+      <p:nvGrpSpPr>
+        <p:cNvPr id="1" name="">
+          <a:extLst>
+            <a:ext uri="{FF2B5EF4-FFF2-40B4-BE49-F238E27FC236}">
+              <a16:creationId xmlns:a16="http://schemas.microsoft.com/office/drawing/2014/main" id="{E2160DB5-C3E0-4D1A-D632-50D463514973}"/>
+            </a:ext>
+          </a:extLst>
+        </p:cNvPr>
+        <p:cNvGrpSpPr/>
+        <p:nvPr/>
+      </p:nvGrpSpPr>
+      <p:grpSpPr>
+        <a:xfrm>
+          <a:off x="0" y="0"/>
+          <a:ext cx="0" cy="0"/>
+          <a:chOff x="0" y="0"/>
+          <a:chExt cx="0" cy="0"/>
+        </a:xfrm>
+      </p:grpSpPr>
+      <p:sp>
+        <p:nvSpPr>
+          <p:cNvPr id="3" name="TextBox 2">
+            <a:extLst>
+              <a:ext uri="{FF2B5EF4-FFF2-40B4-BE49-F238E27FC236}">
+                <a16:creationId xmlns:a16="http://schemas.microsoft.com/office/drawing/2014/main" id="{1C26C62D-7736-8E32-2FB7-75176005F503}"/>
+              </a:ext>
+            </a:extLst>
+          </p:cNvPr>
+          <p:cNvSpPr txBox="1"/>
+          <p:nvPr/>
+        </p:nvSpPr>
+        <p:spPr>
+          <a:xfrm>
+            <a:off x="693349" y="555523"/>
+            <a:ext cx="5963264" cy="584775"/>
+          </a:xfrm>
+          <a:prstGeom prst="rect">
+            <a:avLst/>
+          </a:prstGeom>
+          <a:noFill/>
+        </p:spPr>
+        <p:txBody>
+          <a:bodyPr wrap="square" rtlCol="0">
+            <a:spAutoFit/>
+          </a:bodyPr>
+          <a:lstStyle/>
+          <a:p>
+            <a:r>
+              <a:rPr lang="en-US" sz="3200" dirty="0">
+                <a:solidFill>
+                  <a:schemeClr val="accent6">
+                    <a:lumMod val="60000"/>
+                    <a:lumOff val="40000"/>
+                  </a:schemeClr>
+                </a:solidFill>
+                <a:latin typeface="Aptos ExtraBold" panose="020F0502020204030204" pitchFamily="34" charset="0"/>
+              </a:rPr>
+              <a:t>Advantageous…</a:t>
+            </a:r>
+            <a:endParaRPr lang="en-GB" sz="3200" dirty="0">
+              <a:solidFill>
+                <a:schemeClr val="accent6">
+                  <a:lumMod val="60000"/>
+                  <a:lumOff val="40000"/>
+                </a:schemeClr>
+              </a:solidFill>
+              <a:latin typeface="Aptos ExtraBold" panose="020F0502020204030204" pitchFamily="34" charset="0"/>
+            </a:endParaRPr>
+          </a:p>
+        </p:txBody>
+      </p:sp>
+      <p:sp>
+        <p:nvSpPr>
+          <p:cNvPr id="4" name="TextBox 3">
+            <a:extLst>
+              <a:ext uri="{FF2B5EF4-FFF2-40B4-BE49-F238E27FC236}">
+                <a16:creationId xmlns:a16="http://schemas.microsoft.com/office/drawing/2014/main" id="{8B37A620-9896-E562-9CE5-16EABC3B4A7C}"/>
+              </a:ext>
+            </a:extLst>
+          </p:cNvPr>
+          <p:cNvSpPr txBox="1"/>
+          <p:nvPr/>
+        </p:nvSpPr>
+        <p:spPr>
+          <a:xfrm>
+            <a:off x="958645" y="1612490"/>
+            <a:ext cx="8465779" cy="2308324"/>
+          </a:xfrm>
+          <a:prstGeom prst="rect">
+            <a:avLst/>
+          </a:prstGeom>
+          <a:noFill/>
+        </p:spPr>
+        <p:txBody>
+          <a:bodyPr wrap="none" rtlCol="0">
+            <a:spAutoFit/>
+          </a:bodyPr>
+          <a:lstStyle/>
+          <a:p>
+            <a:pPr marL="285750" indent="-285750">
+              <a:buFont typeface="Arial" panose="020B0604020202020204" pitchFamily="34" charset="0"/>
+              <a:buChar char="•"/>
+            </a:pPr>
+            <a:r>
+              <a:rPr lang="en-US" dirty="0">
+                <a:solidFill>
+                  <a:schemeClr val="accent4">
+                    <a:lumMod val="20000"/>
+                    <a:lumOff val="80000"/>
+                  </a:schemeClr>
+                </a:solidFill>
+              </a:rPr>
+              <a:t>Streams can be used as first class citizens in your application code</a:t>
+            </a:r>
+          </a:p>
+          <a:p>
+            <a:pPr marL="285750" indent="-285750">
+              <a:buFont typeface="Arial" panose="020B0604020202020204" pitchFamily="34" charset="0"/>
+              <a:buChar char="•"/>
+            </a:pPr>
+            <a:endParaRPr lang="en-GB" dirty="0">
+              <a:solidFill>
+                <a:schemeClr val="accent4">
+                  <a:lumMod val="20000"/>
+                  <a:lumOff val="80000"/>
+                </a:schemeClr>
+              </a:solidFill>
+            </a:endParaRPr>
+          </a:p>
+          <a:p>
+            <a:pPr marL="285750" indent="-285750">
+              <a:buFont typeface="Arial" panose="020B0604020202020204" pitchFamily="34" charset="0"/>
+              <a:buChar char="•"/>
+            </a:pPr>
+            <a:r>
+              <a:rPr lang="en-GB" dirty="0">
+                <a:solidFill>
+                  <a:schemeClr val="accent4">
+                    <a:lumMod val="20000"/>
+                    <a:lumOff val="80000"/>
+                  </a:schemeClr>
+                </a:solidFill>
+              </a:rPr>
+              <a:t>Streams of data can be aggregated and filtered with </a:t>
+            </a:r>
+            <a:r>
+              <a:rPr lang="en-GB" dirty="0" err="1">
+                <a:solidFill>
+                  <a:schemeClr val="accent4">
+                    <a:lumMod val="20000"/>
+                    <a:lumOff val="80000"/>
+                  </a:schemeClr>
+                </a:solidFill>
+              </a:rPr>
+              <a:t>Linq</a:t>
+            </a:r>
+            <a:endParaRPr lang="en-GB" dirty="0">
+              <a:solidFill>
+                <a:schemeClr val="accent4">
+                  <a:lumMod val="20000"/>
+                  <a:lumOff val="80000"/>
+                </a:schemeClr>
+              </a:solidFill>
+            </a:endParaRPr>
+          </a:p>
+          <a:p>
+            <a:pPr marL="285750" indent="-285750">
+              <a:buFont typeface="Arial" panose="020B0604020202020204" pitchFamily="34" charset="0"/>
+              <a:buChar char="•"/>
+            </a:pPr>
+            <a:endParaRPr lang="en-GB" dirty="0">
+              <a:solidFill>
+                <a:schemeClr val="accent4">
+                  <a:lumMod val="20000"/>
+                  <a:lumOff val="80000"/>
+                </a:schemeClr>
+              </a:solidFill>
+            </a:endParaRPr>
+          </a:p>
+          <a:p>
+            <a:pPr marL="285750" indent="-285750">
+              <a:buFont typeface="Arial" panose="020B0604020202020204" pitchFamily="34" charset="0"/>
+              <a:buChar char="•"/>
+            </a:pPr>
+            <a:r>
+              <a:rPr lang="en-US" dirty="0">
+                <a:solidFill>
+                  <a:schemeClr val="accent4">
+                    <a:lumMod val="20000"/>
+                    <a:lumOff val="80000"/>
+                  </a:schemeClr>
+                </a:solidFill>
+              </a:rPr>
+              <a:t>Unsubscribing from a stream using </a:t>
+            </a:r>
+            <a:r>
+              <a:rPr lang="en-US" dirty="0" err="1">
+                <a:solidFill>
+                  <a:schemeClr val="accent4">
+                    <a:lumMod val="20000"/>
+                    <a:lumOff val="80000"/>
+                  </a:schemeClr>
+                </a:solidFill>
+              </a:rPr>
+              <a:t>IDisposable</a:t>
+            </a:r>
+            <a:r>
+              <a:rPr lang="en-US" dirty="0">
+                <a:solidFill>
+                  <a:schemeClr val="accent4">
+                    <a:lumMod val="20000"/>
+                    <a:lumOff val="80000"/>
+                  </a:schemeClr>
+                </a:solidFill>
+              </a:rPr>
+              <a:t> is “cleaner” than -= </a:t>
+            </a:r>
+            <a:r>
+              <a:rPr lang="en-US" dirty="0" err="1">
+                <a:solidFill>
+                  <a:schemeClr val="accent4">
+                    <a:lumMod val="20000"/>
+                    <a:lumOff val="80000"/>
+                  </a:schemeClr>
+                </a:solidFill>
+              </a:rPr>
+              <a:t>eventhandler</a:t>
+            </a:r>
+            <a:endParaRPr lang="en-US" dirty="0">
+              <a:solidFill>
+                <a:schemeClr val="accent4">
+                  <a:lumMod val="20000"/>
+                  <a:lumOff val="80000"/>
+                </a:schemeClr>
+              </a:solidFill>
+            </a:endParaRPr>
+          </a:p>
+          <a:p>
+            <a:pPr marL="285750" indent="-285750">
+              <a:buFont typeface="Arial" panose="020B0604020202020204" pitchFamily="34" charset="0"/>
+              <a:buChar char="•"/>
+            </a:pPr>
+            <a:endParaRPr lang="en-US" dirty="0">
+              <a:solidFill>
+                <a:schemeClr val="accent4">
+                  <a:lumMod val="20000"/>
+                  <a:lumOff val="80000"/>
+                </a:schemeClr>
+              </a:solidFill>
+            </a:endParaRPr>
+          </a:p>
+          <a:p>
+            <a:pPr marL="285750" indent="-285750">
+              <a:buFont typeface="Arial" panose="020B0604020202020204" pitchFamily="34" charset="0"/>
+              <a:buChar char="•"/>
+            </a:pPr>
+            <a:r>
+              <a:rPr lang="en-GB" dirty="0">
+                <a:solidFill>
+                  <a:schemeClr val="accent1">
+                    <a:lumMod val="20000"/>
+                    <a:lumOff val="80000"/>
+                  </a:schemeClr>
+                </a:solidFill>
+              </a:rPr>
+              <a:t>Bridging into Async/Await world is seamless</a:t>
+            </a:r>
+          </a:p>
+          <a:p>
+            <a:pPr marL="285750" indent="-285750">
+              <a:buFont typeface="Arial" panose="020B0604020202020204" pitchFamily="34" charset="0"/>
+              <a:buChar char="•"/>
+            </a:pPr>
+            <a:endParaRPr lang="en-US" dirty="0">
+              <a:solidFill>
+                <a:schemeClr val="accent4">
+                  <a:lumMod val="20000"/>
+                  <a:lumOff val="80000"/>
+                </a:schemeClr>
+              </a:solidFill>
+            </a:endParaRPr>
+          </a:p>
+        </p:txBody>
+      </p:sp>
+    </p:spTree>
+    <p:extLst>
+      <p:ext uri="{BB962C8B-B14F-4D97-AF65-F5344CB8AC3E}">
+        <p14:creationId xmlns:p14="http://schemas.microsoft.com/office/powerpoint/2010/main" val="1211216982"/>
+      </p:ext>
+    </p:extLst>
+  </p:cSld>
+  <p:clrMapOvr>
+    <a:overrideClrMapping bg1="lt1" tx1="dk1" bg2="lt2" tx2="dk2" accent1="accent1" accent2="accent2" accent3="accent3" accent4="accent4" accent5="accent5" accent6="accent6" hlink="hlink" folHlink="folHlink"/>
+  </p:clrMapOvr>
+  <p:timing>
+    <p:tnLst>
+      <p:par>
+        <p:cTn id="1" dur="indefinite" restart="never" nodeType="tmRoot">
+          <p:childTnLst>
+            <p:seq concurrent="1" nextAc="seek">
+              <p:cTn id="2" dur="indefinite" nodeType="mainSeq">
+                <p:childTnLst>
+                  <p:par>
+                    <p:cTn id="3" fill="hold">
+                      <p:stCondLst>
+                        <p:cond delay="indefinite"/>
+                      </p:stCondLst>
+                      <p:childTnLst>
+                        <p:par>
+                          <p:cTn id="4" fill="hold">
+                            <p:stCondLst>
+                              <p:cond delay="0"/>
+                            </p:stCondLst>
+                            <p:childTnLst>
+                              <p:par>
+                                <p:cTn id="5" presetID="22" presetClass="entr" presetSubtype="4" fill="hold" grpId="0" nodeType="clickEffect">
+                                  <p:stCondLst>
+                                    <p:cond delay="0"/>
+                                  </p:stCondLst>
+                                  <p:childTnLst>
+                                    <p:set>
+                                      <p:cBhvr>
+                                        <p:cTn id="6" dur="1" fill="hold">
+                                          <p:stCondLst>
+                                            <p:cond delay="0"/>
+                                          </p:stCondLst>
+                                        </p:cTn>
+                                        <p:tgtEl>
+                                          <p:spTgt spid="3"/>
+                                        </p:tgtEl>
+                                        <p:attrNameLst>
+                                          <p:attrName>style.visibility</p:attrName>
+                                        </p:attrNameLst>
+                                      </p:cBhvr>
+                                      <p:to>
+                                        <p:strVal val="visible"/>
+                                      </p:to>
+                                    </p:set>
+                                    <p:animEffect transition="in" filter="wipe(down)">
+                                      <p:cBhvr>
+                                        <p:cTn id="7" dur="500"/>
+                                        <p:tgtEl>
+                                          <p:spTgt spid="3"/>
+                                        </p:tgtEl>
+                                      </p:cBhvr>
+                                    </p:animEffect>
+                                  </p:childTnLst>
+                                </p:cTn>
+                              </p:par>
+                            </p:childTnLst>
+                          </p:cTn>
+                        </p:par>
+                      </p:childTnLst>
+                    </p:cTn>
+                  </p:par>
+                  <p:par>
+                    <p:cTn id="8" fill="hold">
+                      <p:stCondLst>
+                        <p:cond delay="indefinite"/>
+                      </p:stCondLst>
+                      <p:childTnLst>
+                        <p:par>
+                          <p:cTn id="9" fill="hold">
+                            <p:stCondLst>
+                              <p:cond delay="0"/>
+                            </p:stCondLst>
+                            <p:childTnLst>
+                              <p:par>
+                                <p:cTn id="10" presetID="22" presetClass="entr" presetSubtype="4" fill="hold" nodeType="clickEffect">
+                                  <p:stCondLst>
+                                    <p:cond delay="0"/>
+                                  </p:stCondLst>
+                                  <p:childTnLst>
+                                    <p:set>
+                                      <p:cBhvr>
+                                        <p:cTn id="11" dur="1" fill="hold">
+                                          <p:stCondLst>
+                                            <p:cond delay="0"/>
+                                          </p:stCondLst>
+                                        </p:cTn>
+                                        <p:tgtEl>
+                                          <p:spTgt spid="4">
+                                            <p:txEl>
+                                              <p:pRg st="0" end="0"/>
+                                            </p:txEl>
+                                          </p:spTgt>
+                                        </p:tgtEl>
+                                        <p:attrNameLst>
+                                          <p:attrName>style.visibility</p:attrName>
+                                        </p:attrNameLst>
+                                      </p:cBhvr>
+                                      <p:to>
+                                        <p:strVal val="visible"/>
+                                      </p:to>
+                                    </p:set>
+                                    <p:animEffect transition="in" filter="wipe(down)">
+                                      <p:cBhvr>
+                                        <p:cTn id="12" dur="500"/>
+                                        <p:tgtEl>
+                                          <p:spTgt spid="4">
+                                            <p:txEl>
+                                              <p:pRg st="0" end="0"/>
+                                            </p:txEl>
+                                          </p:spTgt>
+                                        </p:tgtEl>
+                                      </p:cBhvr>
+                                    </p:animEffect>
+                                  </p:childTnLst>
+                                </p:cTn>
+                              </p:par>
+                            </p:childTnLst>
+                          </p:cTn>
+                        </p:par>
+                      </p:childTnLst>
+                    </p:cTn>
+                  </p:par>
+                  <p:par>
+                    <p:cTn id="13" fill="hold">
+                      <p:stCondLst>
+                        <p:cond delay="indefinite"/>
+                      </p:stCondLst>
+                      <p:childTnLst>
+                        <p:par>
+                          <p:cTn id="14" fill="hold">
+                            <p:stCondLst>
+                              <p:cond delay="0"/>
+                            </p:stCondLst>
+                            <p:childTnLst>
+                              <p:par>
+                                <p:cTn id="15" presetID="22" presetClass="entr" presetSubtype="4" fill="hold" nodeType="clickEffect">
+                                  <p:stCondLst>
+                                    <p:cond delay="0"/>
+                                  </p:stCondLst>
+                                  <p:childTnLst>
+                                    <p:set>
+                                      <p:cBhvr>
+                                        <p:cTn id="16" dur="1" fill="hold">
+                                          <p:stCondLst>
+                                            <p:cond delay="0"/>
+                                          </p:stCondLst>
+                                        </p:cTn>
+                                        <p:tgtEl>
+                                          <p:spTgt spid="4">
+                                            <p:txEl>
+                                              <p:pRg st="2" end="2"/>
+                                            </p:txEl>
+                                          </p:spTgt>
+                                        </p:tgtEl>
+                                        <p:attrNameLst>
+                                          <p:attrName>style.visibility</p:attrName>
+                                        </p:attrNameLst>
+                                      </p:cBhvr>
+                                      <p:to>
+                                        <p:strVal val="visible"/>
+                                      </p:to>
+                                    </p:set>
+                                    <p:animEffect transition="in" filter="wipe(down)">
+                                      <p:cBhvr>
+                                        <p:cTn id="17" dur="500"/>
+                                        <p:tgtEl>
+                                          <p:spTgt spid="4">
+                                            <p:txEl>
+                                              <p:pRg st="2" end="2"/>
+                                            </p:txEl>
+                                          </p:spTgt>
+                                        </p:tgtEl>
+                                      </p:cBhvr>
+                                    </p:animEffect>
+                                  </p:childTnLst>
+                                </p:cTn>
+                              </p:par>
+                            </p:childTnLst>
+                          </p:cTn>
+                        </p:par>
+                      </p:childTnLst>
+                    </p:cTn>
+                  </p:par>
+                  <p:par>
+                    <p:cTn id="18" fill="hold">
+                      <p:stCondLst>
+                        <p:cond delay="indefinite"/>
+                      </p:stCondLst>
+                      <p:childTnLst>
+                        <p:par>
+                          <p:cTn id="19" fill="hold">
+                            <p:stCondLst>
+                              <p:cond delay="0"/>
+                            </p:stCondLst>
+                            <p:childTnLst>
+                              <p:par>
+                                <p:cTn id="20" presetID="22" presetClass="entr" presetSubtype="4" fill="hold" nodeType="clickEffect">
+                                  <p:stCondLst>
+                                    <p:cond delay="0"/>
+                                  </p:stCondLst>
+                                  <p:childTnLst>
+                                    <p:set>
+                                      <p:cBhvr>
+                                        <p:cTn id="21" dur="1" fill="hold">
+                                          <p:stCondLst>
+                                            <p:cond delay="0"/>
+                                          </p:stCondLst>
+                                        </p:cTn>
+                                        <p:tgtEl>
+                                          <p:spTgt spid="4">
+                                            <p:txEl>
+                                              <p:pRg st="4" end="4"/>
+                                            </p:txEl>
+                                          </p:spTgt>
+                                        </p:tgtEl>
+                                        <p:attrNameLst>
+                                          <p:attrName>style.visibility</p:attrName>
+                                        </p:attrNameLst>
+                                      </p:cBhvr>
+                                      <p:to>
+                                        <p:strVal val="visible"/>
+                                      </p:to>
+                                    </p:set>
+                                    <p:animEffect transition="in" filter="wipe(down)">
+                                      <p:cBhvr>
+                                        <p:cTn id="22" dur="500"/>
+                                        <p:tgtEl>
+                                          <p:spTgt spid="4">
+                                            <p:txEl>
+                                              <p:pRg st="4" end="4"/>
+                                            </p:txEl>
+                                          </p:spTgt>
+                                        </p:tgtEl>
+                                      </p:cBhvr>
+                                    </p:animEffect>
+                                  </p:childTnLst>
+                                </p:cTn>
+                              </p:par>
+                            </p:childTnLst>
+                          </p:cTn>
+                        </p:par>
+                      </p:childTnLst>
+                    </p:cTn>
+                  </p:par>
+                  <p:par>
+                    <p:cTn id="23" fill="hold">
+                      <p:stCondLst>
+                        <p:cond delay="indefinite"/>
+                      </p:stCondLst>
+                      <p:childTnLst>
+                        <p:par>
+                          <p:cTn id="24" fill="hold">
+                            <p:stCondLst>
+                              <p:cond delay="0"/>
+                            </p:stCondLst>
+                            <p:childTnLst>
+                              <p:par>
+                                <p:cTn id="25" presetID="22" presetClass="entr" presetSubtype="4" fill="hold" nodeType="clickEffect">
+                                  <p:stCondLst>
+                                    <p:cond delay="0"/>
+                                  </p:stCondLst>
+                                  <p:childTnLst>
+                                    <p:set>
+                                      <p:cBhvr>
+                                        <p:cTn id="26" dur="1" fill="hold">
+                                          <p:stCondLst>
+                                            <p:cond delay="0"/>
+                                          </p:stCondLst>
+                                        </p:cTn>
+                                        <p:tgtEl>
+                                          <p:spTgt spid="4">
+                                            <p:txEl>
+                                              <p:pRg st="6" end="6"/>
+                                            </p:txEl>
+                                          </p:spTgt>
+                                        </p:tgtEl>
+                                        <p:attrNameLst>
+                                          <p:attrName>style.visibility</p:attrName>
+                                        </p:attrNameLst>
+                                      </p:cBhvr>
+                                      <p:to>
+                                        <p:strVal val="visible"/>
+                                      </p:to>
+                                    </p:set>
+                                    <p:animEffect transition="in" filter="wipe(down)">
+                                      <p:cBhvr>
+                                        <p:cTn id="27" dur="500"/>
+                                        <p:tgtEl>
+                                          <p:spTgt spid="4">
+                                            <p:txEl>
+                                              <p:pRg st="6" end="6"/>
+                                            </p:txEl>
+                                          </p:spTgt>
+                                        </p:tgtEl>
+                                      </p:cBhvr>
+                                    </p:animEffect>
+                                  </p:childTnLst>
+                                </p:cTn>
+                              </p:par>
+                            </p:childTnLst>
+                          </p:cTn>
+                        </p:par>
+                      </p:childTnLst>
+                    </p:cTn>
+                  </p:par>
+                </p:childTnLst>
+              </p:cTn>
+              <p:prevCondLst>
+                <p:cond evt="onPrev" delay="0">
+                  <p:tgtEl>
+                    <p:sldTgt/>
+                  </p:tgtEl>
+                </p:cond>
+              </p:prevCondLst>
+              <p:nextCondLst>
+                <p:cond evt="onNext" delay="0">
+                  <p:tgtEl>
+                    <p:sldTgt/>
+                  </p:tgtEl>
+                </p:cond>
+              </p:nextCondLst>
+            </p:seq>
+          </p:childTnLst>
+        </p:cTn>
+      </p:par>
+    </p:tnLst>
+    <p:bldLst>
+      <p:bldP spid="3" grpId="0"/>
+    </p:bldLst>
+  </p:timing>
+</p:sld>
+</file>
+
+<file path=ppt/slides/slide7.xml><?xml version="1.0" encoding="utf-8"?>
 <p:sld xmlns:a="http://schemas.openxmlformats.org/drawingml/2006/main" xmlns:r="http://schemas.openxmlformats.org/officeDocument/2006/relationships" xmlns:p="http://schemas.openxmlformats.org/presentationml/2006/main">
   <p:cSld>
     <p:bg>
@@ -7589,6 +7225,36 @@
           </a:p>
         </p:txBody>
       </p:sp>
+      <p:pic>
+        <p:nvPicPr>
+          <p:cNvPr id="3" name="Picture 2">
+            <a:extLst>
+              <a:ext uri="{FF2B5EF4-FFF2-40B4-BE49-F238E27FC236}">
+                <a16:creationId xmlns:a16="http://schemas.microsoft.com/office/drawing/2014/main" id="{7CB23852-D3B2-4154-5FF8-50192BC97EF0}"/>
+              </a:ext>
+            </a:extLst>
+          </p:cNvPr>
+          <p:cNvPicPr>
+            <a:picLocks noChangeAspect="1"/>
+          </p:cNvPicPr>
+          <p:nvPr/>
+        </p:nvPicPr>
+        <p:blipFill>
+          <a:blip r:embed="rId3"/>
+          <a:stretch>
+            <a:fillRect/>
+          </a:stretch>
+        </p:blipFill>
+        <p:spPr>
+          <a:xfrm>
+            <a:off x="2122776" y="3889063"/>
+            <a:ext cx="7592485" cy="1752845"/>
+          </a:xfrm>
+          <a:prstGeom prst="rect">
+            <a:avLst/>
+          </a:prstGeom>
+        </p:spPr>
+      </p:pic>
     </p:spTree>
     <p:extLst>
       <p:ext uri="{BB962C8B-B14F-4D97-AF65-F5344CB8AC3E}">
@@ -7932,7 +7598,7 @@
 </p:sld>
 </file>
 
-<file path=ppt/slides/slide9.xml><?xml version="1.0" encoding="utf-8"?>
+<file path=ppt/slides/slide8.xml><?xml version="1.0" encoding="utf-8"?>
 <p:sld xmlns:a="http://schemas.openxmlformats.org/drawingml/2006/main" xmlns:r="http://schemas.openxmlformats.org/officeDocument/2006/relationships" xmlns:p="http://schemas.openxmlformats.org/presentationml/2006/main">
   <p:cSld>
     <p:bg>
@@ -8030,8 +7696,8 @@
         </p:nvSpPr>
         <p:spPr>
           <a:xfrm>
-            <a:off x="945208" y="1582340"/>
-            <a:ext cx="4964372" cy="3139321"/>
+            <a:off x="815002" y="1145213"/>
+            <a:ext cx="4460195" cy="2585323"/>
           </a:xfrm>
           <a:prstGeom prst="rect">
             <a:avLst/>
@@ -8098,8 +7764,13 @@
             </a:pPr>
             <a:r>
               <a:rPr lang="en-GB" dirty="0"/>
-              <a:t>Multiple ways to create an observable stream</a:t>
-            </a:r>
+              <a:t>Rx is testable using </a:t>
+            </a:r>
+            <a:r>
+              <a:rPr lang="en-GB" dirty="0" err="1"/>
+              <a:t>TestSchedulers</a:t>
+            </a:r>
+            <a:endParaRPr lang="en-GB" dirty="0"/>
           </a:p>
           <a:p>
             <a:pPr marL="285750" indent="-285750">
@@ -8115,13 +7786,8 @@
             </a:pPr>
             <a:r>
               <a:rPr lang="en-GB" dirty="0"/>
-              <a:t>Rx is testable using </a:t>
-            </a:r>
-            <a:r>
-              <a:rPr lang="en-GB" dirty="0" err="1"/>
-              <a:t>TestSchedulers</a:t>
-            </a:r>
-            <a:endParaRPr lang="en-GB" dirty="0"/>
+              <a:t>Pipelines are an advanced way to use Rx</a:t>
+            </a:r>
           </a:p>
           <a:p>
             <a:pPr marL="285750" indent="-285750">
@@ -8135,27 +7801,40 @@
               <a:buFont typeface="Arial" panose="020B0604020202020204" pitchFamily="34" charset="0"/>
               <a:buChar char="•"/>
             </a:pPr>
-            <a:r>
-              <a:rPr lang="en-GB" dirty="0"/>
-              <a:t>Pipelines are an advanced way to use Rx</a:t>
-            </a:r>
-          </a:p>
-          <a:p>
-            <a:pPr marL="285750" indent="-285750">
-              <a:buFont typeface="Arial" panose="020B0604020202020204" pitchFamily="34" charset="0"/>
-              <a:buChar char="•"/>
-            </a:pPr>
-            <a:endParaRPr lang="en-GB" dirty="0"/>
-          </a:p>
-          <a:p>
-            <a:pPr marL="285750" indent="-285750">
-              <a:buFont typeface="Arial" panose="020B0604020202020204" pitchFamily="34" charset="0"/>
-              <a:buChar char="•"/>
-            </a:pPr>
             <a:endParaRPr lang="en-GB" dirty="0"/>
           </a:p>
         </p:txBody>
       </p:sp>
+      <p:pic>
+        <p:nvPicPr>
+          <p:cNvPr id="5" name="Picture 4">
+            <a:extLst>
+              <a:ext uri="{FF2B5EF4-FFF2-40B4-BE49-F238E27FC236}">
+                <a16:creationId xmlns:a16="http://schemas.microsoft.com/office/drawing/2014/main" id="{F3EE665A-D36E-7416-F1D4-7D6BDDA5AAC9}"/>
+              </a:ext>
+            </a:extLst>
+          </p:cNvPr>
+          <p:cNvPicPr>
+            <a:picLocks noChangeAspect="1"/>
+          </p:cNvPicPr>
+          <p:nvPr/>
+        </p:nvPicPr>
+        <p:blipFill>
+          <a:blip r:embed="rId3"/>
+          <a:stretch>
+            <a:fillRect/>
+          </a:stretch>
+        </p:blipFill>
+        <p:spPr>
+          <a:xfrm>
+            <a:off x="2565143" y="3392032"/>
+            <a:ext cx="8811855" cy="2905530"/>
+          </a:xfrm>
+          <a:prstGeom prst="rect">
+            <a:avLst/>
+          </a:prstGeom>
+        </p:spPr>
+      </p:pic>
     </p:spTree>
     <p:extLst>
       <p:ext uri="{BB962C8B-B14F-4D97-AF65-F5344CB8AC3E}">
@@ -8471,37 +8150,213 @@
                       </p:childTnLst>
                     </p:cTn>
                   </p:par>
+                </p:childTnLst>
+              </p:cTn>
+              <p:prevCondLst>
+                <p:cond evt="onPrev" delay="0">
+                  <p:tgtEl>
+                    <p:sldTgt/>
+                  </p:tgtEl>
+                </p:cond>
+              </p:prevCondLst>
+              <p:nextCondLst>
+                <p:cond evt="onNext" delay="0">
+                  <p:tgtEl>
+                    <p:sldTgt/>
+                  </p:tgtEl>
+                </p:cond>
+              </p:nextCondLst>
+            </p:seq>
+          </p:childTnLst>
+        </p:cTn>
+      </p:par>
+    </p:tnLst>
+    <p:bldLst>
+      <p:bldP spid="2" grpId="0"/>
+    </p:bldLst>
+  </p:timing>
+</p:sld>
+</file>
+
+<file path=ppt/slides/slide9.xml><?xml version="1.0" encoding="utf-8"?>
+<p:sld xmlns:a="http://schemas.openxmlformats.org/drawingml/2006/main" xmlns:r="http://schemas.openxmlformats.org/officeDocument/2006/relationships" xmlns:p="http://schemas.openxmlformats.org/presentationml/2006/main">
+  <p:cSld>
+    <p:bg>
+      <p:bgPr>
+        <a:solidFill>
+          <a:schemeClr val="accent1">
+            <a:lumMod val="75000"/>
+          </a:schemeClr>
+        </a:solidFill>
+        <a:effectLst/>
+      </p:bgPr>
+    </p:bg>
+    <p:spTree>
+      <p:nvGrpSpPr>
+        <p:cNvPr id="1" name="">
+          <a:extLst>
+            <a:ext uri="{FF2B5EF4-FFF2-40B4-BE49-F238E27FC236}">
+              <a16:creationId xmlns:a16="http://schemas.microsoft.com/office/drawing/2014/main" id="{4B5FAEAB-6D7A-94CB-661D-B72FA66469B8}"/>
+            </a:ext>
+          </a:extLst>
+        </p:cNvPr>
+        <p:cNvGrpSpPr/>
+        <p:nvPr/>
+      </p:nvGrpSpPr>
+      <p:grpSpPr>
+        <a:xfrm>
+          <a:off x="0" y="0"/>
+          <a:ext cx="0" cy="0"/>
+          <a:chOff x="0" y="0"/>
+          <a:chExt cx="0" cy="0"/>
+        </a:xfrm>
+      </p:grpSpPr>
+      <p:sp>
+        <p:nvSpPr>
+          <p:cNvPr id="6" name="TextBox 5">
+            <a:extLst>
+              <a:ext uri="{FF2B5EF4-FFF2-40B4-BE49-F238E27FC236}">
+                <a16:creationId xmlns:a16="http://schemas.microsoft.com/office/drawing/2014/main" id="{7216CDF6-4A52-A8AB-30E9-0EBF0A8A7251}"/>
+              </a:ext>
+            </a:extLst>
+          </p:cNvPr>
+          <p:cNvSpPr txBox="1"/>
+          <p:nvPr/>
+        </p:nvSpPr>
+        <p:spPr>
+          <a:xfrm>
+            <a:off x="688259" y="637010"/>
+            <a:ext cx="4178710" cy="584775"/>
+          </a:xfrm>
+          <a:prstGeom prst="rect">
+            <a:avLst/>
+          </a:prstGeom>
+          <a:noFill/>
+        </p:spPr>
+        <p:txBody>
+          <a:bodyPr wrap="square" rtlCol="0">
+            <a:spAutoFit/>
+          </a:bodyPr>
+          <a:lstStyle>
+            <a:defPPr>
+              <a:defRPr lang="en-US"/>
+            </a:defPPr>
+            <a:lvl1pPr>
+              <a:defRPr sz="3200">
+                <a:solidFill>
+                  <a:schemeClr val="accent6">
+                    <a:lumMod val="60000"/>
+                    <a:lumOff val="40000"/>
+                  </a:schemeClr>
+                </a:solidFill>
+                <a:latin typeface="Aptos ExtraBold" panose="020F0502020204030204" pitchFamily="34" charset="0"/>
+              </a:defRPr>
+            </a:lvl1pPr>
+          </a:lstStyle>
+          <a:p>
+            <a:r>
+              <a:rPr lang="en-US" dirty="0"/>
+              <a:t>Resources</a:t>
+            </a:r>
+            <a:endParaRPr lang="en-GB" dirty="0"/>
+          </a:p>
+        </p:txBody>
+      </p:sp>
+      <p:sp>
+        <p:nvSpPr>
+          <p:cNvPr id="9" name="TextBox 8">
+            <a:extLst>
+              <a:ext uri="{FF2B5EF4-FFF2-40B4-BE49-F238E27FC236}">
+                <a16:creationId xmlns:a16="http://schemas.microsoft.com/office/drawing/2014/main" id="{1C55003B-7BC8-4072-0C21-2A71E3D40044}"/>
+              </a:ext>
+            </a:extLst>
+          </p:cNvPr>
+          <p:cNvSpPr txBox="1"/>
+          <p:nvPr/>
+        </p:nvSpPr>
+        <p:spPr>
+          <a:xfrm>
+            <a:off x="875071" y="1678797"/>
+            <a:ext cx="3628044" cy="369332"/>
+          </a:xfrm>
+          <a:prstGeom prst="rect">
+            <a:avLst/>
+          </a:prstGeom>
+          <a:noFill/>
+        </p:spPr>
+        <p:txBody>
+          <a:bodyPr wrap="none" rtlCol="0">
+            <a:spAutoFit/>
+          </a:bodyPr>
+          <a:lstStyle>
+            <a:defPPr>
+              <a:defRPr lang="en-US"/>
+            </a:defPPr>
+            <a:lvl1pPr>
+              <a:defRPr>
+                <a:solidFill>
+                  <a:schemeClr val="accent4">
+                    <a:lumMod val="20000"/>
+                    <a:lumOff val="80000"/>
+                  </a:schemeClr>
+                </a:solidFill>
+              </a:defRPr>
+            </a:lvl1pPr>
+          </a:lstStyle>
+          <a:p>
+            <a:r>
+              <a:rPr lang="en-US" dirty="0"/>
+              <a:t>https://github.com/dotnet/reactive</a:t>
+            </a:r>
+            <a:endParaRPr lang="en-GB" dirty="0"/>
+          </a:p>
+        </p:txBody>
+      </p:sp>
+    </p:spTree>
+    <p:extLst>
+      <p:ext uri="{BB962C8B-B14F-4D97-AF65-F5344CB8AC3E}">
+        <p14:creationId xmlns:p14="http://schemas.microsoft.com/office/powerpoint/2010/main" val="1573345551"/>
+      </p:ext>
+    </p:extLst>
+  </p:cSld>
+  <p:clrMapOvr>
+    <a:overrideClrMapping bg1="lt1" tx1="dk1" bg2="lt2" tx2="dk2" accent1="accent1" accent2="accent2" accent3="accent3" accent4="accent4" accent5="accent5" accent6="accent6" hlink="hlink" folHlink="folHlink"/>
+  </p:clrMapOvr>
+  <p:timing>
+    <p:tnLst>
+      <p:par>
+        <p:cTn id="1" dur="indefinite" restart="never" nodeType="tmRoot">
+          <p:childTnLst>
+            <p:seq concurrent="1" nextAc="seek">
+              <p:cTn id="2" dur="indefinite" nodeType="mainSeq">
+                <p:childTnLst>
                   <p:par>
-                    <p:cTn id="28" fill="hold">
+                    <p:cTn id="3" fill="hold">
                       <p:stCondLst>
                         <p:cond delay="indefinite"/>
                       </p:stCondLst>
                       <p:childTnLst>
                         <p:par>
-                          <p:cTn id="29" fill="hold">
+                          <p:cTn id="4" fill="hold">
                             <p:stCondLst>
                               <p:cond delay="0"/>
                             </p:stCondLst>
                             <p:childTnLst>
                               <p:par>
-                                <p:cTn id="30" presetID="22" presetClass="entr" presetSubtype="4" fill="hold" nodeType="clickEffect">
+                                <p:cTn id="5" presetID="22" presetClass="entr" presetSubtype="4" fill="hold" grpId="0" nodeType="clickEffect">
                                   <p:stCondLst>
                                     <p:cond delay="0"/>
                                   </p:stCondLst>
                                   <p:childTnLst>
                                     <p:set>
                                       <p:cBhvr>
-                                        <p:cTn id="31" dur="1" fill="hold">
+                                        <p:cTn id="6" dur="1" fill="hold">
                                           <p:stCondLst>
                                             <p:cond delay="0"/>
                                           </p:stCondLst>
                                         </p:cTn>
                                         <p:tgtEl>
-                                          <p:spTgt spid="3">
-                                            <p:txEl>
-                                              <p:pRg st="8" end="8"/>
-                                            </p:txEl>
-                                          </p:spTgt>
+                                          <p:spTgt spid="6"/>
                                         </p:tgtEl>
                                         <p:attrNameLst>
                                           <p:attrName>style.visibility</p:attrName>
@@ -8513,13 +8368,62 @@
                                     </p:set>
                                     <p:animEffect transition="in" filter="wipe(down)">
                                       <p:cBhvr>
-                                        <p:cTn id="32" dur="500"/>
+                                        <p:cTn id="7" dur="500"/>
                                         <p:tgtEl>
-                                          <p:spTgt spid="3">
-                                            <p:txEl>
-                                              <p:pRg st="8" end="8"/>
-                                            </p:txEl>
-                                          </p:spTgt>
+                                          <p:spTgt spid="6"/>
+                                        </p:tgtEl>
+                                      </p:cBhvr>
+                                    </p:animEffect>
+                                  </p:childTnLst>
+                                </p:cTn>
+                              </p:par>
+                            </p:childTnLst>
+                          </p:cTn>
+                        </p:par>
+                      </p:childTnLst>
+                    </p:cTn>
+                  </p:par>
+                  <p:par>
+                    <p:cTn id="8" fill="hold">
+                      <p:stCondLst>
+                        <p:cond delay="indefinite"/>
+                      </p:stCondLst>
+                      <p:childTnLst>
+                        <p:par>
+                          <p:cTn id="9" fill="hold">
+                            <p:stCondLst>
+                              <p:cond delay="0"/>
+                            </p:stCondLst>
+                            <p:childTnLst>
+                              <p:par>
+                                <p:cTn id="10" presetID="22" presetClass="entr" presetSubtype="4" fill="hold" grpId="0" nodeType="clickEffect">
+                                  <p:stCondLst>
+                                    <p:cond delay="0"/>
+                                  </p:stCondLst>
+                                  <p:childTnLst>
+                                    <p:set>
+                                      <p:cBhvr>
+                                        <p:cTn id="11" dur="1" fill="hold">
+                                          <p:stCondLst>
+                                            <p:cond delay="0"/>
+                                          </p:stCondLst>
+                                        </p:cTn>
+                                        <p:tgtEl>
+                                          <p:spTgt spid="9"/>
+                                        </p:tgtEl>
+                                        <p:attrNameLst>
+                                          <p:attrName>style.visibility</p:attrName>
+                                        </p:attrNameLst>
+                                      </p:cBhvr>
+                                      <p:to>
+                                        <p:strVal val="visible"/>
+                                      </p:to>
+                                    </p:set>
+                                    <p:animEffect transition="in" filter="wipe(down)">
+                                      <p:cBhvr>
+                                        <p:cTn id="12" dur="500"/>
+                                        <p:tgtEl>
+                                          <p:spTgt spid="9"/>
                                         </p:tgtEl>
                                       </p:cBhvr>
                                     </p:animEffect>
@@ -8554,7 +8458,8 @@
       </p:par>
     </p:tnLst>
     <p:bldLst>
-      <p:bldP spid="2" grpId="0"/>
+      <p:bldP spid="6" grpId="0"/>
+      <p:bldP spid="9" grpId="0"/>
     </p:bldLst>
   </p:timing>
 </p:sld>
@@ -9217,47 +9122,4 @@
     </a:folHlink>
   </a:clrScheme>
 </a:themeOverride>
-</file>
-
-<file path=ppt/theme/themeOverride9.xml><?xml version="1.0" encoding="utf-8"?>
-<a:themeOverride xmlns:a="http://schemas.openxmlformats.org/drawingml/2006/main">
-  <a:clrScheme name="Office">
-    <a:dk1>
-      <a:sysClr val="windowText" lastClr="000000"/>
-    </a:dk1>
-    <a:lt1>
-      <a:sysClr val="window" lastClr="FFFFFF"/>
-    </a:lt1>
-    <a:dk2>
-      <a:srgbClr val="0E2841"/>
-    </a:dk2>
-    <a:lt2>
-      <a:srgbClr val="E8E8E8"/>
-    </a:lt2>
-    <a:accent1>
-      <a:srgbClr val="156082"/>
-    </a:accent1>
-    <a:accent2>
-      <a:srgbClr val="E97132"/>
-    </a:accent2>
-    <a:accent3>
-      <a:srgbClr val="196B24"/>
-    </a:accent3>
-    <a:accent4>
-      <a:srgbClr val="0F9ED5"/>
-    </a:accent4>
-    <a:accent5>
-      <a:srgbClr val="A02B93"/>
-    </a:accent5>
-    <a:accent6>
-      <a:srgbClr val="4EA72E"/>
-    </a:accent6>
-    <a:hlink>
-      <a:srgbClr val="467886"/>
-    </a:hlink>
-    <a:folHlink>
-      <a:srgbClr val="96607D"/>
-    </a:folHlink>
-  </a:clrScheme>
-</a:themeOverride>
 </file>
</xml_diff>

<commit_message>
slide updates and sample update
</commit_message>
<xml_diff>
--- a/Resources/RxTalk2025.pptx
+++ b/Resources/RxTalk2025.pptx
@@ -8,11 +8,11 @@
     <p:sldId id="256" r:id="rId2"/>
     <p:sldId id="259" r:id="rId3"/>
     <p:sldId id="260" r:id="rId4"/>
-    <p:sldId id="261" r:id="rId5"/>
-    <p:sldId id="263" r:id="rId6"/>
-    <p:sldId id="265" r:id="rId7"/>
-    <p:sldId id="266" r:id="rId8"/>
-    <p:sldId id="262" r:id="rId9"/>
+    <p:sldId id="262" r:id="rId5"/>
+    <p:sldId id="261" r:id="rId6"/>
+    <p:sldId id="263" r:id="rId7"/>
+    <p:sldId id="265" r:id="rId8"/>
+    <p:sldId id="266" r:id="rId9"/>
     <p:sldId id="264" r:id="rId10"/>
   </p:sldIdLst>
   <p:sldSz cx="12192000" cy="6858000"/>
@@ -277,7 +277,7 @@
           <a:p>
             <a:fld id="{EFF44229-A086-4726-81AF-0BB09E11BB98}" type="datetimeFigureOut">
               <a:rPr lang="en-GB" smtClean="0"/>
-              <a:t>14/04/2025</a:t>
+              <a:t>15/04/2025</a:t>
             </a:fld>
             <a:endParaRPr lang="en-GB"/>
           </a:p>
@@ -477,7 +477,7 @@
           <a:p>
             <a:fld id="{EFF44229-A086-4726-81AF-0BB09E11BB98}" type="datetimeFigureOut">
               <a:rPr lang="en-GB" smtClean="0"/>
-              <a:t>14/04/2025</a:t>
+              <a:t>15/04/2025</a:t>
             </a:fld>
             <a:endParaRPr lang="en-GB"/>
           </a:p>
@@ -687,7 +687,7 @@
           <a:p>
             <a:fld id="{EFF44229-A086-4726-81AF-0BB09E11BB98}" type="datetimeFigureOut">
               <a:rPr lang="en-GB" smtClean="0"/>
-              <a:t>14/04/2025</a:t>
+              <a:t>15/04/2025</a:t>
             </a:fld>
             <a:endParaRPr lang="en-GB"/>
           </a:p>
@@ -887,7 +887,7 @@
           <a:p>
             <a:fld id="{EFF44229-A086-4726-81AF-0BB09E11BB98}" type="datetimeFigureOut">
               <a:rPr lang="en-GB" smtClean="0"/>
-              <a:t>14/04/2025</a:t>
+              <a:t>15/04/2025</a:t>
             </a:fld>
             <a:endParaRPr lang="en-GB"/>
           </a:p>
@@ -1163,7 +1163,7 @@
           <a:p>
             <a:fld id="{EFF44229-A086-4726-81AF-0BB09E11BB98}" type="datetimeFigureOut">
               <a:rPr lang="en-GB" smtClean="0"/>
-              <a:t>14/04/2025</a:t>
+              <a:t>15/04/2025</a:t>
             </a:fld>
             <a:endParaRPr lang="en-GB"/>
           </a:p>
@@ -1431,7 +1431,7 @@
           <a:p>
             <a:fld id="{EFF44229-A086-4726-81AF-0BB09E11BB98}" type="datetimeFigureOut">
               <a:rPr lang="en-GB" smtClean="0"/>
-              <a:t>14/04/2025</a:t>
+              <a:t>15/04/2025</a:t>
             </a:fld>
             <a:endParaRPr lang="en-GB"/>
           </a:p>
@@ -1846,7 +1846,7 @@
           <a:p>
             <a:fld id="{EFF44229-A086-4726-81AF-0BB09E11BB98}" type="datetimeFigureOut">
               <a:rPr lang="en-GB" smtClean="0"/>
-              <a:t>14/04/2025</a:t>
+              <a:t>15/04/2025</a:t>
             </a:fld>
             <a:endParaRPr lang="en-GB"/>
           </a:p>
@@ -1988,7 +1988,7 @@
           <a:p>
             <a:fld id="{EFF44229-A086-4726-81AF-0BB09E11BB98}" type="datetimeFigureOut">
               <a:rPr lang="en-GB" smtClean="0"/>
-              <a:t>14/04/2025</a:t>
+              <a:t>15/04/2025</a:t>
             </a:fld>
             <a:endParaRPr lang="en-GB"/>
           </a:p>
@@ -2101,7 +2101,7 @@
           <a:p>
             <a:fld id="{EFF44229-A086-4726-81AF-0BB09E11BB98}" type="datetimeFigureOut">
               <a:rPr lang="en-GB" smtClean="0"/>
-              <a:t>14/04/2025</a:t>
+              <a:t>15/04/2025</a:t>
             </a:fld>
             <a:endParaRPr lang="en-GB"/>
           </a:p>
@@ -2414,7 +2414,7 @@
           <a:p>
             <a:fld id="{EFF44229-A086-4726-81AF-0BB09E11BB98}" type="datetimeFigureOut">
               <a:rPr lang="en-GB" smtClean="0"/>
-              <a:t>14/04/2025</a:t>
+              <a:t>15/04/2025</a:t>
             </a:fld>
             <a:endParaRPr lang="en-GB"/>
           </a:p>
@@ -2703,7 +2703,7 @@
           <a:p>
             <a:fld id="{EFF44229-A086-4726-81AF-0BB09E11BB98}" type="datetimeFigureOut">
               <a:rPr lang="en-GB" smtClean="0"/>
-              <a:t>14/04/2025</a:t>
+              <a:t>15/04/2025</a:t>
             </a:fld>
             <a:endParaRPr lang="en-GB"/>
           </a:p>
@@ -2946,7 +2946,7 @@
           <a:p>
             <a:fld id="{EFF44229-A086-4726-81AF-0BB09E11BB98}" type="datetimeFigureOut">
               <a:rPr lang="en-GB" smtClean="0"/>
-              <a:t>14/04/2025</a:t>
+              <a:t>15/04/2025</a:t>
             </a:fld>
             <a:endParaRPr lang="en-GB"/>
           </a:p>
@@ -4241,455 +4241,6 @@
       </p:transition>
     </mc:Fallback>
   </mc:AlternateContent>
-  <p:timing>
-    <p:tnLst>
-      <p:par>
-        <p:cTn id="1" dur="indefinite" restart="never" nodeType="tmRoot">
-          <p:childTnLst>
-            <p:seq concurrent="1" nextAc="seek">
-              <p:cTn id="2" dur="indefinite" nodeType="mainSeq">
-                <p:childTnLst>
-                  <p:par>
-                    <p:cTn id="3" fill="hold">
-                      <p:stCondLst>
-                        <p:cond delay="indefinite"/>
-                      </p:stCondLst>
-                      <p:childTnLst>
-                        <p:par>
-                          <p:cTn id="4" fill="hold">
-                            <p:stCondLst>
-                              <p:cond delay="0"/>
-                            </p:stCondLst>
-                            <p:childTnLst>
-                              <p:par>
-                                <p:cTn id="5" presetID="6" presetClass="entr" presetSubtype="16" fill="hold" grpId="0" nodeType="clickEffect">
-                                  <p:stCondLst>
-                                    <p:cond delay="0"/>
-                                  </p:stCondLst>
-                                  <p:childTnLst>
-                                    <p:set>
-                                      <p:cBhvr>
-                                        <p:cTn id="6" dur="1" fill="hold">
-                                          <p:stCondLst>
-                                            <p:cond delay="0"/>
-                                          </p:stCondLst>
-                                        </p:cTn>
-                                        <p:tgtEl>
-                                          <p:spTgt spid="2"/>
-                                        </p:tgtEl>
-                                        <p:attrNameLst>
-                                          <p:attrName>style.visibility</p:attrName>
-                                        </p:attrNameLst>
-                                      </p:cBhvr>
-                                      <p:to>
-                                        <p:strVal val="visible"/>
-                                      </p:to>
-                                    </p:set>
-                                    <p:animEffect transition="in" filter="circle(in)">
-                                      <p:cBhvr>
-                                        <p:cTn id="7" dur="2000"/>
-                                        <p:tgtEl>
-                                          <p:spTgt spid="2"/>
-                                        </p:tgtEl>
-                                      </p:cBhvr>
-                                    </p:animEffect>
-                                  </p:childTnLst>
-                                </p:cTn>
-                              </p:par>
-                            </p:childTnLst>
-                          </p:cTn>
-                        </p:par>
-                      </p:childTnLst>
-                    </p:cTn>
-                  </p:par>
-                  <p:par>
-                    <p:cTn id="8" fill="hold">
-                      <p:stCondLst>
-                        <p:cond delay="indefinite"/>
-                      </p:stCondLst>
-                      <p:childTnLst>
-                        <p:par>
-                          <p:cTn id="9" fill="hold">
-                            <p:stCondLst>
-                              <p:cond delay="0"/>
-                            </p:stCondLst>
-                            <p:childTnLst>
-                              <p:par>
-                                <p:cTn id="10" presetID="22" presetClass="entr" presetSubtype="4" fill="hold" nodeType="clickEffect">
-                                  <p:stCondLst>
-                                    <p:cond delay="0"/>
-                                  </p:stCondLst>
-                                  <p:childTnLst>
-                                    <p:set>
-                                      <p:cBhvr>
-                                        <p:cTn id="11" dur="1" fill="hold">
-                                          <p:stCondLst>
-                                            <p:cond delay="0"/>
-                                          </p:stCondLst>
-                                        </p:cTn>
-                                        <p:tgtEl>
-                                          <p:spTgt spid="3">
-                                            <p:txEl>
-                                              <p:pRg st="0" end="0"/>
-                                            </p:txEl>
-                                          </p:spTgt>
-                                        </p:tgtEl>
-                                        <p:attrNameLst>
-                                          <p:attrName>style.visibility</p:attrName>
-                                        </p:attrNameLst>
-                                      </p:cBhvr>
-                                      <p:to>
-                                        <p:strVal val="visible"/>
-                                      </p:to>
-                                    </p:set>
-                                    <p:animEffect transition="in" filter="wipe(down)">
-                                      <p:cBhvr>
-                                        <p:cTn id="12" dur="500"/>
-                                        <p:tgtEl>
-                                          <p:spTgt spid="3">
-                                            <p:txEl>
-                                              <p:pRg st="0" end="0"/>
-                                            </p:txEl>
-                                          </p:spTgt>
-                                        </p:tgtEl>
-                                      </p:cBhvr>
-                                    </p:animEffect>
-                                  </p:childTnLst>
-                                </p:cTn>
-                              </p:par>
-                            </p:childTnLst>
-                          </p:cTn>
-                        </p:par>
-                      </p:childTnLst>
-                    </p:cTn>
-                  </p:par>
-                  <p:par>
-                    <p:cTn id="13" fill="hold">
-                      <p:stCondLst>
-                        <p:cond delay="indefinite"/>
-                      </p:stCondLst>
-                      <p:childTnLst>
-                        <p:par>
-                          <p:cTn id="14" fill="hold">
-                            <p:stCondLst>
-                              <p:cond delay="0"/>
-                            </p:stCondLst>
-                            <p:childTnLst>
-                              <p:par>
-                                <p:cTn id="15" presetID="22" presetClass="entr" presetSubtype="4" fill="hold" nodeType="clickEffect">
-                                  <p:stCondLst>
-                                    <p:cond delay="0"/>
-                                  </p:stCondLst>
-                                  <p:childTnLst>
-                                    <p:set>
-                                      <p:cBhvr>
-                                        <p:cTn id="16" dur="1" fill="hold">
-                                          <p:stCondLst>
-                                            <p:cond delay="0"/>
-                                          </p:stCondLst>
-                                        </p:cTn>
-                                        <p:tgtEl>
-                                          <p:spTgt spid="3">
-                                            <p:txEl>
-                                              <p:pRg st="2" end="2"/>
-                                            </p:txEl>
-                                          </p:spTgt>
-                                        </p:tgtEl>
-                                        <p:attrNameLst>
-                                          <p:attrName>style.visibility</p:attrName>
-                                        </p:attrNameLst>
-                                      </p:cBhvr>
-                                      <p:to>
-                                        <p:strVal val="visible"/>
-                                      </p:to>
-                                    </p:set>
-                                    <p:animEffect transition="in" filter="wipe(down)">
-                                      <p:cBhvr>
-                                        <p:cTn id="17" dur="500"/>
-                                        <p:tgtEl>
-                                          <p:spTgt spid="3">
-                                            <p:txEl>
-                                              <p:pRg st="2" end="2"/>
-                                            </p:txEl>
-                                          </p:spTgt>
-                                        </p:tgtEl>
-                                      </p:cBhvr>
-                                    </p:animEffect>
-                                  </p:childTnLst>
-                                </p:cTn>
-                              </p:par>
-                            </p:childTnLst>
-                          </p:cTn>
-                        </p:par>
-                      </p:childTnLst>
-                    </p:cTn>
-                  </p:par>
-                  <p:par>
-                    <p:cTn id="18" fill="hold">
-                      <p:stCondLst>
-                        <p:cond delay="indefinite"/>
-                      </p:stCondLst>
-                      <p:childTnLst>
-                        <p:par>
-                          <p:cTn id="19" fill="hold">
-                            <p:stCondLst>
-                              <p:cond delay="0"/>
-                            </p:stCondLst>
-                            <p:childTnLst>
-                              <p:par>
-                                <p:cTn id="20" presetID="22" presetClass="entr" presetSubtype="4" fill="hold" nodeType="clickEffect">
-                                  <p:stCondLst>
-                                    <p:cond delay="0"/>
-                                  </p:stCondLst>
-                                  <p:childTnLst>
-                                    <p:set>
-                                      <p:cBhvr>
-                                        <p:cTn id="21" dur="1" fill="hold">
-                                          <p:stCondLst>
-                                            <p:cond delay="0"/>
-                                          </p:stCondLst>
-                                        </p:cTn>
-                                        <p:tgtEl>
-                                          <p:spTgt spid="3">
-                                            <p:txEl>
-                                              <p:pRg st="4" end="4"/>
-                                            </p:txEl>
-                                          </p:spTgt>
-                                        </p:tgtEl>
-                                        <p:attrNameLst>
-                                          <p:attrName>style.visibility</p:attrName>
-                                        </p:attrNameLst>
-                                      </p:cBhvr>
-                                      <p:to>
-                                        <p:strVal val="visible"/>
-                                      </p:to>
-                                    </p:set>
-                                    <p:animEffect transition="in" filter="wipe(down)">
-                                      <p:cBhvr>
-                                        <p:cTn id="22" dur="500"/>
-                                        <p:tgtEl>
-                                          <p:spTgt spid="3">
-                                            <p:txEl>
-                                              <p:pRg st="4" end="4"/>
-                                            </p:txEl>
-                                          </p:spTgt>
-                                        </p:tgtEl>
-                                      </p:cBhvr>
-                                    </p:animEffect>
-                                  </p:childTnLst>
-                                </p:cTn>
-                              </p:par>
-                            </p:childTnLst>
-                          </p:cTn>
-                        </p:par>
-                      </p:childTnLst>
-                    </p:cTn>
-                  </p:par>
-                  <p:par>
-                    <p:cTn id="23" fill="hold">
-                      <p:stCondLst>
-                        <p:cond delay="indefinite"/>
-                      </p:stCondLst>
-                      <p:childTnLst>
-                        <p:par>
-                          <p:cTn id="24" fill="hold">
-                            <p:stCondLst>
-                              <p:cond delay="0"/>
-                            </p:stCondLst>
-                            <p:childTnLst>
-                              <p:par>
-                                <p:cTn id="25" presetID="22" presetClass="entr" presetSubtype="4" fill="hold" grpId="0" nodeType="clickEffect">
-                                  <p:stCondLst>
-                                    <p:cond delay="0"/>
-                                  </p:stCondLst>
-                                  <p:childTnLst>
-                                    <p:set>
-                                      <p:cBhvr>
-                                        <p:cTn id="26" dur="1" fill="hold">
-                                          <p:stCondLst>
-                                            <p:cond delay="0"/>
-                                          </p:stCondLst>
-                                        </p:cTn>
-                                        <p:tgtEl>
-                                          <p:spTgt spid="15"/>
-                                        </p:tgtEl>
-                                        <p:attrNameLst>
-                                          <p:attrName>style.visibility</p:attrName>
-                                        </p:attrNameLst>
-                                      </p:cBhvr>
-                                      <p:to>
-                                        <p:strVal val="visible"/>
-                                      </p:to>
-                                    </p:set>
-                                    <p:animEffect transition="in" filter="wipe(down)">
-                                      <p:cBhvr>
-                                        <p:cTn id="27" dur="500"/>
-                                        <p:tgtEl>
-                                          <p:spTgt spid="15"/>
-                                        </p:tgtEl>
-                                      </p:cBhvr>
-                                    </p:animEffect>
-                                  </p:childTnLst>
-                                </p:cTn>
-                              </p:par>
-                              <p:par>
-                                <p:cTn id="28" presetID="22" presetClass="entr" presetSubtype="4" fill="hold" grpId="0" nodeType="withEffect">
-                                  <p:stCondLst>
-                                    <p:cond delay="0"/>
-                                  </p:stCondLst>
-                                  <p:childTnLst>
-                                    <p:set>
-                                      <p:cBhvr>
-                                        <p:cTn id="29" dur="1" fill="hold">
-                                          <p:stCondLst>
-                                            <p:cond delay="0"/>
-                                          </p:stCondLst>
-                                        </p:cTn>
-                                        <p:tgtEl>
-                                          <p:spTgt spid="16"/>
-                                        </p:tgtEl>
-                                        <p:attrNameLst>
-                                          <p:attrName>style.visibility</p:attrName>
-                                        </p:attrNameLst>
-                                      </p:cBhvr>
-                                      <p:to>
-                                        <p:strVal val="visible"/>
-                                      </p:to>
-                                    </p:set>
-                                    <p:animEffect transition="in" filter="wipe(down)">
-                                      <p:cBhvr>
-                                        <p:cTn id="30" dur="500"/>
-                                        <p:tgtEl>
-                                          <p:spTgt spid="16"/>
-                                        </p:tgtEl>
-                                      </p:cBhvr>
-                                    </p:animEffect>
-                                  </p:childTnLst>
-                                </p:cTn>
-                              </p:par>
-                            </p:childTnLst>
-                          </p:cTn>
-                        </p:par>
-                      </p:childTnLst>
-                    </p:cTn>
-                  </p:par>
-                  <p:par>
-                    <p:cTn id="31" fill="hold">
-                      <p:stCondLst>
-                        <p:cond delay="indefinite"/>
-                      </p:stCondLst>
-                      <p:childTnLst>
-                        <p:par>
-                          <p:cTn id="32" fill="hold">
-                            <p:stCondLst>
-                              <p:cond delay="0"/>
-                            </p:stCondLst>
-                            <p:childTnLst>
-                              <p:par>
-                                <p:cTn id="33" presetID="22" presetClass="entr" presetSubtype="4" fill="hold" grpId="0" nodeType="clickEffect">
-                                  <p:stCondLst>
-                                    <p:cond delay="0"/>
-                                  </p:stCondLst>
-                                  <p:childTnLst>
-                                    <p:set>
-                                      <p:cBhvr>
-                                        <p:cTn id="34" dur="1" fill="hold">
-                                          <p:stCondLst>
-                                            <p:cond delay="0"/>
-                                          </p:stCondLst>
-                                        </p:cTn>
-                                        <p:tgtEl>
-                                          <p:spTgt spid="14"/>
-                                        </p:tgtEl>
-                                        <p:attrNameLst>
-                                          <p:attrName>style.visibility</p:attrName>
-                                        </p:attrNameLst>
-                                      </p:cBhvr>
-                                      <p:to>
-                                        <p:strVal val="visible"/>
-                                      </p:to>
-                                    </p:set>
-                                    <p:animEffect transition="in" filter="wipe(down)">
-                                      <p:cBhvr>
-                                        <p:cTn id="35" dur="500"/>
-                                        <p:tgtEl>
-                                          <p:spTgt spid="14"/>
-                                        </p:tgtEl>
-                                      </p:cBhvr>
-                                    </p:animEffect>
-                                  </p:childTnLst>
-                                </p:cTn>
-                              </p:par>
-                              <p:par>
-                                <p:cTn id="36" presetID="22" presetClass="entr" presetSubtype="4" fill="hold" grpId="0" nodeType="withEffect">
-                                  <p:stCondLst>
-                                    <p:cond delay="0"/>
-                                  </p:stCondLst>
-                                  <p:childTnLst>
-                                    <p:set>
-                                      <p:cBhvr>
-                                        <p:cTn id="37" dur="1" fill="hold">
-                                          <p:stCondLst>
-                                            <p:cond delay="0"/>
-                                          </p:stCondLst>
-                                        </p:cTn>
-                                        <p:tgtEl>
-                                          <p:spTgt spid="17"/>
-                                        </p:tgtEl>
-                                        <p:attrNameLst>
-                                          <p:attrName>style.visibility</p:attrName>
-                                        </p:attrNameLst>
-                                      </p:cBhvr>
-                                      <p:to>
-                                        <p:strVal val="visible"/>
-                                      </p:to>
-                                    </p:set>
-                                    <p:animEffect transition="in" filter="wipe(down)">
-                                      <p:cBhvr>
-                                        <p:cTn id="38" dur="500"/>
-                                        <p:tgtEl>
-                                          <p:spTgt spid="17"/>
-                                        </p:tgtEl>
-                                      </p:cBhvr>
-                                    </p:animEffect>
-                                  </p:childTnLst>
-                                </p:cTn>
-                              </p:par>
-                            </p:childTnLst>
-                          </p:cTn>
-                        </p:par>
-                      </p:childTnLst>
-                    </p:cTn>
-                  </p:par>
-                </p:childTnLst>
-              </p:cTn>
-              <p:prevCondLst>
-                <p:cond evt="onPrev" delay="0">
-                  <p:tgtEl>
-                    <p:sldTgt/>
-                  </p:tgtEl>
-                </p:cond>
-              </p:prevCondLst>
-              <p:nextCondLst>
-                <p:cond evt="onNext" delay="0">
-                  <p:tgtEl>
-                    <p:sldTgt/>
-                  </p:tgtEl>
-                </p:cond>
-              </p:nextCondLst>
-            </p:seq>
-          </p:childTnLst>
-        </p:cTn>
-      </p:par>
-    </p:tnLst>
-    <p:bldLst>
-      <p:bldP spid="2" grpId="0"/>
-      <p:bldP spid="14" grpId="0"/>
-      <p:bldP spid="15" grpId="0"/>
-      <p:bldP spid="16" grpId="0"/>
-      <p:bldP spid="17" grpId="0"/>
-    </p:bldLst>
-  </p:timing>
 </p:sld>
 </file>
 
@@ -4770,6 +4321,256 @@
 </file>
 
 <file path=ppt/slides/slide4.xml><?xml version="1.0" encoding="utf-8"?>
+<p:sld xmlns:a="http://schemas.openxmlformats.org/drawingml/2006/main" xmlns:r="http://schemas.openxmlformats.org/officeDocument/2006/relationships" xmlns:p="http://schemas.openxmlformats.org/presentationml/2006/main">
+  <p:cSld>
+    <p:bg>
+      <p:bgPr>
+        <a:solidFill>
+          <a:schemeClr val="accent1">
+            <a:lumMod val="75000"/>
+          </a:schemeClr>
+        </a:solidFill>
+        <a:effectLst/>
+      </p:bgPr>
+    </p:bg>
+    <p:spTree>
+      <p:nvGrpSpPr>
+        <p:cNvPr id="1" name="">
+          <a:extLst>
+            <a:ext uri="{FF2B5EF4-FFF2-40B4-BE49-F238E27FC236}">
+              <a16:creationId xmlns:a16="http://schemas.microsoft.com/office/drawing/2014/main" id="{47E82C56-7EBA-18D8-A9FA-058619971DDD}"/>
+            </a:ext>
+          </a:extLst>
+        </p:cNvPr>
+        <p:cNvGrpSpPr/>
+        <p:nvPr/>
+      </p:nvGrpSpPr>
+      <p:grpSpPr>
+        <a:xfrm>
+          <a:off x="0" y="0"/>
+          <a:ext cx="0" cy="0"/>
+          <a:chOff x="0" y="0"/>
+          <a:chExt cx="0" cy="0"/>
+        </a:xfrm>
+      </p:grpSpPr>
+      <p:sp>
+        <p:nvSpPr>
+          <p:cNvPr id="2" name="TextBox 1">
+            <a:extLst>
+              <a:ext uri="{FF2B5EF4-FFF2-40B4-BE49-F238E27FC236}">
+                <a16:creationId xmlns:a16="http://schemas.microsoft.com/office/drawing/2014/main" id="{EB53E5C8-8EF7-9708-D45F-E3B09FD90F4B}"/>
+              </a:ext>
+            </a:extLst>
+          </p:cNvPr>
+          <p:cNvSpPr txBox="1"/>
+          <p:nvPr/>
+        </p:nvSpPr>
+        <p:spPr>
+          <a:xfrm>
+            <a:off x="688260" y="560438"/>
+            <a:ext cx="7933226" cy="584775"/>
+          </a:xfrm>
+          <a:prstGeom prst="rect">
+            <a:avLst/>
+          </a:prstGeom>
+          <a:noFill/>
+        </p:spPr>
+        <p:txBody>
+          <a:bodyPr wrap="square" rtlCol="0">
+            <a:spAutoFit/>
+          </a:bodyPr>
+          <a:lstStyle>
+            <a:defPPr>
+              <a:defRPr lang="en-US"/>
+            </a:defPPr>
+            <a:lvl1pPr>
+              <a:defRPr sz="3200">
+                <a:solidFill>
+                  <a:schemeClr val="accent6">
+                    <a:lumMod val="60000"/>
+                    <a:lumOff val="40000"/>
+                  </a:schemeClr>
+                </a:solidFill>
+                <a:latin typeface="Aptos ExtraBold" panose="020F0502020204030204" pitchFamily="34" charset="0"/>
+              </a:defRPr>
+            </a:lvl1pPr>
+          </a:lstStyle>
+          <a:p>
+            <a:r>
+              <a:rPr lang="en-US" dirty="0"/>
+              <a:t>Concepts and Features</a:t>
+            </a:r>
+            <a:endParaRPr lang="en-GB" dirty="0"/>
+          </a:p>
+        </p:txBody>
+      </p:sp>
+      <p:sp>
+        <p:nvSpPr>
+          <p:cNvPr id="3" name="TextBox 2">
+            <a:extLst>
+              <a:ext uri="{FF2B5EF4-FFF2-40B4-BE49-F238E27FC236}">
+                <a16:creationId xmlns:a16="http://schemas.microsoft.com/office/drawing/2014/main" id="{ECAF83F1-50CF-480C-269D-B88BE5C554F3}"/>
+              </a:ext>
+            </a:extLst>
+          </p:cNvPr>
+          <p:cNvSpPr txBox="1"/>
+          <p:nvPr/>
+        </p:nvSpPr>
+        <p:spPr>
+          <a:xfrm>
+            <a:off x="815002" y="1145213"/>
+            <a:ext cx="4460195" cy="2585323"/>
+          </a:xfrm>
+          <a:prstGeom prst="rect">
+            <a:avLst/>
+          </a:prstGeom>
+          <a:noFill/>
+        </p:spPr>
+        <p:txBody>
+          <a:bodyPr wrap="none" rtlCol="0">
+            <a:spAutoFit/>
+          </a:bodyPr>
+          <a:lstStyle>
+            <a:defPPr>
+              <a:defRPr lang="en-US"/>
+            </a:defPPr>
+            <a:lvl1pPr>
+              <a:defRPr>
+                <a:solidFill>
+                  <a:schemeClr val="accent4">
+                    <a:lumMod val="20000"/>
+                    <a:lumOff val="80000"/>
+                  </a:schemeClr>
+                </a:solidFill>
+              </a:defRPr>
+            </a:lvl1pPr>
+          </a:lstStyle>
+          <a:p>
+            <a:pPr marL="285750" indent="-285750">
+              <a:buFont typeface="Arial" panose="020B0604020202020204" pitchFamily="34" charset="0"/>
+              <a:buChar char="•"/>
+            </a:pPr>
+            <a:r>
+              <a:rPr lang="en-GB" dirty="0"/>
+              <a:t>Hot and Cold Observables (Streams)</a:t>
+            </a:r>
+          </a:p>
+          <a:p>
+            <a:pPr marL="285750" indent="-285750">
+              <a:buFont typeface="Arial" panose="020B0604020202020204" pitchFamily="34" charset="0"/>
+              <a:buChar char="•"/>
+            </a:pPr>
+            <a:endParaRPr lang="en-GB" dirty="0"/>
+          </a:p>
+          <a:p>
+            <a:pPr marL="285750" indent="-285750">
+              <a:buFont typeface="Arial" panose="020B0604020202020204" pitchFamily="34" charset="0"/>
+              <a:buChar char="•"/>
+            </a:pPr>
+            <a:r>
+              <a:rPr lang="en-GB" dirty="0"/>
+              <a:t>Multicasting with streams</a:t>
+            </a:r>
+          </a:p>
+          <a:p>
+            <a:pPr marL="285750" indent="-285750">
+              <a:buFont typeface="Arial" panose="020B0604020202020204" pitchFamily="34" charset="0"/>
+              <a:buChar char="•"/>
+            </a:pPr>
+            <a:endParaRPr lang="en-GB" dirty="0"/>
+          </a:p>
+          <a:p>
+            <a:pPr marL="285750" indent="-285750">
+              <a:buFont typeface="Arial" panose="020B0604020202020204" pitchFamily="34" charset="0"/>
+              <a:buChar char="•"/>
+            </a:pPr>
+            <a:r>
+              <a:rPr lang="en-GB" dirty="0"/>
+              <a:t>Rx is testable using </a:t>
+            </a:r>
+            <a:r>
+              <a:rPr lang="en-GB" dirty="0" err="1"/>
+              <a:t>TestSchedulers</a:t>
+            </a:r>
+            <a:endParaRPr lang="en-GB" dirty="0"/>
+          </a:p>
+          <a:p>
+            <a:pPr marL="285750" indent="-285750">
+              <a:buFont typeface="Arial" panose="020B0604020202020204" pitchFamily="34" charset="0"/>
+              <a:buChar char="•"/>
+            </a:pPr>
+            <a:endParaRPr lang="en-GB" dirty="0"/>
+          </a:p>
+          <a:p>
+            <a:pPr marL="285750" indent="-285750">
+              <a:buFont typeface="Arial" panose="020B0604020202020204" pitchFamily="34" charset="0"/>
+              <a:buChar char="•"/>
+            </a:pPr>
+            <a:r>
+              <a:rPr lang="en-GB" dirty="0"/>
+              <a:t>Pipelines are an advanced way to use Rx</a:t>
+            </a:r>
+          </a:p>
+          <a:p>
+            <a:pPr marL="285750" indent="-285750">
+              <a:buFont typeface="Arial" panose="020B0604020202020204" pitchFamily="34" charset="0"/>
+              <a:buChar char="•"/>
+            </a:pPr>
+            <a:endParaRPr lang="en-GB" dirty="0"/>
+          </a:p>
+          <a:p>
+            <a:pPr marL="285750" indent="-285750">
+              <a:buFont typeface="Arial" panose="020B0604020202020204" pitchFamily="34" charset="0"/>
+              <a:buChar char="•"/>
+            </a:pPr>
+            <a:endParaRPr lang="en-GB" dirty="0"/>
+          </a:p>
+        </p:txBody>
+      </p:sp>
+      <p:pic>
+        <p:nvPicPr>
+          <p:cNvPr id="5" name="Picture 4">
+            <a:extLst>
+              <a:ext uri="{FF2B5EF4-FFF2-40B4-BE49-F238E27FC236}">
+                <a16:creationId xmlns:a16="http://schemas.microsoft.com/office/drawing/2014/main" id="{F3EE665A-D36E-7416-F1D4-7D6BDDA5AAC9}"/>
+              </a:ext>
+            </a:extLst>
+          </p:cNvPr>
+          <p:cNvPicPr>
+            <a:picLocks noChangeAspect="1"/>
+          </p:cNvPicPr>
+          <p:nvPr/>
+        </p:nvPicPr>
+        <p:blipFill>
+          <a:blip r:embed="rId3"/>
+          <a:stretch>
+            <a:fillRect/>
+          </a:stretch>
+        </p:blipFill>
+        <p:spPr>
+          <a:xfrm>
+            <a:off x="2565143" y="3392032"/>
+            <a:ext cx="8811855" cy="2905530"/>
+          </a:xfrm>
+          <a:prstGeom prst="rect">
+            <a:avLst/>
+          </a:prstGeom>
+        </p:spPr>
+      </p:pic>
+    </p:spTree>
+    <p:extLst>
+      <p:ext uri="{BB962C8B-B14F-4D97-AF65-F5344CB8AC3E}">
+        <p14:creationId xmlns:p14="http://schemas.microsoft.com/office/powerpoint/2010/main" val="2046621404"/>
+      </p:ext>
+    </p:extLst>
+  </p:cSld>
+  <p:clrMapOvr>
+    <a:overrideClrMapping bg1="lt1" tx1="dk1" bg2="lt2" tx2="dk2" accent1="accent1" accent2="accent2" accent3="accent3" accent4="accent4" accent5="accent5" accent6="accent6" hlink="hlink" folHlink="folHlink"/>
+  </p:clrMapOvr>
+</p:sld>
+</file>
+
+<file path=ppt/slides/slide5.xml><?xml version="1.0" encoding="utf-8"?>
 <p:sld xmlns:a="http://schemas.openxmlformats.org/drawingml/2006/main" xmlns:r="http://schemas.openxmlformats.org/officeDocument/2006/relationships" xmlns:p="http://schemas.openxmlformats.org/presentationml/2006/main">
   <p:cSld>
     <p:bg>
@@ -5659,162 +5460,10 @@
   <p:clrMapOvr>
     <a:overrideClrMapping bg1="lt1" tx1="dk1" bg2="lt2" tx2="dk2" accent1="accent1" accent2="accent2" accent3="accent3" accent4="accent4" accent5="accent5" accent6="accent6" hlink="hlink" folHlink="folHlink"/>
   </p:clrMapOvr>
-  <p:timing>
-    <p:tnLst>
-      <p:par>
-        <p:cTn id="1" dur="indefinite" restart="never" nodeType="tmRoot">
-          <p:childTnLst>
-            <p:seq concurrent="1" nextAc="seek">
-              <p:cTn id="2" dur="indefinite" nodeType="mainSeq">
-                <p:childTnLst>
-                  <p:par>
-                    <p:cTn id="3" fill="hold">
-                      <p:stCondLst>
-                        <p:cond delay="indefinite"/>
-                      </p:stCondLst>
-                      <p:childTnLst>
-                        <p:par>
-                          <p:cTn id="4" fill="hold">
-                            <p:stCondLst>
-                              <p:cond delay="0"/>
-                            </p:stCondLst>
-                            <p:childTnLst>
-                              <p:par>
-                                <p:cTn id="5" presetID="31" presetClass="entr" presetSubtype="0" fill="hold" nodeType="clickEffect">
-                                  <p:stCondLst>
-                                    <p:cond delay="0"/>
-                                  </p:stCondLst>
-                                  <p:childTnLst>
-                                    <p:set>
-                                      <p:cBhvr>
-                                        <p:cTn id="6" dur="1" fill="hold">
-                                          <p:stCondLst>
-                                            <p:cond delay="0"/>
-                                          </p:stCondLst>
-                                        </p:cTn>
-                                        <p:tgtEl>
-                                          <p:spTgt spid="6"/>
-                                        </p:tgtEl>
-                                        <p:attrNameLst>
-                                          <p:attrName>style.visibility</p:attrName>
-                                        </p:attrNameLst>
-                                      </p:cBhvr>
-                                      <p:to>
-                                        <p:strVal val="visible"/>
-                                      </p:to>
-                                    </p:set>
-                                    <p:anim calcmode="lin" valueType="num">
-                                      <p:cBhvr>
-                                        <p:cTn id="7" dur="1000" fill="hold"/>
-                                        <p:tgtEl>
-                                          <p:spTgt spid="6"/>
-                                        </p:tgtEl>
-                                        <p:attrNameLst>
-                                          <p:attrName>ppt_w</p:attrName>
-                                        </p:attrNameLst>
-                                      </p:cBhvr>
-                                      <p:tavLst>
-                                        <p:tav tm="0">
-                                          <p:val>
-                                            <p:fltVal val="0"/>
-                                          </p:val>
-                                        </p:tav>
-                                        <p:tav tm="100000">
-                                          <p:val>
-                                            <p:strVal val="#ppt_w"/>
-                                          </p:val>
-                                        </p:tav>
-                                      </p:tavLst>
-                                    </p:anim>
-                                    <p:anim calcmode="lin" valueType="num">
-                                      <p:cBhvr>
-                                        <p:cTn id="8" dur="1000" fill="hold"/>
-                                        <p:tgtEl>
-                                          <p:spTgt spid="6"/>
-                                        </p:tgtEl>
-                                        <p:attrNameLst>
-                                          <p:attrName>ppt_h</p:attrName>
-                                        </p:attrNameLst>
-                                      </p:cBhvr>
-                                      <p:tavLst>
-                                        <p:tav tm="0">
-                                          <p:val>
-                                            <p:fltVal val="0"/>
-                                          </p:val>
-                                        </p:tav>
-                                        <p:tav tm="100000">
-                                          <p:val>
-                                            <p:strVal val="#ppt_h"/>
-                                          </p:val>
-                                        </p:tav>
-                                      </p:tavLst>
-                                    </p:anim>
-                                    <p:anim calcmode="lin" valueType="num">
-                                      <p:cBhvr>
-                                        <p:cTn id="9" dur="1000" fill="hold"/>
-                                        <p:tgtEl>
-                                          <p:spTgt spid="6"/>
-                                        </p:tgtEl>
-                                        <p:attrNameLst>
-                                          <p:attrName>style.rotation</p:attrName>
-                                        </p:attrNameLst>
-                                      </p:cBhvr>
-                                      <p:tavLst>
-                                        <p:tav tm="0">
-                                          <p:val>
-                                            <p:fltVal val="90"/>
-                                          </p:val>
-                                        </p:tav>
-                                        <p:tav tm="100000">
-                                          <p:val>
-                                            <p:fltVal val="0"/>
-                                          </p:val>
-                                        </p:tav>
-                                      </p:tavLst>
-                                    </p:anim>
-                                    <p:animEffect transition="in" filter="fade">
-                                      <p:cBhvr>
-                                        <p:cTn id="10" dur="1000"/>
-                                        <p:tgtEl>
-                                          <p:spTgt spid="6"/>
-                                        </p:tgtEl>
-                                      </p:cBhvr>
-                                    </p:animEffect>
-                                  </p:childTnLst>
-                                </p:cTn>
-                              </p:par>
-                            </p:childTnLst>
-                          </p:cTn>
-                        </p:par>
-                      </p:childTnLst>
-                    </p:cTn>
-                  </p:par>
-                </p:childTnLst>
-              </p:cTn>
-              <p:prevCondLst>
-                <p:cond evt="onPrev" delay="0">
-                  <p:tgtEl>
-                    <p:sldTgt/>
-                  </p:tgtEl>
-                </p:cond>
-              </p:prevCondLst>
-              <p:nextCondLst>
-                <p:cond evt="onNext" delay="0">
-                  <p:tgtEl>
-                    <p:sldTgt/>
-                  </p:tgtEl>
-                </p:cond>
-              </p:nextCondLst>
-            </p:seq>
-          </p:childTnLst>
-        </p:cTn>
-      </p:par>
-    </p:tnLst>
-  </p:timing>
 </p:sld>
 </file>
 
-<file path=ppt/slides/slide5.xml><?xml version="1.0" encoding="utf-8"?>
+<file path=ppt/slides/slide6.xml><?xml version="1.0" encoding="utf-8"?>
 <p:sld xmlns:a="http://schemas.openxmlformats.org/drawingml/2006/main" xmlns:r="http://schemas.openxmlformats.org/officeDocument/2006/relationships" xmlns:p="http://schemas.openxmlformats.org/presentationml/2006/main">
   <p:cSld>
     <p:bg>
@@ -5861,7 +5510,7 @@
         </p:nvSpPr>
         <p:spPr>
           <a:xfrm>
-            <a:off x="2848553" y="1457778"/>
+            <a:off x="2730566" y="445055"/>
             <a:ext cx="7340468" cy="830997"/>
           </a:xfrm>
           <a:prstGeom prst="rect">
@@ -5899,54 +5548,448 @@
       </p:sp>
       <p:sp>
         <p:nvSpPr>
-          <p:cNvPr id="4" name="TextBox 3">
-            <a:extLst>
-              <a:ext uri="{FF2B5EF4-FFF2-40B4-BE49-F238E27FC236}">
-                <a16:creationId xmlns:a16="http://schemas.microsoft.com/office/drawing/2014/main" id="{DFC6A442-8640-32C3-2449-C729C41DCEBA}"/>
-              </a:ext>
-            </a:extLst>
-          </p:cNvPr>
-          <p:cNvSpPr txBox="1"/>
+          <p:cNvPr id="2" name="Rectangle 1">
+            <a:extLst>
+              <a:ext uri="{FF2B5EF4-FFF2-40B4-BE49-F238E27FC236}">
+                <a16:creationId xmlns:a16="http://schemas.microsoft.com/office/drawing/2014/main" id="{1201B8B3-C1BD-4BE8-0174-8130A8F40CD5}"/>
+              </a:ext>
+            </a:extLst>
+          </p:cNvPr>
+          <p:cNvSpPr/>
           <p:nvPr/>
         </p:nvSpPr>
         <p:spPr>
           <a:xfrm>
-            <a:off x="4120628" y="3429000"/>
-            <a:ext cx="3796283" cy="830997"/>
+            <a:off x="1868129" y="2192594"/>
+            <a:ext cx="2359742" cy="707922"/>
           </a:xfrm>
           <a:prstGeom prst="rect">
             <a:avLst/>
           </a:prstGeom>
-          <a:noFill/>
         </p:spPr>
-        <p:txBody>
-          <a:bodyPr wrap="square" rtlCol="0">
-            <a:spAutoFit/>
-          </a:bodyPr>
+        <p:style>
+          <a:lnRef idx="2">
+            <a:schemeClr val="accent1">
+              <a:shade val="15000"/>
+            </a:schemeClr>
+          </a:lnRef>
+          <a:fillRef idx="1">
+            <a:schemeClr val="accent1"/>
+          </a:fillRef>
+          <a:effectRef idx="0">
+            <a:schemeClr val="accent1"/>
+          </a:effectRef>
+          <a:fontRef idx="minor">
+            <a:schemeClr val="lt1"/>
+          </a:fontRef>
+        </p:style>
+        <p:txBody>
+          <a:bodyPr rtlCol="0" anchor="ctr"/>
           <a:lstStyle/>
           <a:p>
-            <a:r>
-              <a:rPr lang="en-US" sz="4800" dirty="0">
-                <a:solidFill>
-                  <a:schemeClr val="accent1">
-                    <a:lumMod val="20000"/>
-                    <a:lumOff val="80000"/>
-                  </a:schemeClr>
-                </a:solidFill>
-              </a:rPr>
-              <a:t>Demo time!</a:t>
-            </a:r>
-            <a:endParaRPr lang="en-GB" sz="4800" dirty="0">
-              <a:solidFill>
-                <a:schemeClr val="accent1">
-                  <a:lumMod val="20000"/>
-                  <a:lumOff val="80000"/>
-                </a:schemeClr>
-              </a:solidFill>
-            </a:endParaRPr>
-          </a:p>
-        </p:txBody>
-      </p:sp>
+            <a:pPr algn="ctr"/>
+            <a:r>
+              <a:rPr lang="en-US" dirty="0" err="1"/>
+              <a:t>LinqPad</a:t>
+            </a:r>
+            <a:r>
+              <a:rPr lang="en-US" dirty="0"/>
+              <a:t> UI</a:t>
+            </a:r>
+            <a:endParaRPr lang="en-GB" dirty="0"/>
+          </a:p>
+        </p:txBody>
+      </p:sp>
+      <p:sp>
+        <p:nvSpPr>
+          <p:cNvPr id="4" name="Rectangle 3">
+            <a:extLst>
+              <a:ext uri="{FF2B5EF4-FFF2-40B4-BE49-F238E27FC236}">
+                <a16:creationId xmlns:a16="http://schemas.microsoft.com/office/drawing/2014/main" id="{75025847-E4C8-C2FC-DA94-E3106E646195}"/>
+              </a:ext>
+            </a:extLst>
+          </p:cNvPr>
+          <p:cNvSpPr/>
+          <p:nvPr/>
+        </p:nvSpPr>
+        <p:spPr>
+          <a:xfrm>
+            <a:off x="6784260" y="2192594"/>
+            <a:ext cx="2359742" cy="707922"/>
+          </a:xfrm>
+          <a:prstGeom prst="rect">
+            <a:avLst/>
+          </a:prstGeom>
+        </p:spPr>
+        <p:style>
+          <a:lnRef idx="2">
+            <a:schemeClr val="accent1">
+              <a:shade val="15000"/>
+            </a:schemeClr>
+          </a:lnRef>
+          <a:fillRef idx="1">
+            <a:schemeClr val="accent1"/>
+          </a:fillRef>
+          <a:effectRef idx="0">
+            <a:schemeClr val="accent1"/>
+          </a:effectRef>
+          <a:fontRef idx="minor">
+            <a:schemeClr val="lt1"/>
+          </a:fontRef>
+        </p:style>
+        <p:txBody>
+          <a:bodyPr rtlCol="0" anchor="ctr"/>
+          <a:lstStyle/>
+          <a:p>
+            <a:pPr algn="ctr"/>
+            <a:r>
+              <a:rPr lang="en-US" dirty="0"/>
+              <a:t>Swagger UI</a:t>
+            </a:r>
+            <a:endParaRPr lang="en-GB" dirty="0"/>
+          </a:p>
+        </p:txBody>
+      </p:sp>
+      <p:sp>
+        <p:nvSpPr>
+          <p:cNvPr id="5" name="Rectangle 4">
+            <a:extLst>
+              <a:ext uri="{FF2B5EF4-FFF2-40B4-BE49-F238E27FC236}">
+                <a16:creationId xmlns:a16="http://schemas.microsoft.com/office/drawing/2014/main" id="{7BE1FA08-A049-8ECE-9947-C0DB5AB9D2B8}"/>
+              </a:ext>
+            </a:extLst>
+          </p:cNvPr>
+          <p:cNvSpPr/>
+          <p:nvPr/>
+        </p:nvSpPr>
+        <p:spPr>
+          <a:xfrm>
+            <a:off x="4326198" y="3460639"/>
+            <a:ext cx="2359742" cy="707922"/>
+          </a:xfrm>
+          <a:prstGeom prst="rect">
+            <a:avLst/>
+          </a:prstGeom>
+        </p:spPr>
+        <p:style>
+          <a:lnRef idx="2">
+            <a:schemeClr val="accent1">
+              <a:shade val="15000"/>
+            </a:schemeClr>
+          </a:lnRef>
+          <a:fillRef idx="1">
+            <a:schemeClr val="accent1"/>
+          </a:fillRef>
+          <a:effectRef idx="0">
+            <a:schemeClr val="accent1"/>
+          </a:effectRef>
+          <a:fontRef idx="minor">
+            <a:schemeClr val="lt1"/>
+          </a:fontRef>
+        </p:style>
+        <p:txBody>
+          <a:bodyPr rtlCol="0" anchor="ctr"/>
+          <a:lstStyle/>
+          <a:p>
+            <a:pPr algn="ctr"/>
+            <a:r>
+              <a:rPr lang="en-US" dirty="0"/>
+              <a:t>API Service</a:t>
+            </a:r>
+            <a:endParaRPr lang="en-GB" dirty="0"/>
+          </a:p>
+        </p:txBody>
+      </p:sp>
+      <p:sp>
+        <p:nvSpPr>
+          <p:cNvPr id="6" name="Rectangle 5">
+            <a:extLst>
+              <a:ext uri="{FF2B5EF4-FFF2-40B4-BE49-F238E27FC236}">
+                <a16:creationId xmlns:a16="http://schemas.microsoft.com/office/drawing/2014/main" id="{CEE80091-EE83-9CB8-3245-DBEE254BD6FE}"/>
+              </a:ext>
+            </a:extLst>
+          </p:cNvPr>
+          <p:cNvSpPr/>
+          <p:nvPr/>
+        </p:nvSpPr>
+        <p:spPr>
+          <a:xfrm>
+            <a:off x="6784260" y="4960375"/>
+            <a:ext cx="2359742" cy="707922"/>
+          </a:xfrm>
+          <a:prstGeom prst="rect">
+            <a:avLst/>
+          </a:prstGeom>
+        </p:spPr>
+        <p:style>
+          <a:lnRef idx="2">
+            <a:schemeClr val="accent1">
+              <a:shade val="15000"/>
+            </a:schemeClr>
+          </a:lnRef>
+          <a:fillRef idx="1">
+            <a:schemeClr val="accent1"/>
+          </a:fillRef>
+          <a:effectRef idx="0">
+            <a:schemeClr val="accent1"/>
+          </a:effectRef>
+          <a:fontRef idx="minor">
+            <a:schemeClr val="lt1"/>
+          </a:fontRef>
+        </p:style>
+        <p:txBody>
+          <a:bodyPr rtlCol="0" anchor="ctr"/>
+          <a:lstStyle/>
+          <a:p>
+            <a:pPr algn="ctr"/>
+            <a:r>
+              <a:rPr lang="en-US" dirty="0"/>
+              <a:t>Pricing Source 1</a:t>
+            </a:r>
+            <a:endParaRPr lang="en-GB" dirty="0"/>
+          </a:p>
+        </p:txBody>
+      </p:sp>
+      <p:sp>
+        <p:nvSpPr>
+          <p:cNvPr id="7" name="Rectangle 6">
+            <a:extLst>
+              <a:ext uri="{FF2B5EF4-FFF2-40B4-BE49-F238E27FC236}">
+                <a16:creationId xmlns:a16="http://schemas.microsoft.com/office/drawing/2014/main" id="{7CD73FFA-CDF1-BD84-84C1-E797024DEADD}"/>
+              </a:ext>
+            </a:extLst>
+          </p:cNvPr>
+          <p:cNvSpPr/>
+          <p:nvPr/>
+        </p:nvSpPr>
+        <p:spPr>
+          <a:xfrm>
+            <a:off x="1966456" y="4960375"/>
+            <a:ext cx="2359742" cy="707922"/>
+          </a:xfrm>
+          <a:prstGeom prst="rect">
+            <a:avLst/>
+          </a:prstGeom>
+        </p:spPr>
+        <p:style>
+          <a:lnRef idx="2">
+            <a:schemeClr val="accent1">
+              <a:shade val="15000"/>
+            </a:schemeClr>
+          </a:lnRef>
+          <a:fillRef idx="1">
+            <a:schemeClr val="accent1"/>
+          </a:fillRef>
+          <a:effectRef idx="0">
+            <a:schemeClr val="accent1"/>
+          </a:effectRef>
+          <a:fontRef idx="minor">
+            <a:schemeClr val="lt1"/>
+          </a:fontRef>
+        </p:style>
+        <p:txBody>
+          <a:bodyPr rtlCol="0" anchor="ctr"/>
+          <a:lstStyle/>
+          <a:p>
+            <a:pPr algn="ctr"/>
+            <a:r>
+              <a:rPr lang="en-US" dirty="0"/>
+              <a:t>Pricing Source 1</a:t>
+            </a:r>
+            <a:endParaRPr lang="en-GB" dirty="0"/>
+          </a:p>
+        </p:txBody>
+      </p:sp>
+      <p:cxnSp>
+        <p:nvCxnSpPr>
+          <p:cNvPr id="9" name="Straight Arrow Connector 8">
+            <a:extLst>
+              <a:ext uri="{FF2B5EF4-FFF2-40B4-BE49-F238E27FC236}">
+                <a16:creationId xmlns:a16="http://schemas.microsoft.com/office/drawing/2014/main" id="{316BBEF0-9AF3-9097-AB95-BB9BE646828A}"/>
+              </a:ext>
+            </a:extLst>
+          </p:cNvPr>
+          <p:cNvCxnSpPr>
+            <a:cxnSpLocks/>
+            <a:endCxn id="2" idx="2"/>
+          </p:cNvCxnSpPr>
+          <p:nvPr/>
+        </p:nvCxnSpPr>
+        <p:spPr>
+          <a:xfrm flipH="1" flipV="1">
+            <a:off x="3048000" y="2900516"/>
+            <a:ext cx="2084441" cy="528484"/>
+          </a:xfrm>
+          <a:prstGeom prst="straightConnector1">
+            <a:avLst/>
+          </a:prstGeom>
+          <a:ln w="19050" cap="flat" cmpd="sng" algn="ctr">
+            <a:solidFill>
+              <a:schemeClr val="bg1"/>
+            </a:solidFill>
+            <a:prstDash val="dash"/>
+            <a:round/>
+            <a:headEnd type="none" w="lg" len="med"/>
+            <a:tailEnd type="triangle" w="med" len="med"/>
+          </a:ln>
+        </p:spPr>
+        <p:style>
+          <a:lnRef idx="0">
+            <a:scrgbClr r="0" g="0" b="0"/>
+          </a:lnRef>
+          <a:fillRef idx="0">
+            <a:scrgbClr r="0" g="0" b="0"/>
+          </a:fillRef>
+          <a:effectRef idx="0">
+            <a:scrgbClr r="0" g="0" b="0"/>
+          </a:effectRef>
+          <a:fontRef idx="minor">
+            <a:schemeClr val="tx1"/>
+          </a:fontRef>
+        </p:style>
+      </p:cxnSp>
+      <p:cxnSp>
+        <p:nvCxnSpPr>
+          <p:cNvPr id="10" name="Straight Arrow Connector 9">
+            <a:extLst>
+              <a:ext uri="{FF2B5EF4-FFF2-40B4-BE49-F238E27FC236}">
+                <a16:creationId xmlns:a16="http://schemas.microsoft.com/office/drawing/2014/main" id="{2F4D78DE-7638-5AA8-A1BA-28528CDEC6ED}"/>
+              </a:ext>
+            </a:extLst>
+          </p:cNvPr>
+          <p:cNvCxnSpPr>
+            <a:cxnSpLocks/>
+            <a:stCxn id="4" idx="2"/>
+          </p:cNvCxnSpPr>
+          <p:nvPr/>
+        </p:nvCxnSpPr>
+        <p:spPr>
+          <a:xfrm flipH="1">
+            <a:off x="5879690" y="2900516"/>
+            <a:ext cx="2084441" cy="528484"/>
+          </a:xfrm>
+          <a:prstGeom prst="straightConnector1">
+            <a:avLst/>
+          </a:prstGeom>
+          <a:ln w="19050" cap="flat" cmpd="sng" algn="ctr">
+            <a:solidFill>
+              <a:schemeClr val="bg1"/>
+            </a:solidFill>
+            <a:prstDash val="solid"/>
+            <a:round/>
+            <a:headEnd type="none" w="lg" len="med"/>
+            <a:tailEnd type="triangle" w="med" len="med"/>
+          </a:ln>
+        </p:spPr>
+        <p:style>
+          <a:lnRef idx="0">
+            <a:scrgbClr r="0" g="0" b="0"/>
+          </a:lnRef>
+          <a:fillRef idx="0">
+            <a:scrgbClr r="0" g="0" b="0"/>
+          </a:fillRef>
+          <a:effectRef idx="0">
+            <a:scrgbClr r="0" g="0" b="0"/>
+          </a:effectRef>
+          <a:fontRef idx="minor">
+            <a:schemeClr val="tx1"/>
+          </a:fontRef>
+        </p:style>
+      </p:cxnSp>
+      <p:cxnSp>
+        <p:nvCxnSpPr>
+          <p:cNvPr id="11" name="Straight Arrow Connector 10">
+            <a:extLst>
+              <a:ext uri="{FF2B5EF4-FFF2-40B4-BE49-F238E27FC236}">
+                <a16:creationId xmlns:a16="http://schemas.microsoft.com/office/drawing/2014/main" id="{0BA51737-48C9-9169-F9CD-A5496847380F}"/>
+              </a:ext>
+            </a:extLst>
+          </p:cNvPr>
+          <p:cNvCxnSpPr>
+            <a:cxnSpLocks/>
+          </p:cNvCxnSpPr>
+          <p:nvPr/>
+        </p:nvCxnSpPr>
+        <p:spPr>
+          <a:xfrm flipV="1">
+            <a:off x="3047998" y="4200200"/>
+            <a:ext cx="2064778" cy="760175"/>
+          </a:xfrm>
+          <a:prstGeom prst="straightConnector1">
+            <a:avLst/>
+          </a:prstGeom>
+          <a:ln w="19050" cap="flat" cmpd="sng" algn="ctr">
+            <a:solidFill>
+              <a:schemeClr val="bg1"/>
+            </a:solidFill>
+            <a:prstDash val="solid"/>
+            <a:round/>
+            <a:headEnd type="none" w="lg" len="med"/>
+            <a:tailEnd type="triangle" w="med" len="med"/>
+          </a:ln>
+        </p:spPr>
+        <p:style>
+          <a:lnRef idx="0">
+            <a:scrgbClr r="0" g="0" b="0"/>
+          </a:lnRef>
+          <a:fillRef idx="0">
+            <a:scrgbClr r="0" g="0" b="0"/>
+          </a:fillRef>
+          <a:effectRef idx="0">
+            <a:scrgbClr r="0" g="0" b="0"/>
+          </a:effectRef>
+          <a:fontRef idx="minor">
+            <a:schemeClr val="tx1"/>
+          </a:fontRef>
+        </p:style>
+      </p:cxnSp>
+      <p:cxnSp>
+        <p:nvCxnSpPr>
+          <p:cNvPr id="12" name="Straight Arrow Connector 11">
+            <a:extLst>
+              <a:ext uri="{FF2B5EF4-FFF2-40B4-BE49-F238E27FC236}">
+                <a16:creationId xmlns:a16="http://schemas.microsoft.com/office/drawing/2014/main" id="{7CB66440-2D8F-8B5A-488B-1F4D97D63DA1}"/>
+              </a:ext>
+            </a:extLst>
+          </p:cNvPr>
+          <p:cNvCxnSpPr>
+            <a:cxnSpLocks/>
+          </p:cNvCxnSpPr>
+          <p:nvPr/>
+        </p:nvCxnSpPr>
+        <p:spPr>
+          <a:xfrm flipH="1" flipV="1">
+            <a:off x="5879689" y="4168561"/>
+            <a:ext cx="2084441" cy="823453"/>
+          </a:xfrm>
+          <a:prstGeom prst="straightConnector1">
+            <a:avLst/>
+          </a:prstGeom>
+          <a:ln w="19050" cap="flat" cmpd="sng" algn="ctr">
+            <a:solidFill>
+              <a:schemeClr val="bg1"/>
+            </a:solidFill>
+            <a:prstDash val="solid"/>
+            <a:round/>
+            <a:headEnd type="none" w="lg" len="med"/>
+            <a:tailEnd type="triangle" w="med" len="med"/>
+          </a:ln>
+        </p:spPr>
+        <p:style>
+          <a:lnRef idx="0">
+            <a:scrgbClr r="0" g="0" b="0"/>
+          </a:lnRef>
+          <a:fillRef idx="0">
+            <a:scrgbClr r="0" g="0" b="0"/>
+          </a:fillRef>
+          <a:effectRef idx="0">
+            <a:scrgbClr r="0" g="0" b="0"/>
+          </a:effectRef>
+          <a:fontRef idx="minor">
+            <a:schemeClr val="tx1"/>
+          </a:fontRef>
+        </p:style>
+      </p:cxnSp>
     </p:spTree>
     <p:extLst>
       <p:ext uri="{BB962C8B-B14F-4D97-AF65-F5344CB8AC3E}">
@@ -5957,393 +6000,10 @@
   <p:clrMapOvr>
     <a:overrideClrMapping bg1="lt1" tx1="dk1" bg2="lt2" tx2="dk2" accent1="accent1" accent2="accent2" accent3="accent3" accent4="accent4" accent5="accent5" accent6="accent6" hlink="hlink" folHlink="folHlink"/>
   </p:clrMapOvr>
-  <p:timing>
-    <p:tnLst>
-      <p:par>
-        <p:cTn id="1" dur="indefinite" restart="never" nodeType="tmRoot">
-          <p:childTnLst>
-            <p:seq concurrent="1" nextAc="seek">
-              <p:cTn id="2" dur="indefinite" nodeType="mainSeq">
-                <p:childTnLst>
-                  <p:par>
-                    <p:cTn id="3" fill="hold">
-                      <p:stCondLst>
-                        <p:cond delay="indefinite"/>
-                      </p:stCondLst>
-                      <p:childTnLst>
-                        <p:par>
-                          <p:cTn id="4" fill="hold">
-                            <p:stCondLst>
-                              <p:cond delay="0"/>
-                            </p:stCondLst>
-                            <p:childTnLst>
-                              <p:par>
-                                <p:cTn id="5" presetID="22" presetClass="entr" presetSubtype="4" fill="hold" grpId="0" nodeType="clickEffect">
-                                  <p:stCondLst>
-                                    <p:cond delay="0"/>
-                                  </p:stCondLst>
-                                  <p:childTnLst>
-                                    <p:set>
-                                      <p:cBhvr>
-                                        <p:cTn id="6" dur="1" fill="hold">
-                                          <p:stCondLst>
-                                            <p:cond delay="0"/>
-                                          </p:stCondLst>
-                                        </p:cTn>
-                                        <p:tgtEl>
-                                          <p:spTgt spid="3"/>
-                                        </p:tgtEl>
-                                        <p:attrNameLst>
-                                          <p:attrName>style.visibility</p:attrName>
-                                        </p:attrNameLst>
-                                      </p:cBhvr>
-                                      <p:to>
-                                        <p:strVal val="visible"/>
-                                      </p:to>
-                                    </p:set>
-                                    <p:animEffect transition="in" filter="wipe(down)">
-                                      <p:cBhvr>
-                                        <p:cTn id="7" dur="500"/>
-                                        <p:tgtEl>
-                                          <p:spTgt spid="3"/>
-                                        </p:tgtEl>
-                                      </p:cBhvr>
-                                    </p:animEffect>
-                                  </p:childTnLst>
-                                </p:cTn>
-                              </p:par>
-                            </p:childTnLst>
-                          </p:cTn>
-                        </p:par>
-                      </p:childTnLst>
-                    </p:cTn>
-                  </p:par>
-                  <p:par>
-                    <p:cTn id="8" fill="hold">
-                      <p:stCondLst>
-                        <p:cond delay="indefinite"/>
-                      </p:stCondLst>
-                      <p:childTnLst>
-                        <p:par>
-                          <p:cTn id="9" fill="hold">
-                            <p:stCondLst>
-                              <p:cond delay="0"/>
-                            </p:stCondLst>
-                            <p:childTnLst>
-                              <p:par>
-                                <p:cTn id="10" presetID="26" presetClass="entr" presetSubtype="0" fill="hold" grpId="0" nodeType="clickEffect">
-                                  <p:stCondLst>
-                                    <p:cond delay="0"/>
-                                  </p:stCondLst>
-                                  <p:childTnLst>
-                                    <p:set>
-                                      <p:cBhvr>
-                                        <p:cTn id="11" dur="1" fill="hold">
-                                          <p:stCondLst>
-                                            <p:cond delay="0"/>
-                                          </p:stCondLst>
-                                        </p:cTn>
-                                        <p:tgtEl>
-                                          <p:spTgt spid="4"/>
-                                        </p:tgtEl>
-                                        <p:attrNameLst>
-                                          <p:attrName>style.visibility</p:attrName>
-                                        </p:attrNameLst>
-                                      </p:cBhvr>
-                                      <p:to>
-                                        <p:strVal val="visible"/>
-                                      </p:to>
-                                    </p:set>
-                                    <p:animEffect transition="in" filter="wipe(down)">
-                                      <p:cBhvr>
-                                        <p:cTn id="12" dur="580">
-                                          <p:stCondLst>
-                                            <p:cond delay="0"/>
-                                          </p:stCondLst>
-                                        </p:cTn>
-                                        <p:tgtEl>
-                                          <p:spTgt spid="4"/>
-                                        </p:tgtEl>
-                                      </p:cBhvr>
-                                    </p:animEffect>
-                                    <p:anim calcmode="lin" valueType="num">
-                                      <p:cBhvr>
-                                        <p:cTn id="13" dur="1822" tmFilter="0,0; 0.14,0.36; 0.43,0.73; 0.71,0.91; 1.0,1.0">
-                                          <p:stCondLst>
-                                            <p:cond delay="0"/>
-                                          </p:stCondLst>
-                                        </p:cTn>
-                                        <p:tgtEl>
-                                          <p:spTgt spid="4"/>
-                                        </p:tgtEl>
-                                        <p:attrNameLst>
-                                          <p:attrName>ppt_x</p:attrName>
-                                        </p:attrNameLst>
-                                      </p:cBhvr>
-                                      <p:tavLst>
-                                        <p:tav tm="0">
-                                          <p:val>
-                                            <p:strVal val="#ppt_x-0.25"/>
-                                          </p:val>
-                                        </p:tav>
-                                        <p:tav tm="100000">
-                                          <p:val>
-                                            <p:strVal val="#ppt_x"/>
-                                          </p:val>
-                                        </p:tav>
-                                      </p:tavLst>
-                                    </p:anim>
-                                    <p:anim calcmode="lin" valueType="num">
-                                      <p:cBhvr>
-                                        <p:cTn id="14" dur="664" tmFilter="0.0,0.0; 0.25,0.07; 0.50,0.2; 0.75,0.467; 1.0,1.0">
-                                          <p:stCondLst>
-                                            <p:cond delay="0"/>
-                                          </p:stCondLst>
-                                        </p:cTn>
-                                        <p:tgtEl>
-                                          <p:spTgt spid="4"/>
-                                        </p:tgtEl>
-                                        <p:attrNameLst>
-                                          <p:attrName>ppt_y</p:attrName>
-                                        </p:attrNameLst>
-                                      </p:cBhvr>
-                                      <p:tavLst>
-                                        <p:tav tm="0" fmla="#ppt_y-sin(pi*$)/3">
-                                          <p:val>
-                                            <p:fltVal val="0.5"/>
-                                          </p:val>
-                                        </p:tav>
-                                        <p:tav tm="100000">
-                                          <p:val>
-                                            <p:fltVal val="1"/>
-                                          </p:val>
-                                        </p:tav>
-                                      </p:tavLst>
-                                    </p:anim>
-                                    <p:anim calcmode="lin" valueType="num">
-                                      <p:cBhvr>
-                                        <p:cTn id="15" dur="664" tmFilter="0, 0; 0.125,0.2665; 0.25,0.4; 0.375,0.465; 0.5,0.5;  0.625,0.535; 0.75,0.6; 0.875,0.7335; 1,1">
-                                          <p:stCondLst>
-                                            <p:cond delay="664"/>
-                                          </p:stCondLst>
-                                        </p:cTn>
-                                        <p:tgtEl>
-                                          <p:spTgt spid="4"/>
-                                        </p:tgtEl>
-                                        <p:attrNameLst>
-                                          <p:attrName>ppt_y</p:attrName>
-                                        </p:attrNameLst>
-                                      </p:cBhvr>
-                                      <p:tavLst>
-                                        <p:tav tm="0" fmla="#ppt_y-sin(pi*$)/9">
-                                          <p:val>
-                                            <p:fltVal val="0"/>
-                                          </p:val>
-                                        </p:tav>
-                                        <p:tav tm="100000">
-                                          <p:val>
-                                            <p:fltVal val="1"/>
-                                          </p:val>
-                                        </p:tav>
-                                      </p:tavLst>
-                                    </p:anim>
-                                    <p:anim calcmode="lin" valueType="num">
-                                      <p:cBhvr>
-                                        <p:cTn id="16" dur="332" tmFilter="0, 0; 0.125,0.2665; 0.25,0.4; 0.375,0.465; 0.5,0.5;  0.625,0.535; 0.75,0.6; 0.875,0.7335; 1,1">
-                                          <p:stCondLst>
-                                            <p:cond delay="1324"/>
-                                          </p:stCondLst>
-                                        </p:cTn>
-                                        <p:tgtEl>
-                                          <p:spTgt spid="4"/>
-                                        </p:tgtEl>
-                                        <p:attrNameLst>
-                                          <p:attrName>ppt_y</p:attrName>
-                                        </p:attrNameLst>
-                                      </p:cBhvr>
-                                      <p:tavLst>
-                                        <p:tav tm="0" fmla="#ppt_y-sin(pi*$)/27">
-                                          <p:val>
-                                            <p:fltVal val="0"/>
-                                          </p:val>
-                                        </p:tav>
-                                        <p:tav tm="100000">
-                                          <p:val>
-                                            <p:fltVal val="1"/>
-                                          </p:val>
-                                        </p:tav>
-                                      </p:tavLst>
-                                    </p:anim>
-                                    <p:anim calcmode="lin" valueType="num">
-                                      <p:cBhvr>
-                                        <p:cTn id="17" dur="164" tmFilter="0, 0; 0.125,0.2665; 0.25,0.4; 0.375,0.465; 0.5,0.5;  0.625,0.535; 0.75,0.6; 0.875,0.7335; 1,1">
-                                          <p:stCondLst>
-                                            <p:cond delay="1656"/>
-                                          </p:stCondLst>
-                                        </p:cTn>
-                                        <p:tgtEl>
-                                          <p:spTgt spid="4"/>
-                                        </p:tgtEl>
-                                        <p:attrNameLst>
-                                          <p:attrName>ppt_y</p:attrName>
-                                        </p:attrNameLst>
-                                      </p:cBhvr>
-                                      <p:tavLst>
-                                        <p:tav tm="0" fmla="#ppt_y-sin(pi*$)/81">
-                                          <p:val>
-                                            <p:fltVal val="0"/>
-                                          </p:val>
-                                        </p:tav>
-                                        <p:tav tm="100000">
-                                          <p:val>
-                                            <p:fltVal val="1"/>
-                                          </p:val>
-                                        </p:tav>
-                                      </p:tavLst>
-                                    </p:anim>
-                                    <p:animScale>
-                                      <p:cBhvr>
-                                        <p:cTn id="18" dur="26">
-                                          <p:stCondLst>
-                                            <p:cond delay="650"/>
-                                          </p:stCondLst>
-                                        </p:cTn>
-                                        <p:tgtEl>
-                                          <p:spTgt spid="4"/>
-                                        </p:tgtEl>
-                                      </p:cBhvr>
-                                      <p:to x="100000" y="60000"/>
-                                    </p:animScale>
-                                    <p:animScale>
-                                      <p:cBhvr>
-                                        <p:cTn id="19" dur="166" decel="50000">
-                                          <p:stCondLst>
-                                            <p:cond delay="676"/>
-                                          </p:stCondLst>
-                                        </p:cTn>
-                                        <p:tgtEl>
-                                          <p:spTgt spid="4"/>
-                                        </p:tgtEl>
-                                      </p:cBhvr>
-                                      <p:to x="100000" y="100000"/>
-                                    </p:animScale>
-                                    <p:animScale>
-                                      <p:cBhvr>
-                                        <p:cTn id="20" dur="26">
-                                          <p:stCondLst>
-                                            <p:cond delay="1312"/>
-                                          </p:stCondLst>
-                                        </p:cTn>
-                                        <p:tgtEl>
-                                          <p:spTgt spid="4"/>
-                                        </p:tgtEl>
-                                      </p:cBhvr>
-                                      <p:to x="100000" y="80000"/>
-                                    </p:animScale>
-                                    <p:animScale>
-                                      <p:cBhvr>
-                                        <p:cTn id="21" dur="166" decel="50000">
-                                          <p:stCondLst>
-                                            <p:cond delay="1338"/>
-                                          </p:stCondLst>
-                                        </p:cTn>
-                                        <p:tgtEl>
-                                          <p:spTgt spid="4"/>
-                                        </p:tgtEl>
-                                      </p:cBhvr>
-                                      <p:to x="100000" y="100000"/>
-                                    </p:animScale>
-                                    <p:animScale>
-                                      <p:cBhvr>
-                                        <p:cTn id="22" dur="26">
-                                          <p:stCondLst>
-                                            <p:cond delay="1642"/>
-                                          </p:stCondLst>
-                                        </p:cTn>
-                                        <p:tgtEl>
-                                          <p:spTgt spid="4"/>
-                                        </p:tgtEl>
-                                      </p:cBhvr>
-                                      <p:to x="100000" y="90000"/>
-                                    </p:animScale>
-                                    <p:animScale>
-                                      <p:cBhvr>
-                                        <p:cTn id="23" dur="166" decel="50000">
-                                          <p:stCondLst>
-                                            <p:cond delay="1668"/>
-                                          </p:stCondLst>
-                                        </p:cTn>
-                                        <p:tgtEl>
-                                          <p:spTgt spid="4"/>
-                                        </p:tgtEl>
-                                      </p:cBhvr>
-                                      <p:to x="100000" y="100000"/>
-                                    </p:animScale>
-                                    <p:animScale>
-                                      <p:cBhvr>
-                                        <p:cTn id="24" dur="26">
-                                          <p:stCondLst>
-                                            <p:cond delay="1808"/>
-                                          </p:stCondLst>
-                                        </p:cTn>
-                                        <p:tgtEl>
-                                          <p:spTgt spid="4"/>
-                                        </p:tgtEl>
-                                      </p:cBhvr>
-                                      <p:to x="100000" y="95000"/>
-                                    </p:animScale>
-                                    <p:animScale>
-                                      <p:cBhvr>
-                                        <p:cTn id="25" dur="166" decel="50000">
-                                          <p:stCondLst>
-                                            <p:cond delay="1834"/>
-                                          </p:stCondLst>
-                                        </p:cTn>
-                                        <p:tgtEl>
-                                          <p:spTgt spid="4"/>
-                                        </p:tgtEl>
-                                      </p:cBhvr>
-                                      <p:to x="100000" y="100000"/>
-                                    </p:animScale>
-                                  </p:childTnLst>
-                                </p:cTn>
-                              </p:par>
-                            </p:childTnLst>
-                          </p:cTn>
-                        </p:par>
-                      </p:childTnLst>
-                    </p:cTn>
-                  </p:par>
-                </p:childTnLst>
-              </p:cTn>
-              <p:prevCondLst>
-                <p:cond evt="onPrev" delay="0">
-                  <p:tgtEl>
-                    <p:sldTgt/>
-                  </p:tgtEl>
-                </p:cond>
-              </p:prevCondLst>
-              <p:nextCondLst>
-                <p:cond evt="onNext" delay="0">
-                  <p:tgtEl>
-                    <p:sldTgt/>
-                  </p:tgtEl>
-                </p:cond>
-              </p:nextCondLst>
-            </p:seq>
-          </p:childTnLst>
-        </p:cTn>
-      </p:par>
-    </p:tnLst>
-    <p:bldLst>
-      <p:bldP spid="3" grpId="0"/>
-      <p:bldP spid="4" grpId="0"/>
-    </p:bldLst>
-  </p:timing>
 </p:sld>
 </file>
 
-<file path=ppt/slides/slide6.xml><?xml version="1.0" encoding="utf-8"?>
+<file path=ppt/slides/slide7.xml><?xml version="1.0" encoding="utf-8"?>
 <p:sld xmlns:a="http://schemas.openxmlformats.org/drawingml/2006/main" xmlns:r="http://schemas.openxmlformats.org/officeDocument/2006/relationships" xmlns:p="http://schemas.openxmlformats.org/presentationml/2006/main">
   <p:cSld>
     <p:bg>
@@ -6414,7 +6074,7 @@
                 </a:solidFill>
                 <a:latin typeface="Aptos ExtraBold" panose="020F0502020204030204" pitchFamily="34" charset="0"/>
               </a:rPr>
-              <a:t>Advantageous…</a:t>
+              <a:t>Advantages…</a:t>
             </a:r>
             <a:endParaRPr lang="en-GB" sz="3200" dirty="0">
               <a:solidFill>
@@ -6442,8 +6102,8 @@
         </p:nvSpPr>
         <p:spPr>
           <a:xfrm>
-            <a:off x="958645" y="1612490"/>
-            <a:ext cx="8465779" cy="2308324"/>
+            <a:off x="693349" y="1376516"/>
+            <a:ext cx="9548704" cy="2862322"/>
           </a:xfrm>
           <a:prstGeom prst="rect">
             <a:avLst/>
@@ -6639,6 +6299,59 @@
               </a:solidFill>
             </a:endParaRPr>
           </a:p>
+          <a:p>
+            <a:pPr marL="285750" indent="-285750">
+              <a:buFont typeface="Arial" panose="020B0604020202020204" pitchFamily="34" charset="0"/>
+              <a:buChar char="•"/>
+            </a:pPr>
+            <a:r>
+              <a:rPr lang="en-GB" dirty="0">
+                <a:solidFill>
+                  <a:schemeClr val="accent1">
+                    <a:lumMod val="20000"/>
+                    <a:lumOff val="80000"/>
+                  </a:schemeClr>
+                </a:solidFill>
+              </a:rPr>
+              <a:t>Ability to handle stream completion and errors within event stream processor (</a:t>
+            </a:r>
+            <a:r>
+              <a:rPr lang="en-GB" dirty="0" err="1">
+                <a:solidFill>
+                  <a:schemeClr val="accent1">
+                    <a:lumMod val="20000"/>
+                    <a:lumOff val="80000"/>
+                  </a:schemeClr>
+                </a:solidFill>
+              </a:rPr>
+              <a:t>IObserver</a:t>
+            </a:r>
+            <a:r>
+              <a:rPr lang="en-GB" dirty="0">
+                <a:solidFill>
+                  <a:schemeClr val="accent1">
+                    <a:lumMod val="20000"/>
+                    <a:lumOff val="80000"/>
+                  </a:schemeClr>
+                </a:solidFill>
+              </a:rPr>
+              <a:t>&lt;T&gt;)</a:t>
+            </a:r>
+          </a:p>
+          <a:p>
+            <a:pPr marL="285750" indent="-285750">
+              <a:buFont typeface="Arial" panose="020B0604020202020204" pitchFamily="34" charset="0"/>
+              <a:buChar char="•"/>
+            </a:pPr>
+            <a:endParaRPr lang="en-US" dirty="0">
+              <a:solidFill>
+                <a:schemeClr val="accent4">
+                  <a:lumMod val="20000"/>
+                  <a:lumOff val="80000"/>
+                </a:schemeClr>
+              </a:solidFill>
+            </a:endParaRPr>
+          </a:p>
         </p:txBody>
       </p:sp>
     </p:spTree>
@@ -6651,340 +6364,10 @@
   <p:clrMapOvr>
     <a:overrideClrMapping bg1="lt1" tx1="dk1" bg2="lt2" tx2="dk2" accent1="accent1" accent2="accent2" accent3="accent3" accent4="accent4" accent5="accent5" accent6="accent6" hlink="hlink" folHlink="folHlink"/>
   </p:clrMapOvr>
-  <p:timing>
-    <p:tnLst>
-      <p:par>
-        <p:cTn id="1" dur="indefinite" restart="never" nodeType="tmRoot">
-          <p:childTnLst>
-            <p:seq concurrent="1" nextAc="seek">
-              <p:cTn id="2" dur="indefinite" nodeType="mainSeq">
-                <p:childTnLst>
-                  <p:par>
-                    <p:cTn id="3" fill="hold">
-                      <p:stCondLst>
-                        <p:cond delay="indefinite"/>
-                      </p:stCondLst>
-                      <p:childTnLst>
-                        <p:par>
-                          <p:cTn id="4" fill="hold">
-                            <p:stCondLst>
-                              <p:cond delay="0"/>
-                            </p:stCondLst>
-                            <p:childTnLst>
-                              <p:par>
-                                <p:cTn id="5" presetID="22" presetClass="entr" presetSubtype="4" fill="hold" grpId="0" nodeType="clickEffect">
-                                  <p:stCondLst>
-                                    <p:cond delay="0"/>
-                                  </p:stCondLst>
-                                  <p:childTnLst>
-                                    <p:set>
-                                      <p:cBhvr>
-                                        <p:cTn id="6" dur="1" fill="hold">
-                                          <p:stCondLst>
-                                            <p:cond delay="0"/>
-                                          </p:stCondLst>
-                                        </p:cTn>
-                                        <p:tgtEl>
-                                          <p:spTgt spid="3"/>
-                                        </p:tgtEl>
-                                        <p:attrNameLst>
-                                          <p:attrName>style.visibility</p:attrName>
-                                        </p:attrNameLst>
-                                      </p:cBhvr>
-                                      <p:to>
-                                        <p:strVal val="visible"/>
-                                      </p:to>
-                                    </p:set>
-                                    <p:animEffect transition="in" filter="wipe(down)">
-                                      <p:cBhvr>
-                                        <p:cTn id="7" dur="500"/>
-                                        <p:tgtEl>
-                                          <p:spTgt spid="3"/>
-                                        </p:tgtEl>
-                                      </p:cBhvr>
-                                    </p:animEffect>
-                                  </p:childTnLst>
-                                </p:cTn>
-                              </p:par>
-                            </p:childTnLst>
-                          </p:cTn>
-                        </p:par>
-                      </p:childTnLst>
-                    </p:cTn>
-                  </p:par>
-                  <p:par>
-                    <p:cTn id="8" fill="hold">
-                      <p:stCondLst>
-                        <p:cond delay="indefinite"/>
-                      </p:stCondLst>
-                      <p:childTnLst>
-                        <p:par>
-                          <p:cTn id="9" fill="hold">
-                            <p:stCondLst>
-                              <p:cond delay="0"/>
-                            </p:stCondLst>
-                            <p:childTnLst>
-                              <p:par>
-                                <p:cTn id="10" presetID="22" presetClass="entr" presetSubtype="4" fill="hold" nodeType="clickEffect">
-                                  <p:stCondLst>
-                                    <p:cond delay="0"/>
-                                  </p:stCondLst>
-                                  <p:childTnLst>
-                                    <p:set>
-                                      <p:cBhvr>
-                                        <p:cTn id="11" dur="1" fill="hold">
-                                          <p:stCondLst>
-                                            <p:cond delay="0"/>
-                                          </p:stCondLst>
-                                        </p:cTn>
-                                        <p:tgtEl>
-                                          <p:spTgt spid="4">
-                                            <p:txEl>
-                                              <p:pRg st="0" end="0"/>
-                                            </p:txEl>
-                                          </p:spTgt>
-                                        </p:tgtEl>
-                                        <p:attrNameLst>
-                                          <p:attrName>style.visibility</p:attrName>
-                                        </p:attrNameLst>
-                                      </p:cBhvr>
-                                      <p:to>
-                                        <p:strVal val="visible"/>
-                                      </p:to>
-                                    </p:set>
-                                    <p:animEffect transition="in" filter="wipe(down)">
-                                      <p:cBhvr>
-                                        <p:cTn id="12" dur="500"/>
-                                        <p:tgtEl>
-                                          <p:spTgt spid="4">
-                                            <p:txEl>
-                                              <p:pRg st="0" end="0"/>
-                                            </p:txEl>
-                                          </p:spTgt>
-                                        </p:tgtEl>
-                                      </p:cBhvr>
-                                    </p:animEffect>
-                                  </p:childTnLst>
-                                </p:cTn>
-                              </p:par>
-                            </p:childTnLst>
-                          </p:cTn>
-                        </p:par>
-                      </p:childTnLst>
-                    </p:cTn>
-                  </p:par>
-                  <p:par>
-                    <p:cTn id="13" fill="hold">
-                      <p:stCondLst>
-                        <p:cond delay="indefinite"/>
-                      </p:stCondLst>
-                      <p:childTnLst>
-                        <p:par>
-                          <p:cTn id="14" fill="hold">
-                            <p:stCondLst>
-                              <p:cond delay="0"/>
-                            </p:stCondLst>
-                            <p:childTnLst>
-                              <p:par>
-                                <p:cTn id="15" presetID="22" presetClass="entr" presetSubtype="4" fill="hold" nodeType="clickEffect">
-                                  <p:stCondLst>
-                                    <p:cond delay="0"/>
-                                  </p:stCondLst>
-                                  <p:childTnLst>
-                                    <p:set>
-                                      <p:cBhvr>
-                                        <p:cTn id="16" dur="1" fill="hold">
-                                          <p:stCondLst>
-                                            <p:cond delay="0"/>
-                                          </p:stCondLst>
-                                        </p:cTn>
-                                        <p:tgtEl>
-                                          <p:spTgt spid="4">
-                                            <p:txEl>
-                                              <p:pRg st="2" end="2"/>
-                                            </p:txEl>
-                                          </p:spTgt>
-                                        </p:tgtEl>
-                                        <p:attrNameLst>
-                                          <p:attrName>style.visibility</p:attrName>
-                                        </p:attrNameLst>
-                                      </p:cBhvr>
-                                      <p:to>
-                                        <p:strVal val="visible"/>
-                                      </p:to>
-                                    </p:set>
-                                    <p:animEffect transition="in" filter="wipe(down)">
-                                      <p:cBhvr>
-                                        <p:cTn id="17" dur="500"/>
-                                        <p:tgtEl>
-                                          <p:spTgt spid="4">
-                                            <p:txEl>
-                                              <p:pRg st="2" end="2"/>
-                                            </p:txEl>
-                                          </p:spTgt>
-                                        </p:tgtEl>
-                                      </p:cBhvr>
-                                    </p:animEffect>
-                                  </p:childTnLst>
-                                </p:cTn>
-                              </p:par>
-                            </p:childTnLst>
-                          </p:cTn>
-                        </p:par>
-                      </p:childTnLst>
-                    </p:cTn>
-                  </p:par>
-                  <p:par>
-                    <p:cTn id="18" fill="hold">
-                      <p:stCondLst>
-                        <p:cond delay="indefinite"/>
-                      </p:stCondLst>
-                      <p:childTnLst>
-                        <p:par>
-                          <p:cTn id="19" fill="hold">
-                            <p:stCondLst>
-                              <p:cond delay="0"/>
-                            </p:stCondLst>
-                            <p:childTnLst>
-                              <p:par>
-                                <p:cTn id="20" presetID="22" presetClass="entr" presetSubtype="4" fill="hold" nodeType="clickEffect">
-                                  <p:stCondLst>
-                                    <p:cond delay="0"/>
-                                  </p:stCondLst>
-                                  <p:childTnLst>
-                                    <p:set>
-                                      <p:cBhvr>
-                                        <p:cTn id="21" dur="1" fill="hold">
-                                          <p:stCondLst>
-                                            <p:cond delay="0"/>
-                                          </p:stCondLst>
-                                        </p:cTn>
-                                        <p:tgtEl>
-                                          <p:spTgt spid="4">
-                                            <p:txEl>
-                                              <p:pRg st="4" end="4"/>
-                                            </p:txEl>
-                                          </p:spTgt>
-                                        </p:tgtEl>
-                                        <p:attrNameLst>
-                                          <p:attrName>style.visibility</p:attrName>
-                                        </p:attrNameLst>
-                                      </p:cBhvr>
-                                      <p:to>
-                                        <p:strVal val="visible"/>
-                                      </p:to>
-                                    </p:set>
-                                    <p:animEffect transition="in" filter="wipe(down)">
-                                      <p:cBhvr>
-                                        <p:cTn id="22" dur="500"/>
-                                        <p:tgtEl>
-                                          <p:spTgt spid="4">
-                                            <p:txEl>
-                                              <p:pRg st="4" end="4"/>
-                                            </p:txEl>
-                                          </p:spTgt>
-                                        </p:tgtEl>
-                                      </p:cBhvr>
-                                    </p:animEffect>
-                                  </p:childTnLst>
-                                </p:cTn>
-                              </p:par>
-                            </p:childTnLst>
-                          </p:cTn>
-                        </p:par>
-                      </p:childTnLst>
-                    </p:cTn>
-                  </p:par>
-                  <p:par>
-                    <p:cTn id="23" fill="hold">
-                      <p:stCondLst>
-                        <p:cond delay="indefinite"/>
-                      </p:stCondLst>
-                      <p:childTnLst>
-                        <p:par>
-                          <p:cTn id="24" fill="hold">
-                            <p:stCondLst>
-                              <p:cond delay="0"/>
-                            </p:stCondLst>
-                            <p:childTnLst>
-                              <p:par>
-                                <p:cTn id="25" presetID="22" presetClass="entr" presetSubtype="4" fill="hold" nodeType="clickEffect">
-                                  <p:stCondLst>
-                                    <p:cond delay="0"/>
-                                  </p:stCondLst>
-                                  <p:childTnLst>
-                                    <p:set>
-                                      <p:cBhvr>
-                                        <p:cTn id="26" dur="1" fill="hold">
-                                          <p:stCondLst>
-                                            <p:cond delay="0"/>
-                                          </p:stCondLst>
-                                        </p:cTn>
-                                        <p:tgtEl>
-                                          <p:spTgt spid="4">
-                                            <p:txEl>
-                                              <p:pRg st="6" end="6"/>
-                                            </p:txEl>
-                                          </p:spTgt>
-                                        </p:tgtEl>
-                                        <p:attrNameLst>
-                                          <p:attrName>style.visibility</p:attrName>
-                                        </p:attrNameLst>
-                                      </p:cBhvr>
-                                      <p:to>
-                                        <p:strVal val="visible"/>
-                                      </p:to>
-                                    </p:set>
-                                    <p:animEffect transition="in" filter="wipe(down)">
-                                      <p:cBhvr>
-                                        <p:cTn id="27" dur="500"/>
-                                        <p:tgtEl>
-                                          <p:spTgt spid="4">
-                                            <p:txEl>
-                                              <p:pRg st="6" end="6"/>
-                                            </p:txEl>
-                                          </p:spTgt>
-                                        </p:tgtEl>
-                                      </p:cBhvr>
-                                    </p:animEffect>
-                                  </p:childTnLst>
-                                </p:cTn>
-                              </p:par>
-                            </p:childTnLst>
-                          </p:cTn>
-                        </p:par>
-                      </p:childTnLst>
-                    </p:cTn>
-                  </p:par>
-                </p:childTnLst>
-              </p:cTn>
-              <p:prevCondLst>
-                <p:cond evt="onPrev" delay="0">
-                  <p:tgtEl>
-                    <p:sldTgt/>
-                  </p:tgtEl>
-                </p:cond>
-              </p:prevCondLst>
-              <p:nextCondLst>
-                <p:cond evt="onNext" delay="0">
-                  <p:tgtEl>
-                    <p:sldTgt/>
-                  </p:tgtEl>
-                </p:cond>
-              </p:nextCondLst>
-            </p:seq>
-          </p:childTnLst>
-        </p:cTn>
-      </p:par>
-    </p:tnLst>
-    <p:bldLst>
-      <p:bldP spid="3" grpId="0"/>
-    </p:bldLst>
-  </p:timing>
 </p:sld>
 </file>
 
-<file path=ppt/slides/slide7.xml><?xml version="1.0" encoding="utf-8"?>
+<file path=ppt/slides/slide8.xml><?xml version="1.0" encoding="utf-8"?>
 <p:sld xmlns:a="http://schemas.openxmlformats.org/drawingml/2006/main" xmlns:r="http://schemas.openxmlformats.org/officeDocument/2006/relationships" xmlns:p="http://schemas.openxmlformats.org/presentationml/2006/main">
   <p:cSld>
     <p:bg>
@@ -7247,8 +6630,8 @@
         </p:blipFill>
         <p:spPr>
           <a:xfrm>
-            <a:off x="2122776" y="3889063"/>
-            <a:ext cx="7592485" cy="1752845"/>
+            <a:off x="4035908" y="4046379"/>
+            <a:ext cx="7724463" cy="1752845"/>
           </a:xfrm>
           <a:prstGeom prst="rect">
             <a:avLst/>
@@ -7265,916 +6648,6 @@
   <p:clrMapOvr>
     <a:overrideClrMapping bg1="lt1" tx1="dk1" bg2="lt2" tx2="dk2" accent1="accent1" accent2="accent2" accent3="accent3" accent4="accent4" accent5="accent5" accent6="accent6" hlink="hlink" folHlink="folHlink"/>
   </p:clrMapOvr>
-  <p:timing>
-    <p:tnLst>
-      <p:par>
-        <p:cTn id="1" dur="indefinite" restart="never" nodeType="tmRoot">
-          <p:childTnLst>
-            <p:seq concurrent="1" nextAc="seek">
-              <p:cTn id="2" dur="indefinite" nodeType="mainSeq">
-                <p:childTnLst>
-                  <p:par>
-                    <p:cTn id="3" fill="hold">
-                      <p:stCondLst>
-                        <p:cond delay="indefinite"/>
-                      </p:stCondLst>
-                      <p:childTnLst>
-                        <p:par>
-                          <p:cTn id="4" fill="hold">
-                            <p:stCondLst>
-                              <p:cond delay="0"/>
-                            </p:stCondLst>
-                            <p:childTnLst>
-                              <p:par>
-                                <p:cTn id="5" presetID="22" presetClass="entr" presetSubtype="4" fill="hold" grpId="0" nodeType="clickEffect">
-                                  <p:stCondLst>
-                                    <p:cond delay="0"/>
-                                  </p:stCondLst>
-                                  <p:childTnLst>
-                                    <p:set>
-                                      <p:cBhvr>
-                                        <p:cTn id="6" dur="1" fill="hold">
-                                          <p:stCondLst>
-                                            <p:cond delay="0"/>
-                                          </p:stCondLst>
-                                        </p:cTn>
-                                        <p:tgtEl>
-                                          <p:spTgt spid="2"/>
-                                        </p:tgtEl>
-                                        <p:attrNameLst>
-                                          <p:attrName>style.visibility</p:attrName>
-                                        </p:attrNameLst>
-                                      </p:cBhvr>
-                                      <p:to>
-                                        <p:strVal val="visible"/>
-                                      </p:to>
-                                    </p:set>
-                                    <p:animEffect transition="in" filter="wipe(down)">
-                                      <p:cBhvr>
-                                        <p:cTn id="7" dur="500"/>
-                                        <p:tgtEl>
-                                          <p:spTgt spid="2"/>
-                                        </p:tgtEl>
-                                      </p:cBhvr>
-                                    </p:animEffect>
-                                  </p:childTnLst>
-                                </p:cTn>
-                              </p:par>
-                            </p:childTnLst>
-                          </p:cTn>
-                        </p:par>
-                      </p:childTnLst>
-                    </p:cTn>
-                  </p:par>
-                  <p:par>
-                    <p:cTn id="8" fill="hold">
-                      <p:stCondLst>
-                        <p:cond delay="indefinite"/>
-                      </p:stCondLst>
-                      <p:childTnLst>
-                        <p:par>
-                          <p:cTn id="9" fill="hold">
-                            <p:stCondLst>
-                              <p:cond delay="0"/>
-                            </p:stCondLst>
-                            <p:childTnLst>
-                              <p:par>
-                                <p:cTn id="10" presetID="22" presetClass="entr" presetSubtype="4" fill="hold" nodeType="clickEffect">
-                                  <p:stCondLst>
-                                    <p:cond delay="0"/>
-                                  </p:stCondLst>
-                                  <p:childTnLst>
-                                    <p:set>
-                                      <p:cBhvr>
-                                        <p:cTn id="11" dur="1" fill="hold">
-                                          <p:stCondLst>
-                                            <p:cond delay="0"/>
-                                          </p:stCondLst>
-                                        </p:cTn>
-                                        <p:tgtEl>
-                                          <p:spTgt spid="5">
-                                            <p:txEl>
-                                              <p:pRg st="0" end="0"/>
-                                            </p:txEl>
-                                          </p:spTgt>
-                                        </p:tgtEl>
-                                        <p:attrNameLst>
-                                          <p:attrName>style.visibility</p:attrName>
-                                        </p:attrNameLst>
-                                      </p:cBhvr>
-                                      <p:to>
-                                        <p:strVal val="visible"/>
-                                      </p:to>
-                                    </p:set>
-                                    <p:animEffect transition="in" filter="wipe(down)">
-                                      <p:cBhvr>
-                                        <p:cTn id="12" dur="500"/>
-                                        <p:tgtEl>
-                                          <p:spTgt spid="5">
-                                            <p:txEl>
-                                              <p:pRg st="0" end="0"/>
-                                            </p:txEl>
-                                          </p:spTgt>
-                                        </p:tgtEl>
-                                      </p:cBhvr>
-                                    </p:animEffect>
-                                  </p:childTnLst>
-                                </p:cTn>
-                              </p:par>
-                            </p:childTnLst>
-                          </p:cTn>
-                        </p:par>
-                      </p:childTnLst>
-                    </p:cTn>
-                  </p:par>
-                  <p:par>
-                    <p:cTn id="13" fill="hold">
-                      <p:stCondLst>
-                        <p:cond delay="indefinite"/>
-                      </p:stCondLst>
-                      <p:childTnLst>
-                        <p:par>
-                          <p:cTn id="14" fill="hold">
-                            <p:stCondLst>
-                              <p:cond delay="0"/>
-                            </p:stCondLst>
-                            <p:childTnLst>
-                              <p:par>
-                                <p:cTn id="15" presetID="22" presetClass="entr" presetSubtype="4" fill="hold" nodeType="clickEffect">
-                                  <p:stCondLst>
-                                    <p:cond delay="0"/>
-                                  </p:stCondLst>
-                                  <p:childTnLst>
-                                    <p:set>
-                                      <p:cBhvr>
-                                        <p:cTn id="16" dur="1" fill="hold">
-                                          <p:stCondLst>
-                                            <p:cond delay="0"/>
-                                          </p:stCondLst>
-                                        </p:cTn>
-                                        <p:tgtEl>
-                                          <p:spTgt spid="5">
-                                            <p:txEl>
-                                              <p:pRg st="2" end="2"/>
-                                            </p:txEl>
-                                          </p:spTgt>
-                                        </p:tgtEl>
-                                        <p:attrNameLst>
-                                          <p:attrName>style.visibility</p:attrName>
-                                        </p:attrNameLst>
-                                      </p:cBhvr>
-                                      <p:to>
-                                        <p:strVal val="visible"/>
-                                      </p:to>
-                                    </p:set>
-                                    <p:animEffect transition="in" filter="wipe(down)">
-                                      <p:cBhvr>
-                                        <p:cTn id="17" dur="500"/>
-                                        <p:tgtEl>
-                                          <p:spTgt spid="5">
-                                            <p:txEl>
-                                              <p:pRg st="2" end="2"/>
-                                            </p:txEl>
-                                          </p:spTgt>
-                                        </p:tgtEl>
-                                      </p:cBhvr>
-                                    </p:animEffect>
-                                  </p:childTnLst>
-                                </p:cTn>
-                              </p:par>
-                            </p:childTnLst>
-                          </p:cTn>
-                        </p:par>
-                      </p:childTnLst>
-                    </p:cTn>
-                  </p:par>
-                  <p:par>
-                    <p:cTn id="18" fill="hold">
-                      <p:stCondLst>
-                        <p:cond delay="indefinite"/>
-                      </p:stCondLst>
-                      <p:childTnLst>
-                        <p:par>
-                          <p:cTn id="19" fill="hold">
-                            <p:stCondLst>
-                              <p:cond delay="0"/>
-                            </p:stCondLst>
-                            <p:childTnLst>
-                              <p:par>
-                                <p:cTn id="20" presetID="22" presetClass="entr" presetSubtype="4" fill="hold" nodeType="clickEffect">
-                                  <p:stCondLst>
-                                    <p:cond delay="0"/>
-                                  </p:stCondLst>
-                                  <p:childTnLst>
-                                    <p:set>
-                                      <p:cBhvr>
-                                        <p:cTn id="21" dur="1" fill="hold">
-                                          <p:stCondLst>
-                                            <p:cond delay="0"/>
-                                          </p:stCondLst>
-                                        </p:cTn>
-                                        <p:tgtEl>
-                                          <p:spTgt spid="5">
-                                            <p:txEl>
-                                              <p:pRg st="4" end="4"/>
-                                            </p:txEl>
-                                          </p:spTgt>
-                                        </p:tgtEl>
-                                        <p:attrNameLst>
-                                          <p:attrName>style.visibility</p:attrName>
-                                        </p:attrNameLst>
-                                      </p:cBhvr>
-                                      <p:to>
-                                        <p:strVal val="visible"/>
-                                      </p:to>
-                                    </p:set>
-                                    <p:animEffect transition="in" filter="wipe(down)">
-                                      <p:cBhvr>
-                                        <p:cTn id="22" dur="500"/>
-                                        <p:tgtEl>
-                                          <p:spTgt spid="5">
-                                            <p:txEl>
-                                              <p:pRg st="4" end="4"/>
-                                            </p:txEl>
-                                          </p:spTgt>
-                                        </p:tgtEl>
-                                      </p:cBhvr>
-                                    </p:animEffect>
-                                  </p:childTnLst>
-                                </p:cTn>
-                              </p:par>
-                            </p:childTnLst>
-                          </p:cTn>
-                        </p:par>
-                      </p:childTnLst>
-                    </p:cTn>
-                  </p:par>
-                  <p:par>
-                    <p:cTn id="23" fill="hold">
-                      <p:stCondLst>
-                        <p:cond delay="indefinite"/>
-                      </p:stCondLst>
-                      <p:childTnLst>
-                        <p:par>
-                          <p:cTn id="24" fill="hold">
-                            <p:stCondLst>
-                              <p:cond delay="0"/>
-                            </p:stCondLst>
-                            <p:childTnLst>
-                              <p:par>
-                                <p:cTn id="25" presetID="22" presetClass="entr" presetSubtype="4" fill="hold" nodeType="clickEffect">
-                                  <p:stCondLst>
-                                    <p:cond delay="0"/>
-                                  </p:stCondLst>
-                                  <p:childTnLst>
-                                    <p:set>
-                                      <p:cBhvr>
-                                        <p:cTn id="26" dur="1" fill="hold">
-                                          <p:stCondLst>
-                                            <p:cond delay="0"/>
-                                          </p:stCondLst>
-                                        </p:cTn>
-                                        <p:tgtEl>
-                                          <p:spTgt spid="5">
-                                            <p:txEl>
-                                              <p:pRg st="5" end="5"/>
-                                            </p:txEl>
-                                          </p:spTgt>
-                                        </p:tgtEl>
-                                        <p:attrNameLst>
-                                          <p:attrName>style.visibility</p:attrName>
-                                        </p:attrNameLst>
-                                      </p:cBhvr>
-                                      <p:to>
-                                        <p:strVal val="visible"/>
-                                      </p:to>
-                                    </p:set>
-                                    <p:animEffect transition="in" filter="wipe(down)">
-                                      <p:cBhvr>
-                                        <p:cTn id="27" dur="500"/>
-                                        <p:tgtEl>
-                                          <p:spTgt spid="5">
-                                            <p:txEl>
-                                              <p:pRg st="5" end="5"/>
-                                            </p:txEl>
-                                          </p:spTgt>
-                                        </p:tgtEl>
-                                      </p:cBhvr>
-                                    </p:animEffect>
-                                  </p:childTnLst>
-                                </p:cTn>
-                              </p:par>
-                            </p:childTnLst>
-                          </p:cTn>
-                        </p:par>
-                      </p:childTnLst>
-                    </p:cTn>
-                  </p:par>
-                </p:childTnLst>
-              </p:cTn>
-              <p:prevCondLst>
-                <p:cond evt="onPrev" delay="0">
-                  <p:tgtEl>
-                    <p:sldTgt/>
-                  </p:tgtEl>
-                </p:cond>
-              </p:prevCondLst>
-              <p:nextCondLst>
-                <p:cond evt="onNext" delay="0">
-                  <p:tgtEl>
-                    <p:sldTgt/>
-                  </p:tgtEl>
-                </p:cond>
-              </p:nextCondLst>
-            </p:seq>
-          </p:childTnLst>
-        </p:cTn>
-      </p:par>
-    </p:tnLst>
-    <p:bldLst>
-      <p:bldP spid="2" grpId="0"/>
-    </p:bldLst>
-  </p:timing>
-</p:sld>
-</file>
-
-<file path=ppt/slides/slide8.xml><?xml version="1.0" encoding="utf-8"?>
-<p:sld xmlns:a="http://schemas.openxmlformats.org/drawingml/2006/main" xmlns:r="http://schemas.openxmlformats.org/officeDocument/2006/relationships" xmlns:p="http://schemas.openxmlformats.org/presentationml/2006/main">
-  <p:cSld>
-    <p:bg>
-      <p:bgPr>
-        <a:solidFill>
-          <a:schemeClr val="accent1">
-            <a:lumMod val="75000"/>
-          </a:schemeClr>
-        </a:solidFill>
-        <a:effectLst/>
-      </p:bgPr>
-    </p:bg>
-    <p:spTree>
-      <p:nvGrpSpPr>
-        <p:cNvPr id="1" name="">
-          <a:extLst>
-            <a:ext uri="{FF2B5EF4-FFF2-40B4-BE49-F238E27FC236}">
-              <a16:creationId xmlns:a16="http://schemas.microsoft.com/office/drawing/2014/main" id="{47E82C56-7EBA-18D8-A9FA-058619971DDD}"/>
-            </a:ext>
-          </a:extLst>
-        </p:cNvPr>
-        <p:cNvGrpSpPr/>
-        <p:nvPr/>
-      </p:nvGrpSpPr>
-      <p:grpSpPr>
-        <a:xfrm>
-          <a:off x="0" y="0"/>
-          <a:ext cx="0" cy="0"/>
-          <a:chOff x="0" y="0"/>
-          <a:chExt cx="0" cy="0"/>
-        </a:xfrm>
-      </p:grpSpPr>
-      <p:sp>
-        <p:nvSpPr>
-          <p:cNvPr id="2" name="TextBox 1">
-            <a:extLst>
-              <a:ext uri="{FF2B5EF4-FFF2-40B4-BE49-F238E27FC236}">
-                <a16:creationId xmlns:a16="http://schemas.microsoft.com/office/drawing/2014/main" id="{EB53E5C8-8EF7-9708-D45F-E3B09FD90F4B}"/>
-              </a:ext>
-            </a:extLst>
-          </p:cNvPr>
-          <p:cNvSpPr txBox="1"/>
-          <p:nvPr/>
-        </p:nvSpPr>
-        <p:spPr>
-          <a:xfrm>
-            <a:off x="688260" y="560438"/>
-            <a:ext cx="7933226" cy="584775"/>
-          </a:xfrm>
-          <a:prstGeom prst="rect">
-            <a:avLst/>
-          </a:prstGeom>
-          <a:noFill/>
-        </p:spPr>
-        <p:txBody>
-          <a:bodyPr wrap="square" rtlCol="0">
-            <a:spAutoFit/>
-          </a:bodyPr>
-          <a:lstStyle>
-            <a:defPPr>
-              <a:defRPr lang="en-US"/>
-            </a:defPPr>
-            <a:lvl1pPr>
-              <a:defRPr sz="3200">
-                <a:solidFill>
-                  <a:schemeClr val="accent6">
-                    <a:lumMod val="60000"/>
-                    <a:lumOff val="40000"/>
-                  </a:schemeClr>
-                </a:solidFill>
-                <a:latin typeface="Aptos ExtraBold" panose="020F0502020204030204" pitchFamily="34" charset="0"/>
-              </a:defRPr>
-            </a:lvl1pPr>
-          </a:lstStyle>
-          <a:p>
-            <a:r>
-              <a:rPr lang="en-US" dirty="0"/>
-              <a:t>Concepts and Features</a:t>
-            </a:r>
-            <a:endParaRPr lang="en-GB" dirty="0"/>
-          </a:p>
-        </p:txBody>
-      </p:sp>
-      <p:sp>
-        <p:nvSpPr>
-          <p:cNvPr id="3" name="TextBox 2">
-            <a:extLst>
-              <a:ext uri="{FF2B5EF4-FFF2-40B4-BE49-F238E27FC236}">
-                <a16:creationId xmlns:a16="http://schemas.microsoft.com/office/drawing/2014/main" id="{ECAF83F1-50CF-480C-269D-B88BE5C554F3}"/>
-              </a:ext>
-            </a:extLst>
-          </p:cNvPr>
-          <p:cNvSpPr txBox="1"/>
-          <p:nvPr/>
-        </p:nvSpPr>
-        <p:spPr>
-          <a:xfrm>
-            <a:off x="815002" y="1145213"/>
-            <a:ext cx="4460195" cy="2585323"/>
-          </a:xfrm>
-          <a:prstGeom prst="rect">
-            <a:avLst/>
-          </a:prstGeom>
-          <a:noFill/>
-        </p:spPr>
-        <p:txBody>
-          <a:bodyPr wrap="none" rtlCol="0">
-            <a:spAutoFit/>
-          </a:bodyPr>
-          <a:lstStyle>
-            <a:defPPr>
-              <a:defRPr lang="en-US"/>
-            </a:defPPr>
-            <a:lvl1pPr>
-              <a:defRPr>
-                <a:solidFill>
-                  <a:schemeClr val="accent4">
-                    <a:lumMod val="20000"/>
-                    <a:lumOff val="80000"/>
-                  </a:schemeClr>
-                </a:solidFill>
-              </a:defRPr>
-            </a:lvl1pPr>
-          </a:lstStyle>
-          <a:p>
-            <a:pPr marL="285750" indent="-285750">
-              <a:buFont typeface="Arial" panose="020B0604020202020204" pitchFamily="34" charset="0"/>
-              <a:buChar char="•"/>
-            </a:pPr>
-            <a:r>
-              <a:rPr lang="en-GB" dirty="0"/>
-              <a:t>Hot and Cold Observables (Streams)</a:t>
-            </a:r>
-          </a:p>
-          <a:p>
-            <a:pPr marL="285750" indent="-285750">
-              <a:buFont typeface="Arial" panose="020B0604020202020204" pitchFamily="34" charset="0"/>
-              <a:buChar char="•"/>
-            </a:pPr>
-            <a:endParaRPr lang="en-GB" dirty="0"/>
-          </a:p>
-          <a:p>
-            <a:pPr marL="285750" indent="-285750">
-              <a:buFont typeface="Arial" panose="020B0604020202020204" pitchFamily="34" charset="0"/>
-              <a:buChar char="•"/>
-            </a:pPr>
-            <a:r>
-              <a:rPr lang="en-GB" dirty="0"/>
-              <a:t>Multicasting with streams</a:t>
-            </a:r>
-          </a:p>
-          <a:p>
-            <a:pPr marL="285750" indent="-285750">
-              <a:buFont typeface="Arial" panose="020B0604020202020204" pitchFamily="34" charset="0"/>
-              <a:buChar char="•"/>
-            </a:pPr>
-            <a:endParaRPr lang="en-GB" dirty="0"/>
-          </a:p>
-          <a:p>
-            <a:pPr marL="285750" indent="-285750">
-              <a:buFont typeface="Arial" panose="020B0604020202020204" pitchFamily="34" charset="0"/>
-              <a:buChar char="•"/>
-            </a:pPr>
-            <a:r>
-              <a:rPr lang="en-GB" dirty="0"/>
-              <a:t>Rx is testable using </a:t>
-            </a:r>
-            <a:r>
-              <a:rPr lang="en-GB" dirty="0" err="1"/>
-              <a:t>TestSchedulers</a:t>
-            </a:r>
-            <a:endParaRPr lang="en-GB" dirty="0"/>
-          </a:p>
-          <a:p>
-            <a:pPr marL="285750" indent="-285750">
-              <a:buFont typeface="Arial" panose="020B0604020202020204" pitchFamily="34" charset="0"/>
-              <a:buChar char="•"/>
-            </a:pPr>
-            <a:endParaRPr lang="en-GB" dirty="0"/>
-          </a:p>
-          <a:p>
-            <a:pPr marL="285750" indent="-285750">
-              <a:buFont typeface="Arial" panose="020B0604020202020204" pitchFamily="34" charset="0"/>
-              <a:buChar char="•"/>
-            </a:pPr>
-            <a:r>
-              <a:rPr lang="en-GB" dirty="0"/>
-              <a:t>Pipelines are an advanced way to use Rx</a:t>
-            </a:r>
-          </a:p>
-          <a:p>
-            <a:pPr marL="285750" indent="-285750">
-              <a:buFont typeface="Arial" panose="020B0604020202020204" pitchFamily="34" charset="0"/>
-              <a:buChar char="•"/>
-            </a:pPr>
-            <a:endParaRPr lang="en-GB" dirty="0"/>
-          </a:p>
-          <a:p>
-            <a:pPr marL="285750" indent="-285750">
-              <a:buFont typeface="Arial" panose="020B0604020202020204" pitchFamily="34" charset="0"/>
-              <a:buChar char="•"/>
-            </a:pPr>
-            <a:endParaRPr lang="en-GB" dirty="0"/>
-          </a:p>
-        </p:txBody>
-      </p:sp>
-      <p:pic>
-        <p:nvPicPr>
-          <p:cNvPr id="5" name="Picture 4">
-            <a:extLst>
-              <a:ext uri="{FF2B5EF4-FFF2-40B4-BE49-F238E27FC236}">
-                <a16:creationId xmlns:a16="http://schemas.microsoft.com/office/drawing/2014/main" id="{F3EE665A-D36E-7416-F1D4-7D6BDDA5AAC9}"/>
-              </a:ext>
-            </a:extLst>
-          </p:cNvPr>
-          <p:cNvPicPr>
-            <a:picLocks noChangeAspect="1"/>
-          </p:cNvPicPr>
-          <p:nvPr/>
-        </p:nvPicPr>
-        <p:blipFill>
-          <a:blip r:embed="rId3"/>
-          <a:stretch>
-            <a:fillRect/>
-          </a:stretch>
-        </p:blipFill>
-        <p:spPr>
-          <a:xfrm>
-            <a:off x="2565143" y="3392032"/>
-            <a:ext cx="8811855" cy="2905530"/>
-          </a:xfrm>
-          <a:prstGeom prst="rect">
-            <a:avLst/>
-          </a:prstGeom>
-        </p:spPr>
-      </p:pic>
-    </p:spTree>
-    <p:extLst>
-      <p:ext uri="{BB962C8B-B14F-4D97-AF65-F5344CB8AC3E}">
-        <p14:creationId xmlns:p14="http://schemas.microsoft.com/office/powerpoint/2010/main" val="2046621404"/>
-      </p:ext>
-    </p:extLst>
-  </p:cSld>
-  <p:clrMapOvr>
-    <a:overrideClrMapping bg1="lt1" tx1="dk1" bg2="lt2" tx2="dk2" accent1="accent1" accent2="accent2" accent3="accent3" accent4="accent4" accent5="accent5" accent6="accent6" hlink="hlink" folHlink="folHlink"/>
-  </p:clrMapOvr>
-  <p:timing>
-    <p:tnLst>
-      <p:par>
-        <p:cTn id="1" dur="indefinite" restart="never" nodeType="tmRoot">
-          <p:childTnLst>
-            <p:seq concurrent="1" nextAc="seek">
-              <p:cTn id="2" dur="indefinite" nodeType="mainSeq">
-                <p:childTnLst>
-                  <p:par>
-                    <p:cTn id="3" fill="hold">
-                      <p:stCondLst>
-                        <p:cond delay="indefinite"/>
-                      </p:stCondLst>
-                      <p:childTnLst>
-                        <p:par>
-                          <p:cTn id="4" fill="hold">
-                            <p:stCondLst>
-                              <p:cond delay="0"/>
-                            </p:stCondLst>
-                            <p:childTnLst>
-                              <p:par>
-                                <p:cTn id="5" presetID="22" presetClass="entr" presetSubtype="4" fill="hold" grpId="0" nodeType="clickEffect">
-                                  <p:stCondLst>
-                                    <p:cond delay="0"/>
-                                  </p:stCondLst>
-                                  <p:childTnLst>
-                                    <p:set>
-                                      <p:cBhvr>
-                                        <p:cTn id="6" dur="1" fill="hold">
-                                          <p:stCondLst>
-                                            <p:cond delay="0"/>
-                                          </p:stCondLst>
-                                        </p:cTn>
-                                        <p:tgtEl>
-                                          <p:spTgt spid="2"/>
-                                        </p:tgtEl>
-                                        <p:attrNameLst>
-                                          <p:attrName>style.visibility</p:attrName>
-                                        </p:attrNameLst>
-                                      </p:cBhvr>
-                                      <p:to>
-                                        <p:strVal val="visible"/>
-                                      </p:to>
-                                    </p:set>
-                                    <p:animEffect transition="in" filter="wipe(down)">
-                                      <p:cBhvr>
-                                        <p:cTn id="7" dur="500"/>
-                                        <p:tgtEl>
-                                          <p:spTgt spid="2"/>
-                                        </p:tgtEl>
-                                      </p:cBhvr>
-                                    </p:animEffect>
-                                  </p:childTnLst>
-                                </p:cTn>
-                              </p:par>
-                            </p:childTnLst>
-                          </p:cTn>
-                        </p:par>
-                      </p:childTnLst>
-                    </p:cTn>
-                  </p:par>
-                  <p:par>
-                    <p:cTn id="8" fill="hold">
-                      <p:stCondLst>
-                        <p:cond delay="indefinite"/>
-                      </p:stCondLst>
-                      <p:childTnLst>
-                        <p:par>
-                          <p:cTn id="9" fill="hold">
-                            <p:stCondLst>
-                              <p:cond delay="0"/>
-                            </p:stCondLst>
-                            <p:childTnLst>
-                              <p:par>
-                                <p:cTn id="10" presetID="22" presetClass="entr" presetSubtype="4" fill="hold" nodeType="clickEffect">
-                                  <p:stCondLst>
-                                    <p:cond delay="0"/>
-                                  </p:stCondLst>
-                                  <p:childTnLst>
-                                    <p:set>
-                                      <p:cBhvr>
-                                        <p:cTn id="11" dur="1" fill="hold">
-                                          <p:stCondLst>
-                                            <p:cond delay="0"/>
-                                          </p:stCondLst>
-                                        </p:cTn>
-                                        <p:tgtEl>
-                                          <p:spTgt spid="3">
-                                            <p:txEl>
-                                              <p:pRg st="0" end="0"/>
-                                            </p:txEl>
-                                          </p:spTgt>
-                                        </p:tgtEl>
-                                        <p:attrNameLst>
-                                          <p:attrName>style.visibility</p:attrName>
-                                        </p:attrNameLst>
-                                      </p:cBhvr>
-                                      <p:to>
-                                        <p:strVal val="visible"/>
-                                      </p:to>
-                                    </p:set>
-                                    <p:animEffect transition="in" filter="wipe(down)">
-                                      <p:cBhvr>
-                                        <p:cTn id="12" dur="500"/>
-                                        <p:tgtEl>
-                                          <p:spTgt spid="3">
-                                            <p:txEl>
-                                              <p:pRg st="0" end="0"/>
-                                            </p:txEl>
-                                          </p:spTgt>
-                                        </p:tgtEl>
-                                      </p:cBhvr>
-                                    </p:animEffect>
-                                  </p:childTnLst>
-                                </p:cTn>
-                              </p:par>
-                            </p:childTnLst>
-                          </p:cTn>
-                        </p:par>
-                      </p:childTnLst>
-                    </p:cTn>
-                  </p:par>
-                  <p:par>
-                    <p:cTn id="13" fill="hold">
-                      <p:stCondLst>
-                        <p:cond delay="indefinite"/>
-                      </p:stCondLst>
-                      <p:childTnLst>
-                        <p:par>
-                          <p:cTn id="14" fill="hold">
-                            <p:stCondLst>
-                              <p:cond delay="0"/>
-                            </p:stCondLst>
-                            <p:childTnLst>
-                              <p:par>
-                                <p:cTn id="15" presetID="22" presetClass="entr" presetSubtype="4" fill="hold" nodeType="clickEffect">
-                                  <p:stCondLst>
-                                    <p:cond delay="0"/>
-                                  </p:stCondLst>
-                                  <p:childTnLst>
-                                    <p:set>
-                                      <p:cBhvr>
-                                        <p:cTn id="16" dur="1" fill="hold">
-                                          <p:stCondLst>
-                                            <p:cond delay="0"/>
-                                          </p:stCondLst>
-                                        </p:cTn>
-                                        <p:tgtEl>
-                                          <p:spTgt spid="3">
-                                            <p:txEl>
-                                              <p:pRg st="2" end="2"/>
-                                            </p:txEl>
-                                          </p:spTgt>
-                                        </p:tgtEl>
-                                        <p:attrNameLst>
-                                          <p:attrName>style.visibility</p:attrName>
-                                        </p:attrNameLst>
-                                      </p:cBhvr>
-                                      <p:to>
-                                        <p:strVal val="visible"/>
-                                      </p:to>
-                                    </p:set>
-                                    <p:animEffect transition="in" filter="wipe(down)">
-                                      <p:cBhvr>
-                                        <p:cTn id="17" dur="500"/>
-                                        <p:tgtEl>
-                                          <p:spTgt spid="3">
-                                            <p:txEl>
-                                              <p:pRg st="2" end="2"/>
-                                            </p:txEl>
-                                          </p:spTgt>
-                                        </p:tgtEl>
-                                      </p:cBhvr>
-                                    </p:animEffect>
-                                  </p:childTnLst>
-                                </p:cTn>
-                              </p:par>
-                            </p:childTnLst>
-                          </p:cTn>
-                        </p:par>
-                      </p:childTnLst>
-                    </p:cTn>
-                  </p:par>
-                  <p:par>
-                    <p:cTn id="18" fill="hold">
-                      <p:stCondLst>
-                        <p:cond delay="indefinite"/>
-                      </p:stCondLst>
-                      <p:childTnLst>
-                        <p:par>
-                          <p:cTn id="19" fill="hold">
-                            <p:stCondLst>
-                              <p:cond delay="0"/>
-                            </p:stCondLst>
-                            <p:childTnLst>
-                              <p:par>
-                                <p:cTn id="20" presetID="22" presetClass="entr" presetSubtype="4" fill="hold" nodeType="clickEffect">
-                                  <p:stCondLst>
-                                    <p:cond delay="0"/>
-                                  </p:stCondLst>
-                                  <p:childTnLst>
-                                    <p:set>
-                                      <p:cBhvr>
-                                        <p:cTn id="21" dur="1" fill="hold">
-                                          <p:stCondLst>
-                                            <p:cond delay="0"/>
-                                          </p:stCondLst>
-                                        </p:cTn>
-                                        <p:tgtEl>
-                                          <p:spTgt spid="3">
-                                            <p:txEl>
-                                              <p:pRg st="4" end="4"/>
-                                            </p:txEl>
-                                          </p:spTgt>
-                                        </p:tgtEl>
-                                        <p:attrNameLst>
-                                          <p:attrName>style.visibility</p:attrName>
-                                        </p:attrNameLst>
-                                      </p:cBhvr>
-                                      <p:to>
-                                        <p:strVal val="visible"/>
-                                      </p:to>
-                                    </p:set>
-                                    <p:animEffect transition="in" filter="wipe(down)">
-                                      <p:cBhvr>
-                                        <p:cTn id="22" dur="500"/>
-                                        <p:tgtEl>
-                                          <p:spTgt spid="3">
-                                            <p:txEl>
-                                              <p:pRg st="4" end="4"/>
-                                            </p:txEl>
-                                          </p:spTgt>
-                                        </p:tgtEl>
-                                      </p:cBhvr>
-                                    </p:animEffect>
-                                  </p:childTnLst>
-                                </p:cTn>
-                              </p:par>
-                            </p:childTnLst>
-                          </p:cTn>
-                        </p:par>
-                      </p:childTnLst>
-                    </p:cTn>
-                  </p:par>
-                  <p:par>
-                    <p:cTn id="23" fill="hold">
-                      <p:stCondLst>
-                        <p:cond delay="indefinite"/>
-                      </p:stCondLst>
-                      <p:childTnLst>
-                        <p:par>
-                          <p:cTn id="24" fill="hold">
-                            <p:stCondLst>
-                              <p:cond delay="0"/>
-                            </p:stCondLst>
-                            <p:childTnLst>
-                              <p:par>
-                                <p:cTn id="25" presetID="22" presetClass="entr" presetSubtype="4" fill="hold" nodeType="clickEffect">
-                                  <p:stCondLst>
-                                    <p:cond delay="0"/>
-                                  </p:stCondLst>
-                                  <p:childTnLst>
-                                    <p:set>
-                                      <p:cBhvr>
-                                        <p:cTn id="26" dur="1" fill="hold">
-                                          <p:stCondLst>
-                                            <p:cond delay="0"/>
-                                          </p:stCondLst>
-                                        </p:cTn>
-                                        <p:tgtEl>
-                                          <p:spTgt spid="3">
-                                            <p:txEl>
-                                              <p:pRg st="6" end="6"/>
-                                            </p:txEl>
-                                          </p:spTgt>
-                                        </p:tgtEl>
-                                        <p:attrNameLst>
-                                          <p:attrName>style.visibility</p:attrName>
-                                        </p:attrNameLst>
-                                      </p:cBhvr>
-                                      <p:to>
-                                        <p:strVal val="visible"/>
-                                      </p:to>
-                                    </p:set>
-                                    <p:animEffect transition="in" filter="wipe(down)">
-                                      <p:cBhvr>
-                                        <p:cTn id="27" dur="500"/>
-                                        <p:tgtEl>
-                                          <p:spTgt spid="3">
-                                            <p:txEl>
-                                              <p:pRg st="6" end="6"/>
-                                            </p:txEl>
-                                          </p:spTgt>
-                                        </p:tgtEl>
-                                      </p:cBhvr>
-                                    </p:animEffect>
-                                  </p:childTnLst>
-                                </p:cTn>
-                              </p:par>
-                            </p:childTnLst>
-                          </p:cTn>
-                        </p:par>
-                      </p:childTnLst>
-                    </p:cTn>
-                  </p:par>
-                </p:childTnLst>
-              </p:cTn>
-              <p:prevCondLst>
-                <p:cond evt="onPrev" delay="0">
-                  <p:tgtEl>
-                    <p:sldTgt/>
-                  </p:tgtEl>
-                </p:cond>
-              </p:prevCondLst>
-              <p:nextCondLst>
-                <p:cond evt="onNext" delay="0">
-                  <p:tgtEl>
-                    <p:sldTgt/>
-                  </p:tgtEl>
-                </p:cond>
-              </p:nextCondLst>
-            </p:seq>
-          </p:childTnLst>
-        </p:cTn>
-      </p:par>
-    </p:tnLst>
-    <p:bldLst>
-      <p:bldP spid="2" grpId="0"/>
-    </p:bldLst>
-  </p:timing>
 </p:sld>
 </file>
 
@@ -8277,7 +6750,7 @@
         <p:spPr>
           <a:xfrm>
             <a:off x="875071" y="1678797"/>
-            <a:ext cx="3628044" cy="369332"/>
+            <a:ext cx="9299918" cy="3693319"/>
           </a:xfrm>
           <a:prstGeom prst="rect">
             <a:avLst/>
@@ -8308,7 +6781,61 @@
               <a:rPr lang="en-US" dirty="0"/>
               <a:t>https://github.com/dotnet/reactive</a:t>
             </a:r>
+          </a:p>
+          <a:p>
             <a:endParaRPr lang="en-GB" dirty="0"/>
+          </a:p>
+          <a:p>
+            <a:r>
+              <a:rPr lang="en-US" dirty="0"/>
+              <a:t>https://learn.microsoft.com/en-us/shows/on-dotnet/reactive-extensions-for-net-developers</a:t>
+            </a:r>
+            <a:endParaRPr lang="en-GB" dirty="0"/>
+          </a:p>
+          <a:p>
+            <a:endParaRPr lang="en-GB" dirty="0"/>
+          </a:p>
+          <a:p>
+            <a:r>
+              <a:rPr lang="en-US" dirty="0"/>
+              <a:t>https://github.com/reactivex</a:t>
+            </a:r>
+          </a:p>
+          <a:p>
+            <a:endParaRPr lang="en-GB" dirty="0"/>
+          </a:p>
+          <a:p>
+            <a:r>
+              <a:rPr lang="en-GB" dirty="0"/>
+              <a:t>https://github.com/ReactiveX/RxJava</a:t>
+            </a:r>
+          </a:p>
+          <a:p>
+            <a:endParaRPr lang="en-GB" dirty="0"/>
+          </a:p>
+          <a:p>
+            <a:r>
+              <a:rPr lang="en-US" dirty="0"/>
+              <a:t>https://introtorx.com/</a:t>
+            </a:r>
+          </a:p>
+          <a:p>
+            <a:endParaRPr lang="en-US" dirty="0"/>
+          </a:p>
+          <a:p>
+            <a:r>
+              <a:rPr lang="en-US" dirty="0"/>
+              <a:t>https://reactiveui.net/</a:t>
+            </a:r>
+          </a:p>
+          <a:p>
+            <a:endParaRPr lang="en-US" dirty="0"/>
+          </a:p>
+          <a:p>
+            <a:r>
+              <a:rPr lang="en-US" dirty="0"/>
+              <a:t>https://rxmarbles.com/</a:t>
+            </a:r>
           </a:p>
         </p:txBody>
       </p:sp>
@@ -8322,146 +6849,6 @@
   <p:clrMapOvr>
     <a:overrideClrMapping bg1="lt1" tx1="dk1" bg2="lt2" tx2="dk2" accent1="accent1" accent2="accent2" accent3="accent3" accent4="accent4" accent5="accent5" accent6="accent6" hlink="hlink" folHlink="folHlink"/>
   </p:clrMapOvr>
-  <p:timing>
-    <p:tnLst>
-      <p:par>
-        <p:cTn id="1" dur="indefinite" restart="never" nodeType="tmRoot">
-          <p:childTnLst>
-            <p:seq concurrent="1" nextAc="seek">
-              <p:cTn id="2" dur="indefinite" nodeType="mainSeq">
-                <p:childTnLst>
-                  <p:par>
-                    <p:cTn id="3" fill="hold">
-                      <p:stCondLst>
-                        <p:cond delay="indefinite"/>
-                      </p:stCondLst>
-                      <p:childTnLst>
-                        <p:par>
-                          <p:cTn id="4" fill="hold">
-                            <p:stCondLst>
-                              <p:cond delay="0"/>
-                            </p:stCondLst>
-                            <p:childTnLst>
-                              <p:par>
-                                <p:cTn id="5" presetID="22" presetClass="entr" presetSubtype="4" fill="hold" grpId="0" nodeType="clickEffect">
-                                  <p:stCondLst>
-                                    <p:cond delay="0"/>
-                                  </p:stCondLst>
-                                  <p:childTnLst>
-                                    <p:set>
-                                      <p:cBhvr>
-                                        <p:cTn id="6" dur="1" fill="hold">
-                                          <p:stCondLst>
-                                            <p:cond delay="0"/>
-                                          </p:stCondLst>
-                                        </p:cTn>
-                                        <p:tgtEl>
-                                          <p:spTgt spid="6"/>
-                                        </p:tgtEl>
-                                        <p:attrNameLst>
-                                          <p:attrName>style.visibility</p:attrName>
-                                        </p:attrNameLst>
-                                      </p:cBhvr>
-                                      <p:to>
-                                        <p:strVal val="visible"/>
-                                      </p:to>
-                                    </p:set>
-                                    <p:animEffect transition="in" filter="wipe(down)">
-                                      <p:cBhvr>
-                                        <p:cTn id="7" dur="500"/>
-                                        <p:tgtEl>
-                                          <p:spTgt spid="6"/>
-                                        </p:tgtEl>
-                                      </p:cBhvr>
-                                    </p:animEffect>
-                                  </p:childTnLst>
-                                </p:cTn>
-                              </p:par>
-                            </p:childTnLst>
-                          </p:cTn>
-                        </p:par>
-                      </p:childTnLst>
-                    </p:cTn>
-                  </p:par>
-                  <p:par>
-                    <p:cTn id="8" fill="hold">
-                      <p:stCondLst>
-                        <p:cond delay="indefinite"/>
-                      </p:stCondLst>
-                      <p:childTnLst>
-                        <p:par>
-                          <p:cTn id="9" fill="hold">
-                            <p:stCondLst>
-                              <p:cond delay="0"/>
-                            </p:stCondLst>
-                            <p:childTnLst>
-                              <p:par>
-                                <p:cTn id="10" presetID="22" presetClass="entr" presetSubtype="4" fill="hold" grpId="0" nodeType="clickEffect">
-                                  <p:stCondLst>
-                                    <p:cond delay="0"/>
-                                  </p:stCondLst>
-                                  <p:childTnLst>
-                                    <p:set>
-                                      <p:cBhvr>
-                                        <p:cTn id="11" dur="1" fill="hold">
-                                          <p:stCondLst>
-                                            <p:cond delay="0"/>
-                                          </p:stCondLst>
-                                        </p:cTn>
-                                        <p:tgtEl>
-                                          <p:spTgt spid="9"/>
-                                        </p:tgtEl>
-                                        <p:attrNameLst>
-                                          <p:attrName>style.visibility</p:attrName>
-                                        </p:attrNameLst>
-                                      </p:cBhvr>
-                                      <p:to>
-                                        <p:strVal val="visible"/>
-                                      </p:to>
-                                    </p:set>
-                                    <p:animEffect transition="in" filter="wipe(down)">
-                                      <p:cBhvr>
-                                        <p:cTn id="12" dur="500"/>
-                                        <p:tgtEl>
-                                          <p:spTgt spid="9"/>
-                                        </p:tgtEl>
-                                      </p:cBhvr>
-                                    </p:animEffect>
-                                  </p:childTnLst>
-                                </p:cTn>
-                              </p:par>
-                            </p:childTnLst>
-                          </p:cTn>
-                        </p:par>
-                      </p:childTnLst>
-                    </p:cTn>
-                  </p:par>
-                </p:childTnLst>
-              </p:cTn>
-              <p:prevCondLst>
-                <p:cond evt="onPrev" delay="0">
-                  <p:tgtEl>
-                    <p:sldTgt/>
-                  </p:tgtEl>
-                </p:cond>
-              </p:prevCondLst>
-              <p:nextCondLst>
-                <p:cond evt="onNext" delay="0">
-                  <p:tgtEl>
-                    <p:sldTgt/>
-                  </p:tgtEl>
-                </p:cond>
-              </p:nextCondLst>
-            </p:seq>
-          </p:childTnLst>
-        </p:cTn>
-      </p:par>
-    </p:tnLst>
-    <p:bldLst>
-      <p:bldP spid="6" grpId="0"/>
-      <p:bldP spid="9" grpId="0"/>
-    </p:bldLst>
-  </p:timing>
 </p:sld>
 </file>
 

</xml_diff>